<commit_message>
updated with mprtp and rtp stack
</commit_message>
<xml_diff>
--- a/graphs/source/chap5-src.pptx
+++ b/graphs/source/chap5-src.pptx
@@ -8,6 +8,8 @@
     <p:sldId id="256" r:id="rId2"/>
     <p:sldId id="257" r:id="rId3"/>
     <p:sldId id="258" r:id="rId4"/>
+    <p:sldId id="259" r:id="rId5"/>
+    <p:sldId id="260" r:id="rId6"/>
   </p:sldIdLst>
   <p:sldSz cx="9144000" cy="6858000" type="screen4x3"/>
   <p:notesSz cx="6858000" cy="9144000"/>
@@ -290,7 +292,7 @@
           <a:p>
             <a:fld id="{CE2D3545-AE21-7247-8426-4B1172E482C1}" type="datetimeFigureOut">
               <a:rPr lang="en-US" smtClean="0"/>
-              <a:t>8/21/13</a:t>
+              <a:t>8/23/13</a:t>
             </a:fld>
             <a:endParaRPr lang="en-US"/>
           </a:p>
@@ -460,7 +462,7 @@
           <a:p>
             <a:fld id="{CE2D3545-AE21-7247-8426-4B1172E482C1}" type="datetimeFigureOut">
               <a:rPr lang="en-US" smtClean="0"/>
-              <a:t>8/21/13</a:t>
+              <a:t>8/23/13</a:t>
             </a:fld>
             <a:endParaRPr lang="en-US"/>
           </a:p>
@@ -640,7 +642,7 @@
           <a:p>
             <a:fld id="{CE2D3545-AE21-7247-8426-4B1172E482C1}" type="datetimeFigureOut">
               <a:rPr lang="en-US" smtClean="0"/>
-              <a:t>8/21/13</a:t>
+              <a:t>8/23/13</a:t>
             </a:fld>
             <a:endParaRPr lang="en-US"/>
           </a:p>
@@ -810,7 +812,7 @@
           <a:p>
             <a:fld id="{CE2D3545-AE21-7247-8426-4B1172E482C1}" type="datetimeFigureOut">
               <a:rPr lang="en-US" smtClean="0"/>
-              <a:t>8/21/13</a:t>
+              <a:t>8/23/13</a:t>
             </a:fld>
             <a:endParaRPr lang="en-US"/>
           </a:p>
@@ -1056,7 +1058,7 @@
           <a:p>
             <a:fld id="{CE2D3545-AE21-7247-8426-4B1172E482C1}" type="datetimeFigureOut">
               <a:rPr lang="en-US" smtClean="0"/>
-              <a:t>8/21/13</a:t>
+              <a:t>8/23/13</a:t>
             </a:fld>
             <a:endParaRPr lang="en-US"/>
           </a:p>
@@ -1344,7 +1346,7 @@
           <a:p>
             <a:fld id="{CE2D3545-AE21-7247-8426-4B1172E482C1}" type="datetimeFigureOut">
               <a:rPr lang="en-US" smtClean="0"/>
-              <a:t>8/21/13</a:t>
+              <a:t>8/23/13</a:t>
             </a:fld>
             <a:endParaRPr lang="en-US"/>
           </a:p>
@@ -1766,7 +1768,7 @@
           <a:p>
             <a:fld id="{CE2D3545-AE21-7247-8426-4B1172E482C1}" type="datetimeFigureOut">
               <a:rPr lang="en-US" smtClean="0"/>
-              <a:t>8/21/13</a:t>
+              <a:t>8/23/13</a:t>
             </a:fld>
             <a:endParaRPr lang="en-US"/>
           </a:p>
@@ -1884,7 +1886,7 @@
           <a:p>
             <a:fld id="{CE2D3545-AE21-7247-8426-4B1172E482C1}" type="datetimeFigureOut">
               <a:rPr lang="en-US" smtClean="0"/>
-              <a:t>8/21/13</a:t>
+              <a:t>8/23/13</a:t>
             </a:fld>
             <a:endParaRPr lang="en-US"/>
           </a:p>
@@ -1979,7 +1981,7 @@
           <a:p>
             <a:fld id="{CE2D3545-AE21-7247-8426-4B1172E482C1}" type="datetimeFigureOut">
               <a:rPr lang="en-US" smtClean="0"/>
-              <a:t>8/21/13</a:t>
+              <a:t>8/23/13</a:t>
             </a:fld>
             <a:endParaRPr lang="en-US"/>
           </a:p>
@@ -2256,7 +2258,7 @@
           <a:p>
             <a:fld id="{CE2D3545-AE21-7247-8426-4B1172E482C1}" type="datetimeFigureOut">
               <a:rPr lang="en-US" smtClean="0"/>
-              <a:t>8/21/13</a:t>
+              <a:t>8/23/13</a:t>
             </a:fld>
             <a:endParaRPr lang="en-US"/>
           </a:p>
@@ -2513,7 +2515,7 @@
           <a:p>
             <a:fld id="{CE2D3545-AE21-7247-8426-4B1172E482C1}" type="datetimeFigureOut">
               <a:rPr lang="en-US" smtClean="0"/>
-              <a:t>8/21/13</a:t>
+              <a:t>8/23/13</a:t>
             </a:fld>
             <a:endParaRPr lang="en-US"/>
           </a:p>
@@ -2731,7 +2733,7 @@
           <a:p>
             <a:fld id="{CE2D3545-AE21-7247-8426-4B1172E482C1}" type="datetimeFigureOut">
               <a:rPr lang="en-US" smtClean="0"/>
-              <a:t>8/21/13</a:t>
+              <a:t>8/23/13</a:t>
             </a:fld>
             <a:endParaRPr lang="en-US"/>
           </a:p>
@@ -5144,6 +5146,1094 @@
     <p:extLst>
       <p:ext uri="{BB962C8B-B14F-4D97-AF65-F5344CB8AC3E}">
         <p14:creationId xmlns:p14="http://schemas.microsoft.com/office/powerpoint/2010/main" val="4208439333"/>
+      </p:ext>
+    </p:extLst>
+  </p:cSld>
+  <p:clrMapOvr>
+    <a:masterClrMapping/>
+  </p:clrMapOvr>
+</p:sld>
+</file>
+
+<file path=ppt/slides/slide4.xml><?xml version="1.0" encoding="utf-8"?>
+<p:sld xmlns:a="http://schemas.openxmlformats.org/drawingml/2006/main" xmlns:r="http://schemas.openxmlformats.org/officeDocument/2006/relationships" xmlns:p="http://schemas.openxmlformats.org/presentationml/2006/main">
+  <p:cSld>
+    <p:spTree>
+      <p:nvGrpSpPr>
+        <p:cNvPr id="1" name=""/>
+        <p:cNvGrpSpPr/>
+        <p:nvPr/>
+      </p:nvGrpSpPr>
+      <p:grpSpPr>
+        <a:xfrm>
+          <a:off x="0" y="0"/>
+          <a:ext cx="0" cy="0"/>
+          <a:chOff x="0" y="0"/>
+          <a:chExt cx="0" cy="0"/>
+        </a:xfrm>
+      </p:grpSpPr>
+      <p:sp>
+        <p:nvSpPr>
+          <p:cNvPr id="2" name="Rectangle 1"/>
+          <p:cNvSpPr/>
+          <p:nvPr/>
+        </p:nvSpPr>
+        <p:spPr>
+          <a:xfrm>
+            <a:off x="1218327" y="5052177"/>
+            <a:ext cx="6539830" cy="831370"/>
+          </a:xfrm>
+          <a:prstGeom prst="rect">
+            <a:avLst/>
+          </a:prstGeom>
+        </p:spPr>
+        <p:style>
+          <a:lnRef idx="2">
+            <a:schemeClr val="dk1"/>
+          </a:lnRef>
+          <a:fillRef idx="1">
+            <a:schemeClr val="lt1"/>
+          </a:fillRef>
+          <a:effectRef idx="0">
+            <a:schemeClr val="dk1"/>
+          </a:effectRef>
+          <a:fontRef idx="minor">
+            <a:schemeClr val="dk1"/>
+          </a:fontRef>
+        </p:style>
+        <p:txBody>
+          <a:bodyPr rtlCol="0" anchor="ctr"/>
+          <a:lstStyle/>
+          <a:p>
+            <a:pPr algn="ctr"/>
+            <a:r>
+              <a:rPr lang="en-US" dirty="0" smtClean="0"/>
+              <a:t>Internet Protocol </a:t>
+            </a:r>
+            <a:r>
+              <a:rPr lang="en-US" dirty="0" smtClean="0">
+                <a:latin typeface="+mj-lt"/>
+              </a:rPr>
+              <a:t>(IP)</a:t>
+            </a:r>
+            <a:endParaRPr lang="en-US" sz="1600" dirty="0">
+              <a:latin typeface="+mj-lt"/>
+            </a:endParaRPr>
+          </a:p>
+        </p:txBody>
+      </p:sp>
+      <p:sp>
+        <p:nvSpPr>
+          <p:cNvPr id="3" name="Rectangle 2"/>
+          <p:cNvSpPr/>
+          <p:nvPr/>
+        </p:nvSpPr>
+        <p:spPr>
+          <a:xfrm>
+            <a:off x="1218327" y="4220807"/>
+            <a:ext cx="6539830" cy="831370"/>
+          </a:xfrm>
+          <a:prstGeom prst="rect">
+            <a:avLst/>
+          </a:prstGeom>
+        </p:spPr>
+        <p:style>
+          <a:lnRef idx="2">
+            <a:schemeClr val="dk1"/>
+          </a:lnRef>
+          <a:fillRef idx="1">
+            <a:schemeClr val="lt1"/>
+          </a:fillRef>
+          <a:effectRef idx="0">
+            <a:schemeClr val="dk1"/>
+          </a:effectRef>
+          <a:fontRef idx="minor">
+            <a:schemeClr val="dk1"/>
+          </a:fontRef>
+        </p:style>
+        <p:txBody>
+          <a:bodyPr rtlCol="0" anchor="ctr"/>
+          <a:lstStyle/>
+          <a:p>
+            <a:pPr algn="ctr"/>
+            <a:r>
+              <a:rPr lang="en-US" dirty="0" smtClean="0"/>
+              <a:t>User Datagram Protocol </a:t>
+            </a:r>
+            <a:r>
+              <a:rPr lang="en-US" dirty="0" smtClean="0">
+                <a:latin typeface="+mj-lt"/>
+              </a:rPr>
+              <a:t>(UDP)</a:t>
+            </a:r>
+            <a:endParaRPr lang="en-US" sz="1600" dirty="0">
+              <a:latin typeface="+mj-lt"/>
+            </a:endParaRPr>
+          </a:p>
+        </p:txBody>
+      </p:sp>
+      <p:sp>
+        <p:nvSpPr>
+          <p:cNvPr id="6" name="Rectangle 5"/>
+          <p:cNvSpPr/>
+          <p:nvPr/>
+        </p:nvSpPr>
+        <p:spPr>
+          <a:xfrm>
+            <a:off x="1218328" y="3389437"/>
+            <a:ext cx="1936070" cy="831370"/>
+          </a:xfrm>
+          <a:prstGeom prst="rect">
+            <a:avLst/>
+          </a:prstGeom>
+        </p:spPr>
+        <p:style>
+          <a:lnRef idx="2">
+            <a:schemeClr val="dk1"/>
+          </a:lnRef>
+          <a:fillRef idx="1">
+            <a:schemeClr val="lt1"/>
+          </a:fillRef>
+          <a:effectRef idx="0">
+            <a:schemeClr val="dk1"/>
+          </a:effectRef>
+          <a:fontRef idx="minor">
+            <a:schemeClr val="dk1"/>
+          </a:fontRef>
+        </p:style>
+        <p:txBody>
+          <a:bodyPr rtlCol="0" anchor="ctr"/>
+          <a:lstStyle/>
+          <a:p>
+            <a:pPr algn="ctr"/>
+            <a:r>
+              <a:rPr lang="en-US" sz="1600" dirty="0" smtClean="0"/>
+              <a:t>Session Traversal Utilities for NAT </a:t>
+            </a:r>
+            <a:r>
+              <a:rPr lang="en-US" sz="1600" dirty="0" smtClean="0">
+                <a:latin typeface="+mj-lt"/>
+              </a:rPr>
+              <a:t>(STUN)</a:t>
+            </a:r>
+            <a:endParaRPr lang="en-US" sz="1600" dirty="0">
+              <a:latin typeface="+mj-lt"/>
+            </a:endParaRPr>
+          </a:p>
+        </p:txBody>
+      </p:sp>
+      <p:sp>
+        <p:nvSpPr>
+          <p:cNvPr id="9" name="Rectangle 8"/>
+          <p:cNvSpPr/>
+          <p:nvPr/>
+        </p:nvSpPr>
+        <p:spPr>
+          <a:xfrm>
+            <a:off x="3154399" y="3389437"/>
+            <a:ext cx="4603758" cy="831370"/>
+          </a:xfrm>
+          <a:prstGeom prst="rect">
+            <a:avLst/>
+          </a:prstGeom>
+          <a:solidFill>
+            <a:srgbClr val="D7DCE3"/>
+          </a:solidFill>
+        </p:spPr>
+        <p:style>
+          <a:lnRef idx="2">
+            <a:schemeClr val="dk1"/>
+          </a:lnRef>
+          <a:fillRef idx="1">
+            <a:schemeClr val="lt1"/>
+          </a:fillRef>
+          <a:effectRef idx="0">
+            <a:schemeClr val="dk1"/>
+          </a:effectRef>
+          <a:fontRef idx="minor">
+            <a:schemeClr val="dk1"/>
+          </a:fontRef>
+        </p:style>
+        <p:txBody>
+          <a:bodyPr rtlCol="0" anchor="ctr"/>
+          <a:lstStyle/>
+          <a:p>
+            <a:pPr algn="ctr"/>
+            <a:r>
+              <a:rPr lang="en-US" sz="1600" dirty="0" smtClean="0"/>
+              <a:t>Real-time Transport Protocol </a:t>
+            </a:r>
+            <a:r>
+              <a:rPr lang="en-US" sz="1600" dirty="0" smtClean="0">
+                <a:latin typeface="+mj-lt"/>
+              </a:rPr>
+              <a:t>(RTP)</a:t>
+            </a:r>
+            <a:endParaRPr lang="en-US" sz="1400" dirty="0">
+              <a:latin typeface="+mj-lt"/>
+            </a:endParaRPr>
+          </a:p>
+        </p:txBody>
+      </p:sp>
+      <p:sp>
+        <p:nvSpPr>
+          <p:cNvPr id="11" name="Rectangle 10"/>
+          <p:cNvSpPr/>
+          <p:nvPr/>
+        </p:nvSpPr>
+        <p:spPr>
+          <a:xfrm>
+            <a:off x="3156277" y="2922073"/>
+            <a:ext cx="899063" cy="467363"/>
+          </a:xfrm>
+          <a:prstGeom prst="rect">
+            <a:avLst/>
+          </a:prstGeom>
+          <a:solidFill>
+            <a:schemeClr val="bg2"/>
+          </a:solidFill>
+        </p:spPr>
+        <p:style>
+          <a:lnRef idx="2">
+            <a:schemeClr val="dk1"/>
+          </a:lnRef>
+          <a:fillRef idx="1">
+            <a:schemeClr val="lt1"/>
+          </a:fillRef>
+          <a:effectRef idx="0">
+            <a:schemeClr val="dk1"/>
+          </a:effectRef>
+          <a:fontRef idx="minor">
+            <a:schemeClr val="dk1"/>
+          </a:fontRef>
+        </p:style>
+        <p:txBody>
+          <a:bodyPr rtlCol="0" anchor="ctr"/>
+          <a:lstStyle/>
+          <a:p>
+            <a:pPr algn="ctr"/>
+            <a:r>
+              <a:rPr lang="en-US" sz="1400" dirty="0" err="1" smtClean="0"/>
+              <a:t>Subflow</a:t>
+            </a:r>
+            <a:r>
+              <a:rPr lang="en-US" sz="1400" dirty="0" smtClean="0"/>
+              <a:t> #1</a:t>
+            </a:r>
+            <a:endParaRPr lang="en-US" sz="1200" dirty="0"/>
+          </a:p>
+        </p:txBody>
+      </p:sp>
+      <p:sp>
+        <p:nvSpPr>
+          <p:cNvPr id="12" name="Rectangle 11"/>
+          <p:cNvSpPr/>
+          <p:nvPr/>
+        </p:nvSpPr>
+        <p:spPr>
+          <a:xfrm>
+            <a:off x="4055340" y="2922073"/>
+            <a:ext cx="899063" cy="467363"/>
+          </a:xfrm>
+          <a:prstGeom prst="rect">
+            <a:avLst/>
+          </a:prstGeom>
+          <a:solidFill>
+            <a:schemeClr val="bg2"/>
+          </a:solidFill>
+        </p:spPr>
+        <p:style>
+          <a:lnRef idx="2">
+            <a:schemeClr val="dk1"/>
+          </a:lnRef>
+          <a:fillRef idx="1">
+            <a:schemeClr val="lt1"/>
+          </a:fillRef>
+          <a:effectRef idx="0">
+            <a:schemeClr val="dk1"/>
+          </a:effectRef>
+          <a:fontRef idx="minor">
+            <a:schemeClr val="dk1"/>
+          </a:fontRef>
+        </p:style>
+        <p:txBody>
+          <a:bodyPr rtlCol="0" anchor="ctr"/>
+          <a:lstStyle/>
+          <a:p>
+            <a:pPr algn="ctr"/>
+            <a:r>
+              <a:rPr lang="en-US" sz="1400" dirty="0" err="1" smtClean="0"/>
+              <a:t>Subflow</a:t>
+            </a:r>
+            <a:endParaRPr lang="en-US" sz="1400" dirty="0" smtClean="0"/>
+          </a:p>
+          <a:p>
+            <a:pPr algn="ctr"/>
+            <a:r>
+              <a:rPr lang="en-US" sz="1400" dirty="0" smtClean="0"/>
+              <a:t>#2</a:t>
+            </a:r>
+            <a:endParaRPr lang="en-US" sz="1200" dirty="0"/>
+          </a:p>
+        </p:txBody>
+      </p:sp>
+      <p:sp>
+        <p:nvSpPr>
+          <p:cNvPr id="13" name="Rectangle 12"/>
+          <p:cNvSpPr/>
+          <p:nvPr/>
+        </p:nvSpPr>
+        <p:spPr>
+          <a:xfrm>
+            <a:off x="4954403" y="2922073"/>
+            <a:ext cx="899063" cy="467363"/>
+          </a:xfrm>
+          <a:prstGeom prst="rect">
+            <a:avLst/>
+          </a:prstGeom>
+          <a:solidFill>
+            <a:schemeClr val="bg2"/>
+          </a:solidFill>
+        </p:spPr>
+        <p:style>
+          <a:lnRef idx="2">
+            <a:schemeClr val="dk1"/>
+          </a:lnRef>
+          <a:fillRef idx="1">
+            <a:schemeClr val="lt1"/>
+          </a:fillRef>
+          <a:effectRef idx="0">
+            <a:schemeClr val="dk1"/>
+          </a:effectRef>
+          <a:fontRef idx="minor">
+            <a:schemeClr val="dk1"/>
+          </a:fontRef>
+        </p:style>
+        <p:txBody>
+          <a:bodyPr rtlCol="0" anchor="ctr"/>
+          <a:lstStyle/>
+          <a:p>
+            <a:pPr algn="ctr"/>
+            <a:r>
+              <a:rPr lang="en-US" sz="1400" dirty="0" err="1" smtClean="0"/>
+              <a:t>Subflow</a:t>
+            </a:r>
+            <a:endParaRPr lang="en-US" sz="1400" dirty="0" smtClean="0"/>
+          </a:p>
+          <a:p>
+            <a:pPr algn="ctr"/>
+            <a:r>
+              <a:rPr lang="en-US" sz="1400" dirty="0" smtClean="0"/>
+              <a:t>#3</a:t>
+            </a:r>
+            <a:endParaRPr lang="en-US" sz="1200" dirty="0"/>
+          </a:p>
+        </p:txBody>
+      </p:sp>
+      <p:sp>
+        <p:nvSpPr>
+          <p:cNvPr id="14" name="Rectangle 13"/>
+          <p:cNvSpPr/>
+          <p:nvPr/>
+        </p:nvSpPr>
+        <p:spPr>
+          <a:xfrm>
+            <a:off x="3156277" y="2444161"/>
+            <a:ext cx="2697189" cy="491561"/>
+          </a:xfrm>
+          <a:prstGeom prst="rect">
+            <a:avLst/>
+          </a:prstGeom>
+          <a:solidFill>
+            <a:schemeClr val="bg2"/>
+          </a:solidFill>
+        </p:spPr>
+        <p:style>
+          <a:lnRef idx="2">
+            <a:schemeClr val="dk1"/>
+          </a:lnRef>
+          <a:fillRef idx="1">
+            <a:schemeClr val="lt1"/>
+          </a:fillRef>
+          <a:effectRef idx="0">
+            <a:schemeClr val="dk1"/>
+          </a:effectRef>
+          <a:fontRef idx="minor">
+            <a:schemeClr val="dk1"/>
+          </a:fontRef>
+        </p:style>
+        <p:txBody>
+          <a:bodyPr rtlCol="0" anchor="ctr"/>
+          <a:lstStyle/>
+          <a:p>
+            <a:pPr algn="ctr"/>
+            <a:r>
+              <a:rPr lang="en-US" sz="1600" dirty="0" smtClean="0"/>
+              <a:t>Multipath RTP </a:t>
+            </a:r>
+            <a:r>
+              <a:rPr lang="en-US" sz="1600" dirty="0" smtClean="0">
+                <a:latin typeface="+mj-lt"/>
+              </a:rPr>
+              <a:t>(MPRTP)</a:t>
+            </a:r>
+            <a:endParaRPr lang="en-US" sz="1400" dirty="0">
+              <a:latin typeface="+mj-lt"/>
+            </a:endParaRPr>
+          </a:p>
+        </p:txBody>
+      </p:sp>
+      <p:sp>
+        <p:nvSpPr>
+          <p:cNvPr id="15" name="Rectangle 14"/>
+          <p:cNvSpPr/>
+          <p:nvPr/>
+        </p:nvSpPr>
+        <p:spPr>
+          <a:xfrm>
+            <a:off x="3156277" y="1708376"/>
+            <a:ext cx="2697189" cy="735785"/>
+          </a:xfrm>
+          <a:prstGeom prst="rect">
+            <a:avLst/>
+          </a:prstGeom>
+        </p:spPr>
+        <p:style>
+          <a:lnRef idx="2">
+            <a:schemeClr val="dk1"/>
+          </a:lnRef>
+          <a:fillRef idx="1">
+            <a:schemeClr val="lt1"/>
+          </a:fillRef>
+          <a:effectRef idx="0">
+            <a:schemeClr val="dk1"/>
+          </a:effectRef>
+          <a:fontRef idx="minor">
+            <a:schemeClr val="dk1"/>
+          </a:fontRef>
+        </p:style>
+        <p:txBody>
+          <a:bodyPr rtlCol="0" anchor="ctr"/>
+          <a:lstStyle/>
+          <a:p>
+            <a:pPr algn="ctr"/>
+            <a:r>
+              <a:rPr lang="en-US" sz="1600" dirty="0" smtClean="0"/>
+              <a:t>SSRC #1</a:t>
+            </a:r>
+            <a:endParaRPr lang="en-US" sz="1400" dirty="0">
+              <a:latin typeface="+mj-lt"/>
+            </a:endParaRPr>
+          </a:p>
+        </p:txBody>
+      </p:sp>
+      <p:sp>
+        <p:nvSpPr>
+          <p:cNvPr id="17" name="Rectangle 16"/>
+          <p:cNvSpPr/>
+          <p:nvPr/>
+        </p:nvSpPr>
+        <p:spPr>
+          <a:xfrm>
+            <a:off x="5839810" y="1708375"/>
+            <a:ext cx="996841" cy="1676395"/>
+          </a:xfrm>
+          <a:prstGeom prst="rect">
+            <a:avLst/>
+          </a:prstGeom>
+        </p:spPr>
+        <p:style>
+          <a:lnRef idx="2">
+            <a:schemeClr val="dk1"/>
+          </a:lnRef>
+          <a:fillRef idx="1">
+            <a:schemeClr val="lt1"/>
+          </a:fillRef>
+          <a:effectRef idx="0">
+            <a:schemeClr val="dk1"/>
+          </a:effectRef>
+          <a:fontRef idx="minor">
+            <a:schemeClr val="dk1"/>
+          </a:fontRef>
+        </p:style>
+        <p:txBody>
+          <a:bodyPr rtlCol="0" anchor="ctr"/>
+          <a:lstStyle/>
+          <a:p>
+            <a:pPr algn="ctr"/>
+            <a:r>
+              <a:rPr lang="en-US" sz="1600" dirty="0" smtClean="0"/>
+              <a:t>SSRC #2</a:t>
+            </a:r>
+            <a:endParaRPr lang="en-US" sz="1400" dirty="0">
+              <a:latin typeface="+mj-lt"/>
+            </a:endParaRPr>
+          </a:p>
+        </p:txBody>
+      </p:sp>
+      <p:sp>
+        <p:nvSpPr>
+          <p:cNvPr id="18" name="Rectangle 17"/>
+          <p:cNvSpPr/>
+          <p:nvPr/>
+        </p:nvSpPr>
+        <p:spPr>
+          <a:xfrm>
+            <a:off x="6836651" y="1708376"/>
+            <a:ext cx="921505" cy="1681062"/>
+          </a:xfrm>
+          <a:prstGeom prst="rect">
+            <a:avLst/>
+          </a:prstGeom>
+        </p:spPr>
+        <p:style>
+          <a:lnRef idx="2">
+            <a:schemeClr val="dk1"/>
+          </a:lnRef>
+          <a:fillRef idx="1">
+            <a:schemeClr val="lt1"/>
+          </a:fillRef>
+          <a:effectRef idx="0">
+            <a:schemeClr val="dk1"/>
+          </a:effectRef>
+          <a:fontRef idx="minor">
+            <a:schemeClr val="dk1"/>
+          </a:fontRef>
+        </p:style>
+        <p:txBody>
+          <a:bodyPr rtlCol="0" anchor="ctr"/>
+          <a:lstStyle/>
+          <a:p>
+            <a:pPr algn="ctr"/>
+            <a:r>
+              <a:rPr lang="en-US" sz="1600" dirty="0" smtClean="0"/>
+              <a:t>SSRC #3</a:t>
+            </a:r>
+            <a:endParaRPr lang="en-US" sz="1400" dirty="0">
+              <a:latin typeface="+mj-lt"/>
+            </a:endParaRPr>
+          </a:p>
+        </p:txBody>
+      </p:sp>
+    </p:spTree>
+    <p:extLst>
+      <p:ext uri="{BB962C8B-B14F-4D97-AF65-F5344CB8AC3E}">
+        <p14:creationId xmlns:p14="http://schemas.microsoft.com/office/powerpoint/2010/main" val="2770741297"/>
+      </p:ext>
+    </p:extLst>
+  </p:cSld>
+  <p:clrMapOvr>
+    <a:masterClrMapping/>
+  </p:clrMapOvr>
+</p:sld>
+</file>
+
+<file path=ppt/slides/slide5.xml><?xml version="1.0" encoding="utf-8"?>
+<p:sld xmlns:a="http://schemas.openxmlformats.org/drawingml/2006/main" xmlns:r="http://schemas.openxmlformats.org/officeDocument/2006/relationships" xmlns:p="http://schemas.openxmlformats.org/presentationml/2006/main">
+  <p:cSld>
+    <p:spTree>
+      <p:nvGrpSpPr>
+        <p:cNvPr id="1" name=""/>
+        <p:cNvGrpSpPr/>
+        <p:nvPr/>
+      </p:nvGrpSpPr>
+      <p:grpSpPr>
+        <a:xfrm>
+          <a:off x="0" y="0"/>
+          <a:ext cx="0" cy="0"/>
+          <a:chOff x="0" y="0"/>
+          <a:chExt cx="0" cy="0"/>
+        </a:xfrm>
+      </p:grpSpPr>
+      <p:sp>
+        <p:nvSpPr>
+          <p:cNvPr id="2" name="Rectangle 1"/>
+          <p:cNvSpPr/>
+          <p:nvPr/>
+        </p:nvSpPr>
+        <p:spPr>
+          <a:xfrm>
+            <a:off x="1218327" y="5052177"/>
+            <a:ext cx="5404547" cy="831370"/>
+          </a:xfrm>
+          <a:prstGeom prst="rect">
+            <a:avLst/>
+          </a:prstGeom>
+        </p:spPr>
+        <p:style>
+          <a:lnRef idx="2">
+            <a:schemeClr val="dk1"/>
+          </a:lnRef>
+          <a:fillRef idx="1">
+            <a:schemeClr val="lt1"/>
+          </a:fillRef>
+          <a:effectRef idx="0">
+            <a:schemeClr val="dk1"/>
+          </a:effectRef>
+          <a:fontRef idx="minor">
+            <a:schemeClr val="dk1"/>
+          </a:fontRef>
+        </p:style>
+        <p:txBody>
+          <a:bodyPr rtlCol="0" anchor="ctr"/>
+          <a:lstStyle/>
+          <a:p>
+            <a:pPr algn="ctr"/>
+            <a:r>
+              <a:rPr lang="en-US" dirty="0" smtClean="0"/>
+              <a:t>Internet Protocol </a:t>
+            </a:r>
+            <a:r>
+              <a:rPr lang="en-US" dirty="0" smtClean="0">
+                <a:latin typeface="+mj-lt"/>
+              </a:rPr>
+              <a:t>(IP)</a:t>
+            </a:r>
+            <a:endParaRPr lang="en-US" sz="1600" dirty="0">
+              <a:latin typeface="+mj-lt"/>
+            </a:endParaRPr>
+          </a:p>
+        </p:txBody>
+      </p:sp>
+      <p:sp>
+        <p:nvSpPr>
+          <p:cNvPr id="3" name="Rectangle 2"/>
+          <p:cNvSpPr/>
+          <p:nvPr/>
+        </p:nvSpPr>
+        <p:spPr>
+          <a:xfrm>
+            <a:off x="1218327" y="4220807"/>
+            <a:ext cx="5404547" cy="831370"/>
+          </a:xfrm>
+          <a:prstGeom prst="rect">
+            <a:avLst/>
+          </a:prstGeom>
+        </p:spPr>
+        <p:style>
+          <a:lnRef idx="2">
+            <a:schemeClr val="dk1"/>
+          </a:lnRef>
+          <a:fillRef idx="1">
+            <a:schemeClr val="lt1"/>
+          </a:fillRef>
+          <a:effectRef idx="0">
+            <a:schemeClr val="dk1"/>
+          </a:effectRef>
+          <a:fontRef idx="minor">
+            <a:schemeClr val="dk1"/>
+          </a:fontRef>
+        </p:style>
+        <p:txBody>
+          <a:bodyPr rtlCol="0" anchor="ctr"/>
+          <a:lstStyle/>
+          <a:p>
+            <a:pPr algn="ctr"/>
+            <a:r>
+              <a:rPr lang="en-US" dirty="0" smtClean="0"/>
+              <a:t>User Datagram Protocol </a:t>
+            </a:r>
+            <a:r>
+              <a:rPr lang="en-US" dirty="0" smtClean="0">
+                <a:latin typeface="+mj-lt"/>
+              </a:rPr>
+              <a:t>(UDP)</a:t>
+            </a:r>
+            <a:endParaRPr lang="en-US" sz="1600" dirty="0">
+              <a:latin typeface="+mj-lt"/>
+            </a:endParaRPr>
+          </a:p>
+        </p:txBody>
+      </p:sp>
+      <p:sp>
+        <p:nvSpPr>
+          <p:cNvPr id="4" name="Rectangle 3"/>
+          <p:cNvSpPr/>
+          <p:nvPr/>
+        </p:nvSpPr>
+        <p:spPr>
+          <a:xfrm>
+            <a:off x="1218328" y="3389437"/>
+            <a:ext cx="1936070" cy="831370"/>
+          </a:xfrm>
+          <a:prstGeom prst="rect">
+            <a:avLst/>
+          </a:prstGeom>
+        </p:spPr>
+        <p:style>
+          <a:lnRef idx="2">
+            <a:schemeClr val="dk1"/>
+          </a:lnRef>
+          <a:fillRef idx="1">
+            <a:schemeClr val="lt1"/>
+          </a:fillRef>
+          <a:effectRef idx="0">
+            <a:schemeClr val="dk1"/>
+          </a:effectRef>
+          <a:fontRef idx="minor">
+            <a:schemeClr val="dk1"/>
+          </a:fontRef>
+        </p:style>
+        <p:txBody>
+          <a:bodyPr rtlCol="0" anchor="ctr"/>
+          <a:lstStyle/>
+          <a:p>
+            <a:pPr algn="ctr"/>
+            <a:r>
+              <a:rPr lang="en-US" sz="1600" dirty="0" smtClean="0"/>
+              <a:t>Session Traversal Utilities for NAT </a:t>
+            </a:r>
+            <a:r>
+              <a:rPr lang="en-US" sz="1600" dirty="0" smtClean="0">
+                <a:latin typeface="+mj-lt"/>
+              </a:rPr>
+              <a:t>(STUN)</a:t>
+            </a:r>
+            <a:endParaRPr lang="en-US" sz="1600" dirty="0">
+              <a:latin typeface="+mj-lt"/>
+            </a:endParaRPr>
+          </a:p>
+        </p:txBody>
+      </p:sp>
+      <p:sp>
+        <p:nvSpPr>
+          <p:cNvPr id="5" name="Rectangle 4"/>
+          <p:cNvSpPr/>
+          <p:nvPr/>
+        </p:nvSpPr>
+        <p:spPr>
+          <a:xfrm>
+            <a:off x="3154399" y="3389437"/>
+            <a:ext cx="3468476" cy="831370"/>
+          </a:xfrm>
+          <a:prstGeom prst="rect">
+            <a:avLst/>
+          </a:prstGeom>
+          <a:solidFill>
+            <a:schemeClr val="tx2">
+              <a:lumMod val="20000"/>
+              <a:lumOff val="80000"/>
+            </a:schemeClr>
+          </a:solidFill>
+        </p:spPr>
+        <p:style>
+          <a:lnRef idx="2">
+            <a:schemeClr val="dk1"/>
+          </a:lnRef>
+          <a:fillRef idx="1">
+            <a:schemeClr val="lt1"/>
+          </a:fillRef>
+          <a:effectRef idx="0">
+            <a:schemeClr val="dk1"/>
+          </a:effectRef>
+          <a:fontRef idx="minor">
+            <a:schemeClr val="dk1"/>
+          </a:fontRef>
+        </p:style>
+        <p:txBody>
+          <a:bodyPr rtlCol="0" anchor="ctr"/>
+          <a:lstStyle/>
+          <a:p>
+            <a:pPr algn="ctr"/>
+            <a:r>
+              <a:rPr lang="en-US" dirty="0" smtClean="0"/>
+              <a:t>Real-time Transport Protocol</a:t>
+            </a:r>
+            <a:r>
+              <a:rPr lang="en-US" dirty="0" smtClean="0">
+                <a:latin typeface="+mj-lt"/>
+              </a:rPr>
+              <a:t> (RTP)</a:t>
+            </a:r>
+            <a:endParaRPr lang="en-US" sz="1600" dirty="0">
+              <a:latin typeface="+mj-lt"/>
+            </a:endParaRPr>
+          </a:p>
+        </p:txBody>
+      </p:sp>
+      <p:sp>
+        <p:nvSpPr>
+          <p:cNvPr id="15" name="Rectangle 14"/>
+          <p:cNvSpPr/>
+          <p:nvPr/>
+        </p:nvSpPr>
+        <p:spPr>
+          <a:xfrm>
+            <a:off x="4028345" y="1708375"/>
+            <a:ext cx="873946" cy="1676395"/>
+          </a:xfrm>
+          <a:prstGeom prst="rect">
+            <a:avLst/>
+          </a:prstGeom>
+        </p:spPr>
+        <p:style>
+          <a:lnRef idx="2">
+            <a:schemeClr val="dk1"/>
+          </a:lnRef>
+          <a:fillRef idx="1">
+            <a:schemeClr val="lt1"/>
+          </a:fillRef>
+          <a:effectRef idx="0">
+            <a:schemeClr val="dk1"/>
+          </a:effectRef>
+          <a:fontRef idx="minor">
+            <a:schemeClr val="dk1"/>
+          </a:fontRef>
+        </p:style>
+        <p:txBody>
+          <a:bodyPr rtlCol="0" anchor="ctr"/>
+          <a:lstStyle/>
+          <a:p>
+            <a:pPr algn="ctr"/>
+            <a:r>
+              <a:rPr lang="en-US" sz="1600" dirty="0" smtClean="0"/>
+              <a:t>SSRC #2</a:t>
+            </a:r>
+            <a:endParaRPr lang="en-US" sz="1400" dirty="0">
+              <a:latin typeface="+mj-lt"/>
+            </a:endParaRPr>
+          </a:p>
+        </p:txBody>
+      </p:sp>
+      <p:sp>
+        <p:nvSpPr>
+          <p:cNvPr id="16" name="Rectangle 15"/>
+          <p:cNvSpPr/>
+          <p:nvPr/>
+        </p:nvSpPr>
+        <p:spPr>
+          <a:xfrm>
+            <a:off x="3154399" y="1708375"/>
+            <a:ext cx="873946" cy="1676395"/>
+          </a:xfrm>
+          <a:prstGeom prst="rect">
+            <a:avLst/>
+          </a:prstGeom>
+        </p:spPr>
+        <p:style>
+          <a:lnRef idx="2">
+            <a:schemeClr val="dk1"/>
+          </a:lnRef>
+          <a:fillRef idx="1">
+            <a:schemeClr val="lt1"/>
+          </a:fillRef>
+          <a:effectRef idx="0">
+            <a:schemeClr val="dk1"/>
+          </a:effectRef>
+          <a:fontRef idx="minor">
+            <a:schemeClr val="dk1"/>
+          </a:fontRef>
+        </p:style>
+        <p:txBody>
+          <a:bodyPr rtlCol="0" anchor="ctr"/>
+          <a:lstStyle/>
+          <a:p>
+            <a:pPr algn="ctr"/>
+            <a:r>
+              <a:rPr lang="en-US" sz="1600" dirty="0" smtClean="0"/>
+              <a:t>SSRC #1</a:t>
+            </a:r>
+            <a:endParaRPr lang="en-US" sz="1400" dirty="0">
+              <a:latin typeface="+mj-lt"/>
+            </a:endParaRPr>
+          </a:p>
+        </p:txBody>
+      </p:sp>
+      <p:sp>
+        <p:nvSpPr>
+          <p:cNvPr id="18" name="TextBox 17"/>
+          <p:cNvSpPr txBox="1"/>
+          <p:nvPr/>
+        </p:nvSpPr>
+        <p:spPr>
+          <a:xfrm>
+            <a:off x="8152276" y="1420074"/>
+            <a:ext cx="184666" cy="369332"/>
+          </a:xfrm>
+          <a:prstGeom prst="rect">
+            <a:avLst/>
+          </a:prstGeom>
+          <a:noFill/>
+        </p:spPr>
+        <p:txBody>
+          <a:bodyPr wrap="none" rtlCol="0">
+            <a:spAutoFit/>
+          </a:bodyPr>
+          <a:lstStyle/>
+          <a:p>
+            <a:endParaRPr lang="en-US" dirty="0"/>
+          </a:p>
+        </p:txBody>
+      </p:sp>
+      <p:sp>
+        <p:nvSpPr>
+          <p:cNvPr id="19" name="Rectangle 18"/>
+          <p:cNvSpPr/>
+          <p:nvPr/>
+        </p:nvSpPr>
+        <p:spPr>
+          <a:xfrm>
+            <a:off x="5748929" y="3877894"/>
+            <a:ext cx="860291" cy="342914"/>
+          </a:xfrm>
+          <a:prstGeom prst="rect">
+            <a:avLst/>
+          </a:prstGeom>
+        </p:spPr>
+        <p:style>
+          <a:lnRef idx="2">
+            <a:schemeClr val="dk1"/>
+          </a:lnRef>
+          <a:fillRef idx="1">
+            <a:schemeClr val="lt1"/>
+          </a:fillRef>
+          <a:effectRef idx="0">
+            <a:schemeClr val="dk1"/>
+          </a:effectRef>
+          <a:fontRef idx="minor">
+            <a:schemeClr val="dk1"/>
+          </a:fontRef>
+        </p:style>
+        <p:txBody>
+          <a:bodyPr rtlCol="0" anchor="ctr"/>
+          <a:lstStyle/>
+          <a:p>
+            <a:pPr algn="ctr"/>
+            <a:r>
+              <a:rPr lang="en-US" sz="1600" dirty="0" smtClean="0"/>
+              <a:t>TURN</a:t>
+            </a:r>
+            <a:endParaRPr lang="en-US" sz="1400" dirty="0"/>
+          </a:p>
+        </p:txBody>
+      </p:sp>
+      <p:cxnSp>
+        <p:nvCxnSpPr>
+          <p:cNvPr id="21" name="Straight Connector 20"/>
+          <p:cNvCxnSpPr>
+            <a:endCxn id="19" idx="1"/>
+          </p:cNvCxnSpPr>
+          <p:nvPr/>
+        </p:nvCxnSpPr>
+        <p:spPr>
+          <a:xfrm>
+            <a:off x="5748929" y="3384770"/>
+            <a:ext cx="0" cy="664581"/>
+          </a:xfrm>
+          <a:prstGeom prst="line">
+            <a:avLst/>
+          </a:prstGeom>
+          <a:ln>
+            <a:prstDash val="sysDash"/>
+          </a:ln>
+        </p:spPr>
+        <p:style>
+          <a:lnRef idx="1">
+            <a:schemeClr val="dk1"/>
+          </a:lnRef>
+          <a:fillRef idx="0">
+            <a:schemeClr val="dk1"/>
+          </a:fillRef>
+          <a:effectRef idx="0">
+            <a:schemeClr val="dk1"/>
+          </a:effectRef>
+          <a:fontRef idx="minor">
+            <a:schemeClr val="tx1"/>
+          </a:fontRef>
+        </p:style>
+      </p:cxnSp>
+      <p:sp>
+        <p:nvSpPr>
+          <p:cNvPr id="24" name="Rectangle 23"/>
+          <p:cNvSpPr/>
+          <p:nvPr/>
+        </p:nvSpPr>
+        <p:spPr>
+          <a:xfrm>
+            <a:off x="4888636" y="1708375"/>
+            <a:ext cx="873946" cy="1676395"/>
+          </a:xfrm>
+          <a:prstGeom prst="rect">
+            <a:avLst/>
+          </a:prstGeom>
+        </p:spPr>
+        <p:style>
+          <a:lnRef idx="2">
+            <a:schemeClr val="dk1"/>
+          </a:lnRef>
+          <a:fillRef idx="1">
+            <a:schemeClr val="lt1"/>
+          </a:fillRef>
+          <a:effectRef idx="0">
+            <a:schemeClr val="dk1"/>
+          </a:effectRef>
+          <a:fontRef idx="minor">
+            <a:schemeClr val="dk1"/>
+          </a:fontRef>
+        </p:style>
+        <p:txBody>
+          <a:bodyPr rtlCol="0" anchor="ctr"/>
+          <a:lstStyle/>
+          <a:p>
+            <a:pPr algn="ctr"/>
+            <a:r>
+              <a:rPr lang="en-US" sz="1600" dirty="0" smtClean="0"/>
+              <a:t>SSRC #3</a:t>
+            </a:r>
+            <a:endParaRPr lang="en-US" sz="1400" dirty="0">
+              <a:latin typeface="+mj-lt"/>
+            </a:endParaRPr>
+          </a:p>
+        </p:txBody>
+      </p:sp>
+      <p:sp>
+        <p:nvSpPr>
+          <p:cNvPr id="25" name="Rectangle 24"/>
+          <p:cNvSpPr/>
+          <p:nvPr/>
+        </p:nvSpPr>
+        <p:spPr>
+          <a:xfrm>
+            <a:off x="5748928" y="1708375"/>
+            <a:ext cx="873946" cy="1676395"/>
+          </a:xfrm>
+          <a:prstGeom prst="rect">
+            <a:avLst/>
+          </a:prstGeom>
+        </p:spPr>
+        <p:style>
+          <a:lnRef idx="2">
+            <a:schemeClr val="dk1"/>
+          </a:lnRef>
+          <a:fillRef idx="1">
+            <a:schemeClr val="lt1"/>
+          </a:fillRef>
+          <a:effectRef idx="0">
+            <a:schemeClr val="dk1"/>
+          </a:effectRef>
+          <a:fontRef idx="minor">
+            <a:schemeClr val="dk1"/>
+          </a:fontRef>
+        </p:style>
+        <p:txBody>
+          <a:bodyPr rtlCol="0" anchor="ctr"/>
+          <a:lstStyle/>
+          <a:p>
+            <a:pPr algn="ctr"/>
+            <a:r>
+              <a:rPr lang="en-US" sz="1600" dirty="0" smtClean="0"/>
+              <a:t>SSRC #4</a:t>
+            </a:r>
+            <a:endParaRPr lang="en-US" sz="1400" dirty="0">
+              <a:latin typeface="+mj-lt"/>
+            </a:endParaRPr>
+          </a:p>
+        </p:txBody>
+      </p:sp>
+    </p:spTree>
+    <p:extLst>
+      <p:ext uri="{BB962C8B-B14F-4D97-AF65-F5344CB8AC3E}">
+        <p14:creationId xmlns:p14="http://schemas.microsoft.com/office/powerpoint/2010/main" val="3019611239"/>
       </p:ext>
     </p:extLst>
   </p:cSld>

</xml_diff>

<commit_message>
updating RTP stack figures
</commit_message>
<xml_diff>
--- a/graphs/source/chap5-src.pptx
+++ b/graphs/source/chap5-src.pptx
@@ -292,7 +292,7 @@
           <a:p>
             <a:fld id="{CE2D3545-AE21-7247-8426-4B1172E482C1}" type="datetimeFigureOut">
               <a:rPr lang="en-US" smtClean="0"/>
-              <a:t>8/24/13</a:t>
+              <a:t>8/25/13</a:t>
             </a:fld>
             <a:endParaRPr lang="en-US"/>
           </a:p>
@@ -462,7 +462,7 @@
           <a:p>
             <a:fld id="{CE2D3545-AE21-7247-8426-4B1172E482C1}" type="datetimeFigureOut">
               <a:rPr lang="en-US" smtClean="0"/>
-              <a:t>8/24/13</a:t>
+              <a:t>8/25/13</a:t>
             </a:fld>
             <a:endParaRPr lang="en-US"/>
           </a:p>
@@ -642,7 +642,7 @@
           <a:p>
             <a:fld id="{CE2D3545-AE21-7247-8426-4B1172E482C1}" type="datetimeFigureOut">
               <a:rPr lang="en-US" smtClean="0"/>
-              <a:t>8/24/13</a:t>
+              <a:t>8/25/13</a:t>
             </a:fld>
             <a:endParaRPr lang="en-US"/>
           </a:p>
@@ -812,7 +812,7 @@
           <a:p>
             <a:fld id="{CE2D3545-AE21-7247-8426-4B1172E482C1}" type="datetimeFigureOut">
               <a:rPr lang="en-US" smtClean="0"/>
-              <a:t>8/24/13</a:t>
+              <a:t>8/25/13</a:t>
             </a:fld>
             <a:endParaRPr lang="en-US"/>
           </a:p>
@@ -1058,7 +1058,7 @@
           <a:p>
             <a:fld id="{CE2D3545-AE21-7247-8426-4B1172E482C1}" type="datetimeFigureOut">
               <a:rPr lang="en-US" smtClean="0"/>
-              <a:t>8/24/13</a:t>
+              <a:t>8/25/13</a:t>
             </a:fld>
             <a:endParaRPr lang="en-US"/>
           </a:p>
@@ -1346,7 +1346,7 @@
           <a:p>
             <a:fld id="{CE2D3545-AE21-7247-8426-4B1172E482C1}" type="datetimeFigureOut">
               <a:rPr lang="en-US" smtClean="0"/>
-              <a:t>8/24/13</a:t>
+              <a:t>8/25/13</a:t>
             </a:fld>
             <a:endParaRPr lang="en-US"/>
           </a:p>
@@ -1768,7 +1768,7 @@
           <a:p>
             <a:fld id="{CE2D3545-AE21-7247-8426-4B1172E482C1}" type="datetimeFigureOut">
               <a:rPr lang="en-US" smtClean="0"/>
-              <a:t>8/24/13</a:t>
+              <a:t>8/25/13</a:t>
             </a:fld>
             <a:endParaRPr lang="en-US"/>
           </a:p>
@@ -1886,7 +1886,7 @@
           <a:p>
             <a:fld id="{CE2D3545-AE21-7247-8426-4B1172E482C1}" type="datetimeFigureOut">
               <a:rPr lang="en-US" smtClean="0"/>
-              <a:t>8/24/13</a:t>
+              <a:t>8/25/13</a:t>
             </a:fld>
             <a:endParaRPr lang="en-US"/>
           </a:p>
@@ -1981,7 +1981,7 @@
           <a:p>
             <a:fld id="{CE2D3545-AE21-7247-8426-4B1172E482C1}" type="datetimeFigureOut">
               <a:rPr lang="en-US" smtClean="0"/>
-              <a:t>8/24/13</a:t>
+              <a:t>8/25/13</a:t>
             </a:fld>
             <a:endParaRPr lang="en-US"/>
           </a:p>
@@ -2258,7 +2258,7 @@
           <a:p>
             <a:fld id="{CE2D3545-AE21-7247-8426-4B1172E482C1}" type="datetimeFigureOut">
               <a:rPr lang="en-US" smtClean="0"/>
-              <a:t>8/24/13</a:t>
+              <a:t>8/25/13</a:t>
             </a:fld>
             <a:endParaRPr lang="en-US"/>
           </a:p>
@@ -2515,7 +2515,7 @@
           <a:p>
             <a:fld id="{CE2D3545-AE21-7247-8426-4B1172E482C1}" type="datetimeFigureOut">
               <a:rPr lang="en-US" smtClean="0"/>
-              <a:t>8/24/13</a:t>
+              <a:t>8/25/13</a:t>
             </a:fld>
             <a:endParaRPr lang="en-US"/>
           </a:p>
@@ -2733,7 +2733,7 @@
           <a:p>
             <a:fld id="{CE2D3545-AE21-7247-8426-4B1172E482C1}" type="datetimeFigureOut">
               <a:rPr lang="en-US" smtClean="0"/>
-              <a:t>8/24/13</a:t>
+              <a:t>8/25/13</a:t>
             </a:fld>
             <a:endParaRPr lang="en-US"/>
           </a:p>
@@ -5800,8 +5800,8 @@
         </p:nvSpPr>
         <p:spPr>
           <a:xfrm>
-            <a:off x="1218327" y="5052177"/>
-            <a:ext cx="5404547" cy="831370"/>
+            <a:off x="358037" y="5052177"/>
+            <a:ext cx="8558942" cy="831370"/>
           </a:xfrm>
           <a:prstGeom prst="rect">
             <a:avLst/>
@@ -5827,14 +5827,10 @@
           <a:p>
             <a:pPr algn="ctr"/>
             <a:r>
-              <a:rPr lang="en-US" dirty="0" smtClean="0"/>
-              <a:t>Internet Protocol </a:t>
-            </a:r>
-            <a:r>
               <a:rPr lang="en-US" dirty="0" smtClean="0">
                 <a:latin typeface="+mj-lt"/>
               </a:rPr>
-              <a:t>(IP)</a:t>
+              <a:t>IP</a:t>
             </a:r>
             <a:endParaRPr lang="en-US" sz="1600" dirty="0">
               <a:latin typeface="+mj-lt"/>
@@ -5850,8 +5846,8 @@
         </p:nvSpPr>
         <p:spPr>
           <a:xfrm>
-            <a:off x="1218327" y="4220807"/>
-            <a:ext cx="5404547" cy="831370"/>
+            <a:off x="358036" y="4220807"/>
+            <a:ext cx="6524288" cy="831370"/>
           </a:xfrm>
           <a:prstGeom prst="rect">
             <a:avLst/>
@@ -5877,14 +5873,10 @@
           <a:p>
             <a:pPr algn="ctr"/>
             <a:r>
-              <a:rPr lang="en-US" dirty="0" smtClean="0"/>
-              <a:t>User Datagram Protocol </a:t>
-            </a:r>
-            <a:r>
               <a:rPr lang="en-US" dirty="0" smtClean="0">
                 <a:latin typeface="+mj-lt"/>
               </a:rPr>
-              <a:t>(UDP)</a:t>
+              <a:t>UDP</a:t>
             </a:r>
             <a:endParaRPr lang="en-US" sz="1600" dirty="0">
               <a:latin typeface="+mj-lt"/>
@@ -5900,7 +5892,7 @@
         </p:nvSpPr>
         <p:spPr>
           <a:xfrm>
-            <a:off x="1218328" y="3389437"/>
+            <a:off x="358038" y="3389437"/>
             <a:ext cx="1936070" cy="831370"/>
           </a:xfrm>
           <a:prstGeom prst="rect">
@@ -5950,7 +5942,7 @@
         </p:nvSpPr>
         <p:spPr>
           <a:xfrm>
-            <a:off x="3154399" y="3389437"/>
+            <a:off x="2294109" y="3389437"/>
             <a:ext cx="3468476" cy="831370"/>
           </a:xfrm>
           <a:prstGeom prst="rect">
@@ -5983,14 +5975,10 @@
           <a:p>
             <a:pPr algn="ctr"/>
             <a:r>
-              <a:rPr lang="en-US" dirty="0" smtClean="0"/>
-              <a:t>Real-time Transport Protocol</a:t>
-            </a:r>
-            <a:r>
               <a:rPr lang="en-US" dirty="0" smtClean="0">
                 <a:latin typeface="+mj-lt"/>
               </a:rPr>
-              <a:t> (RTP)</a:t>
+              <a:t>RTP</a:t>
             </a:r>
             <a:endParaRPr lang="en-US" sz="1600" dirty="0">
               <a:latin typeface="+mj-lt"/>
@@ -6006,7 +5994,7 @@
         </p:nvSpPr>
         <p:spPr>
           <a:xfrm>
-            <a:off x="4028345" y="1708375"/>
+            <a:off x="3168055" y="1708375"/>
             <a:ext cx="873946" cy="1676395"/>
           </a:xfrm>
           <a:prstGeom prst="rect">
@@ -6050,7 +6038,7 @@
         </p:nvSpPr>
         <p:spPr>
           <a:xfrm>
-            <a:off x="3154399" y="1708375"/>
+            <a:off x="2294109" y="1708375"/>
             <a:ext cx="873946" cy="1676395"/>
           </a:xfrm>
           <a:prstGeom prst="rect">
@@ -6088,39 +6076,13 @@
       </p:sp>
       <p:sp>
         <p:nvSpPr>
-          <p:cNvPr id="18" name="TextBox 17"/>
-          <p:cNvSpPr txBox="1"/>
-          <p:nvPr/>
-        </p:nvSpPr>
-        <p:spPr>
-          <a:xfrm>
-            <a:off x="8152276" y="1420074"/>
-            <a:ext cx="184666" cy="369332"/>
-          </a:xfrm>
-          <a:prstGeom prst="rect">
-            <a:avLst/>
-          </a:prstGeom>
-          <a:noFill/>
-        </p:spPr>
-        <p:txBody>
-          <a:bodyPr wrap="none" rtlCol="0">
-            <a:spAutoFit/>
-          </a:bodyPr>
-          <a:lstStyle/>
-          <a:p>
-            <a:endParaRPr lang="en-US" dirty="0"/>
-          </a:p>
-        </p:txBody>
-      </p:sp>
-      <p:sp>
-        <p:nvSpPr>
           <p:cNvPr id="19" name="Rectangle 18"/>
           <p:cNvSpPr/>
           <p:nvPr/>
         </p:nvSpPr>
         <p:spPr>
           <a:xfrm>
-            <a:off x="5748929" y="3877894"/>
+            <a:off x="4888639" y="3877894"/>
             <a:ext cx="873946" cy="342914"/>
           </a:xfrm>
           <a:prstGeom prst="rect">
@@ -6164,7 +6126,7 @@
         </p:nvCxnSpPr>
         <p:spPr>
           <a:xfrm>
-            <a:off x="5748929" y="3384770"/>
+            <a:off x="4888639" y="3384770"/>
             <a:ext cx="0" cy="664581"/>
           </a:xfrm>
           <a:prstGeom prst="line">
@@ -6197,7 +6159,7 @@
         </p:nvSpPr>
         <p:spPr>
           <a:xfrm>
-            <a:off x="4888636" y="1708375"/>
+            <a:off x="4028346" y="1708375"/>
             <a:ext cx="873946" cy="1676395"/>
           </a:xfrm>
           <a:prstGeom prst="rect">
@@ -6241,7 +6203,7 @@
         </p:nvSpPr>
         <p:spPr>
           <a:xfrm>
-            <a:off x="5748928" y="1708375"/>
+            <a:off x="4888638" y="1708375"/>
             <a:ext cx="873946" cy="1676395"/>
           </a:xfrm>
           <a:prstGeom prst="rect">
@@ -6270,6 +6232,222 @@
             <a:r>
               <a:rPr lang="en-US" sz="1600" dirty="0" smtClean="0"/>
               <a:t>SSRC #4</a:t>
+            </a:r>
+            <a:endParaRPr lang="en-US" sz="1400" dirty="0">
+              <a:latin typeface="+mj-lt"/>
+            </a:endParaRPr>
+          </a:p>
+        </p:txBody>
+      </p:sp>
+      <p:sp>
+        <p:nvSpPr>
+          <p:cNvPr id="13" name="Rectangle 12"/>
+          <p:cNvSpPr/>
+          <p:nvPr/>
+        </p:nvSpPr>
+        <p:spPr>
+          <a:xfrm>
+            <a:off x="6882324" y="4220808"/>
+            <a:ext cx="2034654" cy="831370"/>
+          </a:xfrm>
+          <a:prstGeom prst="rect">
+            <a:avLst/>
+          </a:prstGeom>
+        </p:spPr>
+        <p:style>
+          <a:lnRef idx="2">
+            <a:schemeClr val="dk1"/>
+          </a:lnRef>
+          <a:fillRef idx="1">
+            <a:schemeClr val="lt1"/>
+          </a:fillRef>
+          <a:effectRef idx="0">
+            <a:schemeClr val="dk1"/>
+          </a:effectRef>
+          <a:fontRef idx="minor">
+            <a:schemeClr val="dk1"/>
+          </a:fontRef>
+        </p:style>
+        <p:txBody>
+          <a:bodyPr rtlCol="0" anchor="ctr"/>
+          <a:lstStyle/>
+          <a:p>
+            <a:pPr algn="ctr"/>
+            <a:r>
+              <a:rPr lang="en-US" dirty="0" smtClean="0">
+                <a:latin typeface="+mj-lt"/>
+              </a:rPr>
+              <a:t>TCP</a:t>
+            </a:r>
+            <a:endParaRPr lang="en-US" sz="1600" dirty="0">
+              <a:latin typeface="+mj-lt"/>
+            </a:endParaRPr>
+          </a:p>
+        </p:txBody>
+      </p:sp>
+      <p:sp>
+        <p:nvSpPr>
+          <p:cNvPr id="14" name="Rectangle 13"/>
+          <p:cNvSpPr/>
+          <p:nvPr/>
+        </p:nvSpPr>
+        <p:spPr>
+          <a:xfrm>
+            <a:off x="6540939" y="3389438"/>
+            <a:ext cx="2376039" cy="826702"/>
+          </a:xfrm>
+          <a:prstGeom prst="rect">
+            <a:avLst/>
+          </a:prstGeom>
+        </p:spPr>
+        <p:style>
+          <a:lnRef idx="2">
+            <a:schemeClr val="dk1"/>
+          </a:lnRef>
+          <a:fillRef idx="1">
+            <a:schemeClr val="lt1"/>
+          </a:fillRef>
+          <a:effectRef idx="0">
+            <a:schemeClr val="dk1"/>
+          </a:effectRef>
+          <a:fontRef idx="minor">
+            <a:schemeClr val="dk1"/>
+          </a:fontRef>
+        </p:style>
+        <p:txBody>
+          <a:bodyPr rtlCol="0" anchor="ctr"/>
+          <a:lstStyle/>
+          <a:p>
+            <a:pPr algn="ctr"/>
+            <a:r>
+              <a:rPr lang="en-US" sz="1600" dirty="0" smtClean="0"/>
+              <a:t>Signaling Protocol</a:t>
+            </a:r>
+            <a:endParaRPr lang="en-US" sz="1600" dirty="0">
+              <a:latin typeface="+mj-lt"/>
+            </a:endParaRPr>
+          </a:p>
+        </p:txBody>
+      </p:sp>
+      <p:sp>
+        <p:nvSpPr>
+          <p:cNvPr id="17" name="Rectangle 16"/>
+          <p:cNvSpPr/>
+          <p:nvPr/>
+        </p:nvSpPr>
+        <p:spPr>
+          <a:xfrm>
+            <a:off x="5762584" y="3384770"/>
+            <a:ext cx="778355" cy="831370"/>
+          </a:xfrm>
+          <a:prstGeom prst="rect">
+            <a:avLst/>
+          </a:prstGeom>
+        </p:spPr>
+        <p:style>
+          <a:lnRef idx="2">
+            <a:schemeClr val="dk1"/>
+          </a:lnRef>
+          <a:fillRef idx="1">
+            <a:schemeClr val="lt1"/>
+          </a:fillRef>
+          <a:effectRef idx="0">
+            <a:schemeClr val="dk1"/>
+          </a:effectRef>
+          <a:fontRef idx="minor">
+            <a:schemeClr val="dk1"/>
+          </a:fontRef>
+        </p:style>
+        <p:txBody>
+          <a:bodyPr rtlCol="0" anchor="ctr"/>
+          <a:lstStyle/>
+          <a:p>
+            <a:pPr algn="ctr"/>
+            <a:r>
+              <a:rPr lang="en-US" sz="1600" dirty="0" smtClean="0">
+                <a:latin typeface="+mj-lt"/>
+              </a:rPr>
+              <a:t>DTLS</a:t>
+            </a:r>
+            <a:endParaRPr lang="en-US" sz="1600" dirty="0">
+              <a:latin typeface="+mj-lt"/>
+            </a:endParaRPr>
+          </a:p>
+        </p:txBody>
+      </p:sp>
+      <p:sp>
+        <p:nvSpPr>
+          <p:cNvPr id="6" name="TextBox 5"/>
+          <p:cNvSpPr txBox="1"/>
+          <p:nvPr/>
+        </p:nvSpPr>
+        <p:spPr>
+          <a:xfrm>
+            <a:off x="5984514" y="5883547"/>
+            <a:ext cx="2954655" cy="307777"/>
+          </a:xfrm>
+          <a:prstGeom prst="rect">
+            <a:avLst/>
+          </a:prstGeom>
+          <a:noFill/>
+        </p:spPr>
+        <p:txBody>
+          <a:bodyPr wrap="none" rtlCol="0">
+            <a:spAutoFit/>
+          </a:bodyPr>
+          <a:lstStyle/>
+          <a:p>
+            <a:r>
+              <a:rPr lang="en-US" sz="1400" dirty="0" smtClean="0">
+                <a:latin typeface="+mj-lt"/>
+              </a:rPr>
+              <a:t>Note:</a:t>
+            </a:r>
+            <a:r>
+              <a:rPr lang="en-US" sz="1400" dirty="0" smtClean="0"/>
+              <a:t> *RTP can be sent over TCP</a:t>
+            </a:r>
+            <a:endParaRPr lang="en-US" sz="1400" dirty="0"/>
+          </a:p>
+        </p:txBody>
+      </p:sp>
+      <p:sp>
+        <p:nvSpPr>
+          <p:cNvPr id="20" name="Rectangle 19"/>
+          <p:cNvSpPr/>
+          <p:nvPr/>
+        </p:nvSpPr>
+        <p:spPr>
+          <a:xfrm>
+            <a:off x="5762580" y="1708375"/>
+            <a:ext cx="778359" cy="1676395"/>
+          </a:xfrm>
+          <a:prstGeom prst="rect">
+            <a:avLst/>
+          </a:prstGeom>
+        </p:spPr>
+        <p:style>
+          <a:lnRef idx="2">
+            <a:schemeClr val="dk1"/>
+          </a:lnRef>
+          <a:fillRef idx="1">
+            <a:schemeClr val="lt1"/>
+          </a:fillRef>
+          <a:effectRef idx="0">
+            <a:schemeClr val="dk1"/>
+          </a:effectRef>
+          <a:fontRef idx="minor">
+            <a:schemeClr val="dk1"/>
+          </a:fontRef>
+        </p:style>
+        <p:txBody>
+          <a:bodyPr vert="vert270" rtlCol="0" anchor="ctr"/>
+          <a:lstStyle/>
+          <a:p>
+            <a:pPr algn="ctr"/>
+            <a:r>
+              <a:rPr lang="en-US" sz="1600" dirty="0" smtClean="0"/>
+              <a:t>Secure RTP Keying</a:t>
             </a:r>
             <a:endParaRPr lang="en-US" sz="1400" dirty="0">
               <a:latin typeface="+mj-lt"/>

</xml_diff>

<commit_message>
chap3: added description to relationship of RTP with the rest of the stack
additionally updated:
+ bib
+ figures (PDF, pptx)
</commit_message>
<xml_diff>
--- a/graphs/source/chap5-src.pptx
+++ b/graphs/source/chap5-src.pptx
@@ -5825,15 +5825,38 @@
           <a:bodyPr rtlCol="0" anchor="ctr"/>
           <a:lstStyle/>
           <a:p>
-            <a:pPr algn="ctr"/>
+            <a:pPr lvl="0" algn="ctr"/>
+            <a:r>
+              <a:rPr lang="en-US" dirty="0">
+                <a:solidFill>
+                  <a:prstClr val="black"/>
+                </a:solidFill>
+              </a:rPr>
+              <a:t>Internet Protocol </a:t>
+            </a:r>
+            <a:r>
+              <a:rPr lang="en-US" dirty="0">
+                <a:solidFill>
+                  <a:prstClr val="black"/>
+                </a:solidFill>
+                <a:latin typeface="Nexa Bold"/>
+              </a:rPr>
+              <a:t>(IP</a:t>
+            </a:r>
             <a:r>
               <a:rPr lang="en-US" dirty="0" smtClean="0">
-                <a:latin typeface="+mj-lt"/>
+                <a:solidFill>
+                  <a:prstClr val="black"/>
+                </a:solidFill>
+                <a:latin typeface="Nexa Bold"/>
               </a:rPr>
-              <a:t>IP</a:t>
+              <a:t>)</a:t>
             </a:r>
             <a:endParaRPr lang="en-US" sz="1600" dirty="0">
-              <a:latin typeface="+mj-lt"/>
+              <a:solidFill>
+                <a:prstClr val="black"/>
+              </a:solidFill>
+              <a:latin typeface="Nexa Bold"/>
             </a:endParaRPr>
           </a:p>
         </p:txBody>
@@ -5871,15 +5894,29 @@
           <a:bodyPr rtlCol="0" anchor="ctr"/>
           <a:lstStyle/>
           <a:p>
-            <a:pPr algn="ctr"/>
-            <a:r>
-              <a:rPr lang="en-US" dirty="0" smtClean="0">
-                <a:latin typeface="+mj-lt"/>
+            <a:pPr lvl="0" algn="ctr"/>
+            <a:r>
+              <a:rPr lang="en-US" dirty="0">
+                <a:solidFill>
+                  <a:prstClr val="black"/>
+                </a:solidFill>
               </a:rPr>
-              <a:t>UDP</a:t>
+              <a:t>User Datagram Protocol </a:t>
+            </a:r>
+            <a:r>
+              <a:rPr lang="en-US" dirty="0">
+                <a:solidFill>
+                  <a:prstClr val="black"/>
+                </a:solidFill>
+                <a:latin typeface="Nexa Bold"/>
+              </a:rPr>
+              <a:t>(UDP)</a:t>
             </a:r>
             <a:endParaRPr lang="en-US" sz="1600" dirty="0">
-              <a:latin typeface="+mj-lt"/>
+              <a:solidFill>
+                <a:prstClr val="black"/>
+              </a:solidFill>
+              <a:latin typeface="Nexa Bold"/>
             </a:endParaRPr>
           </a:p>
         </p:txBody>
@@ -5978,8 +6015,11 @@
               <a:rPr lang="en-US" dirty="0" smtClean="0">
                 <a:latin typeface="+mj-lt"/>
               </a:rPr>
-              <a:t>RTP</a:t>
-            </a:r>
+              <a:t>                     RTP</a:t>
+            </a:r>
+          </a:p>
+          <a:p>
+            <a:pPr algn="ctr"/>
             <a:endParaRPr lang="en-US" sz="1600" dirty="0">
               <a:latin typeface="+mj-lt"/>
             </a:endParaRPr>
@@ -6082,8 +6122,8 @@
         </p:nvSpPr>
         <p:spPr>
           <a:xfrm>
-            <a:off x="4888639" y="3877894"/>
-            <a:ext cx="873946" cy="342914"/>
+            <a:off x="2294108" y="3877894"/>
+            <a:ext cx="1747893" cy="342914"/>
           </a:xfrm>
           <a:prstGeom prst="rect">
             <a:avLst/>
@@ -6109,25 +6149,27 @@
           <a:p>
             <a:pPr algn="ctr"/>
             <a:r>
-              <a:rPr lang="en-US" sz="1600" dirty="0" smtClean="0"/>
+              <a:rPr lang="en-US" sz="1600" dirty="0" smtClean="0">
+                <a:latin typeface="+mj-lt"/>
+              </a:rPr>
               <a:t>TURN</a:t>
             </a:r>
-            <a:endParaRPr lang="en-US" sz="1400" dirty="0"/>
+            <a:endParaRPr lang="en-US" sz="1400" dirty="0">
+              <a:latin typeface="+mj-lt"/>
+            </a:endParaRPr>
           </a:p>
         </p:txBody>
       </p:sp>
       <p:cxnSp>
         <p:nvCxnSpPr>
           <p:cNvPr id="21" name="Straight Connector 20"/>
-          <p:cNvCxnSpPr>
-            <a:endCxn id="19" idx="1"/>
-          </p:cNvCxnSpPr>
+          <p:cNvCxnSpPr/>
           <p:nvPr/>
         </p:nvCxnSpPr>
         <p:spPr>
-          <a:xfrm>
-            <a:off x="4888639" y="3384770"/>
-            <a:ext cx="0" cy="664581"/>
+          <a:xfrm flipH="1">
+            <a:off x="2294108" y="3384770"/>
+            <a:ext cx="2" cy="664581"/>
           </a:xfrm>
           <a:prstGeom prst="line">
             <a:avLst/>
@@ -6274,10 +6316,14 @@
           <a:p>
             <a:pPr algn="ctr"/>
             <a:r>
+              <a:rPr lang="en-US" dirty="0" smtClean="0"/>
+              <a:t>Transmission Control Protocol </a:t>
+            </a:r>
+            <a:r>
               <a:rPr lang="en-US" dirty="0" smtClean="0">
                 <a:latin typeface="+mj-lt"/>
               </a:rPr>
-              <a:t>TCP</a:t>
+              <a:t>(TCP)</a:t>
             </a:r>
             <a:endParaRPr lang="en-US" sz="1600" dirty="0">
               <a:latin typeface="+mj-lt"/>
@@ -6320,12 +6366,21 @@
           <a:p>
             <a:pPr algn="ctr"/>
             <a:r>
-              <a:rPr lang="en-US" sz="1600" dirty="0" smtClean="0"/>
-              <a:t>Signaling Protocol</a:t>
-            </a:r>
-            <a:endParaRPr lang="en-US" sz="1600" dirty="0">
-              <a:latin typeface="+mj-lt"/>
-            </a:endParaRPr>
+              <a:rPr lang="en-US" sz="1600" i="1" dirty="0" smtClean="0"/>
+              <a:t>Signaling </a:t>
+            </a:r>
+            <a:r>
+              <a:rPr lang="en-US" sz="1600" i="1" dirty="0" smtClean="0"/>
+              <a:t>Protocol</a:t>
+            </a:r>
+          </a:p>
+          <a:p>
+            <a:pPr algn="ctr"/>
+            <a:r>
+              <a:rPr lang="en-US" sz="1200" i="1" dirty="0" smtClean="0"/>
+              <a:t>(e.g., SIP, Jingle, …)</a:t>
+            </a:r>
+            <a:endParaRPr lang="en-US" sz="1200" i="1" dirty="0"/>
           </a:p>
         </p:txBody>
       </p:sp>
@@ -6383,8 +6438,8 @@
         </p:nvSpPr>
         <p:spPr>
           <a:xfrm>
-            <a:off x="5984514" y="5883547"/>
-            <a:ext cx="2954655" cy="307777"/>
+            <a:off x="5762585" y="6211669"/>
+            <a:ext cx="3154390" cy="646331"/>
           </a:xfrm>
           <a:prstGeom prst="rect">
             <a:avLst/>
@@ -6392,22 +6447,38 @@
           <a:noFill/>
         </p:spPr>
         <p:txBody>
-          <a:bodyPr wrap="none" rtlCol="0">
+          <a:bodyPr wrap="square" rtlCol="0">
             <a:spAutoFit/>
           </a:bodyPr>
           <a:lstStyle/>
           <a:p>
-            <a:r>
-              <a:rPr lang="en-US" sz="1400" dirty="0" smtClean="0">
+            <a:pPr algn="just"/>
+            <a:r>
+              <a:rPr lang="en-US" sz="1200" dirty="0" smtClean="0">
                 <a:latin typeface="+mj-lt"/>
               </a:rPr>
               <a:t>Note:</a:t>
             </a:r>
             <a:r>
-              <a:rPr lang="en-US" sz="1400" dirty="0" smtClean="0"/>
-              <a:t> *RTP can be sent over TCP</a:t>
-            </a:r>
-            <a:endParaRPr lang="en-US" sz="1400" dirty="0"/>
+              <a:rPr lang="en-US" sz="1200" dirty="0" smtClean="0"/>
+              <a:t> *RTP can be sent over UDP or TCP.</a:t>
+            </a:r>
+          </a:p>
+          <a:p>
+            <a:pPr algn="just"/>
+            <a:r>
+              <a:rPr lang="en-US" sz="1200" dirty="0" smtClean="0"/>
+              <a:t>Similarly, signaling </a:t>
+            </a:r>
+            <a:r>
+              <a:rPr lang="en-US" sz="1200" dirty="0"/>
+              <a:t>p</a:t>
+            </a:r>
+            <a:r>
+              <a:rPr lang="en-US" sz="1200" dirty="0" smtClean="0"/>
+              <a:t>rotocols can be designed to transmit over UDP or TCP.</a:t>
+            </a:r>
+            <a:endParaRPr lang="en-US" sz="1200" dirty="0"/>
           </a:p>
         </p:txBody>
       </p:sp>
@@ -6420,7 +6491,7 @@
         <p:spPr>
           <a:xfrm>
             <a:off x="5762580" y="1708375"/>
-            <a:ext cx="778359" cy="1676395"/>
+            <a:ext cx="1570372" cy="1676395"/>
           </a:xfrm>
           <a:prstGeom prst="rect">
             <a:avLst/>
@@ -6441,13 +6512,23 @@
           </a:fontRef>
         </p:style>
         <p:txBody>
-          <a:bodyPr vert="vert270" rtlCol="0" anchor="ctr"/>
+          <a:bodyPr vert="horz" rtlCol="0" anchor="ctr"/>
           <a:lstStyle/>
           <a:p>
             <a:pPr algn="ctr"/>
             <a:r>
               <a:rPr lang="en-US" sz="1600" dirty="0" smtClean="0"/>
-              <a:t>Secure RTP Keying</a:t>
+              <a:t>Secure RTP </a:t>
+            </a:r>
+            <a:r>
+              <a:rPr lang="en-US" sz="1600" dirty="0" smtClean="0">
+                <a:latin typeface="+mj-lt"/>
+              </a:rPr>
+              <a:t>(SRTP)</a:t>
+            </a:r>
+            <a:r>
+              <a:rPr lang="en-US" sz="1600" dirty="0" smtClean="0"/>
+              <a:t> Keying</a:t>
             </a:r>
             <a:endParaRPr lang="en-US" sz="1400" dirty="0">
               <a:latin typeface="+mj-lt"/>
@@ -6455,6 +6536,72 @@
           </a:p>
         </p:txBody>
       </p:sp>
+      <p:cxnSp>
+        <p:nvCxnSpPr>
+          <p:cNvPr id="11" name="Straight Connector 10"/>
+          <p:cNvCxnSpPr/>
+          <p:nvPr/>
+        </p:nvCxnSpPr>
+        <p:spPr>
+          <a:xfrm>
+            <a:off x="4028346" y="3389438"/>
+            <a:ext cx="0" cy="493124"/>
+          </a:xfrm>
+          <a:prstGeom prst="line">
+            <a:avLst/>
+          </a:prstGeom>
+          <a:ln>
+            <a:prstDash val="dash"/>
+          </a:ln>
+        </p:spPr>
+        <p:style>
+          <a:lnRef idx="1">
+            <a:schemeClr val="dk1"/>
+          </a:lnRef>
+          <a:fillRef idx="0">
+            <a:schemeClr val="dk1"/>
+          </a:fillRef>
+          <a:effectRef idx="0">
+            <a:schemeClr val="dk1"/>
+          </a:effectRef>
+          <a:fontRef idx="minor">
+            <a:schemeClr val="tx1"/>
+          </a:fontRef>
+        </p:style>
+      </p:cxnSp>
+      <p:cxnSp>
+        <p:nvCxnSpPr>
+          <p:cNvPr id="22" name="Straight Connector 21"/>
+          <p:cNvCxnSpPr/>
+          <p:nvPr/>
+        </p:nvCxnSpPr>
+        <p:spPr>
+          <a:xfrm>
+            <a:off x="3168055" y="3384770"/>
+            <a:ext cx="0" cy="493124"/>
+          </a:xfrm>
+          <a:prstGeom prst="line">
+            <a:avLst/>
+          </a:prstGeom>
+          <a:ln>
+            <a:prstDash val="dash"/>
+          </a:ln>
+        </p:spPr>
+        <p:style>
+          <a:lnRef idx="1">
+            <a:schemeClr val="dk1"/>
+          </a:lnRef>
+          <a:fillRef idx="0">
+            <a:schemeClr val="dk1"/>
+          </a:fillRef>
+          <a:effectRef idx="0">
+            <a:schemeClr val="dk1"/>
+          </a:effectRef>
+          <a:fontRef idx="minor">
+            <a:schemeClr val="tx1"/>
+          </a:fontRef>
+        </p:style>
+      </p:cxnSp>
     </p:spTree>
     <p:extLst>
       <p:ext uri="{BB962C8B-B14F-4D97-AF65-F5344CB8AC3E}">

</xml_diff>

<commit_message>
updating figures for monitoring and WebRTC
</commit_message>
<xml_diff>
--- a/graphs/source/chap5-src.pptx
+++ b/graphs/source/chap5-src.pptx
@@ -4,12 +4,17 @@
   <p:sldMasterIdLst>
     <p:sldMasterId id="2147483660" r:id="rId1"/>
   </p:sldMasterIdLst>
+  <p:notesMasterIdLst>
+    <p:notesMasterId r:id="rId9"/>
+  </p:notesMasterIdLst>
   <p:sldIdLst>
     <p:sldId id="256" r:id="rId2"/>
     <p:sldId id="257" r:id="rId3"/>
     <p:sldId id="258" r:id="rId4"/>
     <p:sldId id="259" r:id="rId5"/>
     <p:sldId id="260" r:id="rId6"/>
+    <p:sldId id="262" r:id="rId7"/>
+    <p:sldId id="261" r:id="rId8"/>
   </p:sldIdLst>
   <p:sldSz cx="9144000" cy="6858000" type="screen4x3"/>
   <p:notesSz cx="6858000" cy="9144000"/>
@@ -111,6 +116,440 @@
 </p:presentation>
 </file>
 
+<file path=ppt/notesMasters/notesMaster1.xml><?xml version="1.0" encoding="utf-8"?>
+<p:notesMaster xmlns:a="http://schemas.openxmlformats.org/drawingml/2006/main" xmlns:r="http://schemas.openxmlformats.org/officeDocument/2006/relationships" xmlns:p="http://schemas.openxmlformats.org/presentationml/2006/main">
+  <p:cSld>
+    <p:bg>
+      <p:bgRef idx="1001">
+        <a:schemeClr val="bg1"/>
+      </p:bgRef>
+    </p:bg>
+    <p:spTree>
+      <p:nvGrpSpPr>
+        <p:cNvPr id="1" name=""/>
+        <p:cNvGrpSpPr/>
+        <p:nvPr/>
+      </p:nvGrpSpPr>
+      <p:grpSpPr>
+        <a:xfrm>
+          <a:off x="0" y="0"/>
+          <a:ext cx="0" cy="0"/>
+          <a:chOff x="0" y="0"/>
+          <a:chExt cx="0" cy="0"/>
+        </a:xfrm>
+      </p:grpSpPr>
+      <p:sp>
+        <p:nvSpPr>
+          <p:cNvPr id="2" name="Header Placeholder 1"/>
+          <p:cNvSpPr>
+            <a:spLocks noGrp="1"/>
+          </p:cNvSpPr>
+          <p:nvPr>
+            <p:ph type="hdr" sz="quarter"/>
+          </p:nvPr>
+        </p:nvSpPr>
+        <p:spPr>
+          <a:xfrm>
+            <a:off x="0" y="0"/>
+            <a:ext cx="2971800" cy="457200"/>
+          </a:xfrm>
+          <a:prstGeom prst="rect">
+            <a:avLst/>
+          </a:prstGeom>
+        </p:spPr>
+        <p:txBody>
+          <a:bodyPr vert="horz" lIns="91440" tIns="45720" rIns="91440" bIns="45720" rtlCol="0"/>
+          <a:lstStyle>
+            <a:lvl1pPr algn="l">
+              <a:defRPr sz="1200"/>
+            </a:lvl1pPr>
+          </a:lstStyle>
+          <a:p>
+            <a:endParaRPr lang="en-US"/>
+          </a:p>
+        </p:txBody>
+      </p:sp>
+      <p:sp>
+        <p:nvSpPr>
+          <p:cNvPr id="3" name="Date Placeholder 2"/>
+          <p:cNvSpPr>
+            <a:spLocks noGrp="1"/>
+          </p:cNvSpPr>
+          <p:nvPr>
+            <p:ph type="dt" idx="1"/>
+          </p:nvPr>
+        </p:nvSpPr>
+        <p:spPr>
+          <a:xfrm>
+            <a:off x="3884613" y="0"/>
+            <a:ext cx="2971800" cy="457200"/>
+          </a:xfrm>
+          <a:prstGeom prst="rect">
+            <a:avLst/>
+          </a:prstGeom>
+        </p:spPr>
+        <p:txBody>
+          <a:bodyPr vert="horz" lIns="91440" tIns="45720" rIns="91440" bIns="45720" rtlCol="0"/>
+          <a:lstStyle>
+            <a:lvl1pPr algn="r">
+              <a:defRPr sz="1200"/>
+            </a:lvl1pPr>
+          </a:lstStyle>
+          <a:p>
+            <a:fld id="{7BA68311-98B2-8147-8E3D-5F9C91F16701}" type="datetimeFigureOut">
+              <a:rPr lang="en-US" smtClean="0"/>
+              <a:t>8/28/13</a:t>
+            </a:fld>
+            <a:endParaRPr lang="en-US"/>
+          </a:p>
+        </p:txBody>
+      </p:sp>
+      <p:sp>
+        <p:nvSpPr>
+          <p:cNvPr id="4" name="Slide Image Placeholder 3"/>
+          <p:cNvSpPr>
+            <a:spLocks noGrp="1" noRot="1" noChangeAspect="1"/>
+          </p:cNvSpPr>
+          <p:nvPr>
+            <p:ph type="sldImg" idx="2"/>
+          </p:nvPr>
+        </p:nvSpPr>
+        <p:spPr>
+          <a:xfrm>
+            <a:off x="1143000" y="685800"/>
+            <a:ext cx="4572000" cy="3429000"/>
+          </a:xfrm>
+          <a:prstGeom prst="rect">
+            <a:avLst/>
+          </a:prstGeom>
+          <a:noFill/>
+          <a:ln w="12700">
+            <a:solidFill>
+              <a:prstClr val="black"/>
+            </a:solidFill>
+          </a:ln>
+        </p:spPr>
+        <p:txBody>
+          <a:bodyPr vert="horz" lIns="91440" tIns="45720" rIns="91440" bIns="45720" rtlCol="0" anchor="ctr"/>
+          <a:lstStyle/>
+          <a:p>
+            <a:endParaRPr lang="en-US"/>
+          </a:p>
+        </p:txBody>
+      </p:sp>
+      <p:sp>
+        <p:nvSpPr>
+          <p:cNvPr id="5" name="Notes Placeholder 4"/>
+          <p:cNvSpPr>
+            <a:spLocks noGrp="1"/>
+          </p:cNvSpPr>
+          <p:nvPr>
+            <p:ph type="body" sz="quarter" idx="3"/>
+          </p:nvPr>
+        </p:nvSpPr>
+        <p:spPr>
+          <a:xfrm>
+            <a:off x="685800" y="4343400"/>
+            <a:ext cx="5486400" cy="4114800"/>
+          </a:xfrm>
+          <a:prstGeom prst="rect">
+            <a:avLst/>
+          </a:prstGeom>
+        </p:spPr>
+        <p:txBody>
+          <a:bodyPr vert="horz" lIns="91440" tIns="45720" rIns="91440" bIns="45720" rtlCol="0"/>
+          <a:lstStyle/>
+          <a:p>
+            <a:pPr lvl="0"/>
+            <a:r>
+              <a:rPr lang="en-US" smtClean="0"/>
+              <a:t>Click to edit Master text styles</a:t>
+            </a:r>
+          </a:p>
+          <a:p>
+            <a:pPr lvl="1"/>
+            <a:r>
+              <a:rPr lang="en-US" smtClean="0"/>
+              <a:t>Second level</a:t>
+            </a:r>
+          </a:p>
+          <a:p>
+            <a:pPr lvl="2"/>
+            <a:r>
+              <a:rPr lang="en-US" smtClean="0"/>
+              <a:t>Third level</a:t>
+            </a:r>
+          </a:p>
+          <a:p>
+            <a:pPr lvl="3"/>
+            <a:r>
+              <a:rPr lang="en-US" smtClean="0"/>
+              <a:t>Fourth level</a:t>
+            </a:r>
+          </a:p>
+          <a:p>
+            <a:pPr lvl="4"/>
+            <a:r>
+              <a:rPr lang="en-US" smtClean="0"/>
+              <a:t>Fifth level</a:t>
+            </a:r>
+            <a:endParaRPr lang="en-US"/>
+          </a:p>
+        </p:txBody>
+      </p:sp>
+      <p:sp>
+        <p:nvSpPr>
+          <p:cNvPr id="6" name="Footer Placeholder 5"/>
+          <p:cNvSpPr>
+            <a:spLocks noGrp="1"/>
+          </p:cNvSpPr>
+          <p:nvPr>
+            <p:ph type="ftr" sz="quarter" idx="4"/>
+          </p:nvPr>
+        </p:nvSpPr>
+        <p:spPr>
+          <a:xfrm>
+            <a:off x="0" y="8685213"/>
+            <a:ext cx="2971800" cy="457200"/>
+          </a:xfrm>
+          <a:prstGeom prst="rect">
+            <a:avLst/>
+          </a:prstGeom>
+        </p:spPr>
+        <p:txBody>
+          <a:bodyPr vert="horz" lIns="91440" tIns="45720" rIns="91440" bIns="45720" rtlCol="0" anchor="b"/>
+          <a:lstStyle>
+            <a:lvl1pPr algn="l">
+              <a:defRPr sz="1200"/>
+            </a:lvl1pPr>
+          </a:lstStyle>
+          <a:p>
+            <a:endParaRPr lang="en-US"/>
+          </a:p>
+        </p:txBody>
+      </p:sp>
+      <p:sp>
+        <p:nvSpPr>
+          <p:cNvPr id="7" name="Slide Number Placeholder 6"/>
+          <p:cNvSpPr>
+            <a:spLocks noGrp="1"/>
+          </p:cNvSpPr>
+          <p:nvPr>
+            <p:ph type="sldNum" sz="quarter" idx="5"/>
+          </p:nvPr>
+        </p:nvSpPr>
+        <p:spPr>
+          <a:xfrm>
+            <a:off x="3884613" y="8685213"/>
+            <a:ext cx="2971800" cy="457200"/>
+          </a:xfrm>
+          <a:prstGeom prst="rect">
+            <a:avLst/>
+          </a:prstGeom>
+        </p:spPr>
+        <p:txBody>
+          <a:bodyPr vert="horz" lIns="91440" tIns="45720" rIns="91440" bIns="45720" rtlCol="0" anchor="b"/>
+          <a:lstStyle>
+            <a:lvl1pPr algn="r">
+              <a:defRPr sz="1200"/>
+            </a:lvl1pPr>
+          </a:lstStyle>
+          <a:p>
+            <a:fld id="{8AED5117-C3DB-DC46-B433-F1C323FD7F80}" type="slidenum">
+              <a:rPr lang="en-US" smtClean="0"/>
+              <a:t>‹#›</a:t>
+            </a:fld>
+            <a:endParaRPr lang="en-US"/>
+          </a:p>
+        </p:txBody>
+      </p:sp>
+    </p:spTree>
+    <p:extLst>
+      <p:ext uri="{BB962C8B-B14F-4D97-AF65-F5344CB8AC3E}">
+        <p14:creationId xmlns:p14="http://schemas.microsoft.com/office/powerpoint/2010/main" val="3287986016"/>
+      </p:ext>
+    </p:extLst>
+  </p:cSld>
+  <p:clrMap bg1="lt1" tx1="dk1" bg2="lt2" tx2="dk2" accent1="accent1" accent2="accent2" accent3="accent3" accent4="accent4" accent5="accent5" accent6="accent6" hlink="hlink" folHlink="folHlink"/>
+  <p:notesStyle>
+    <a:lvl1pPr marL="0" algn="l" defTabSz="457200" rtl="0" eaLnBrk="1" latinLnBrk="0" hangingPunct="1">
+      <a:defRPr sz="1200" kern="1200">
+        <a:solidFill>
+          <a:schemeClr val="tx1"/>
+        </a:solidFill>
+        <a:latin typeface="+mn-lt"/>
+        <a:ea typeface="+mn-ea"/>
+        <a:cs typeface="+mn-cs"/>
+      </a:defRPr>
+    </a:lvl1pPr>
+    <a:lvl2pPr marL="457200" algn="l" defTabSz="457200" rtl="0" eaLnBrk="1" latinLnBrk="0" hangingPunct="1">
+      <a:defRPr sz="1200" kern="1200">
+        <a:solidFill>
+          <a:schemeClr val="tx1"/>
+        </a:solidFill>
+        <a:latin typeface="+mn-lt"/>
+        <a:ea typeface="+mn-ea"/>
+        <a:cs typeface="+mn-cs"/>
+      </a:defRPr>
+    </a:lvl2pPr>
+    <a:lvl3pPr marL="914400" algn="l" defTabSz="457200" rtl="0" eaLnBrk="1" latinLnBrk="0" hangingPunct="1">
+      <a:defRPr sz="1200" kern="1200">
+        <a:solidFill>
+          <a:schemeClr val="tx1"/>
+        </a:solidFill>
+        <a:latin typeface="+mn-lt"/>
+        <a:ea typeface="+mn-ea"/>
+        <a:cs typeface="+mn-cs"/>
+      </a:defRPr>
+    </a:lvl3pPr>
+    <a:lvl4pPr marL="1371600" algn="l" defTabSz="457200" rtl="0" eaLnBrk="1" latinLnBrk="0" hangingPunct="1">
+      <a:defRPr sz="1200" kern="1200">
+        <a:solidFill>
+          <a:schemeClr val="tx1"/>
+        </a:solidFill>
+        <a:latin typeface="+mn-lt"/>
+        <a:ea typeface="+mn-ea"/>
+        <a:cs typeface="+mn-cs"/>
+      </a:defRPr>
+    </a:lvl4pPr>
+    <a:lvl5pPr marL="1828800" algn="l" defTabSz="457200" rtl="0" eaLnBrk="1" latinLnBrk="0" hangingPunct="1">
+      <a:defRPr sz="1200" kern="1200">
+        <a:solidFill>
+          <a:schemeClr val="tx1"/>
+        </a:solidFill>
+        <a:latin typeface="+mn-lt"/>
+        <a:ea typeface="+mn-ea"/>
+        <a:cs typeface="+mn-cs"/>
+      </a:defRPr>
+    </a:lvl5pPr>
+    <a:lvl6pPr marL="2286000" algn="l" defTabSz="457200" rtl="0" eaLnBrk="1" latinLnBrk="0" hangingPunct="1">
+      <a:defRPr sz="1200" kern="1200">
+        <a:solidFill>
+          <a:schemeClr val="tx1"/>
+        </a:solidFill>
+        <a:latin typeface="+mn-lt"/>
+        <a:ea typeface="+mn-ea"/>
+        <a:cs typeface="+mn-cs"/>
+      </a:defRPr>
+    </a:lvl6pPr>
+    <a:lvl7pPr marL="2743200" algn="l" defTabSz="457200" rtl="0" eaLnBrk="1" latinLnBrk="0" hangingPunct="1">
+      <a:defRPr sz="1200" kern="1200">
+        <a:solidFill>
+          <a:schemeClr val="tx1"/>
+        </a:solidFill>
+        <a:latin typeface="+mn-lt"/>
+        <a:ea typeface="+mn-ea"/>
+        <a:cs typeface="+mn-cs"/>
+      </a:defRPr>
+    </a:lvl7pPr>
+    <a:lvl8pPr marL="3200400" algn="l" defTabSz="457200" rtl="0" eaLnBrk="1" latinLnBrk="0" hangingPunct="1">
+      <a:defRPr sz="1200" kern="1200">
+        <a:solidFill>
+          <a:schemeClr val="tx1"/>
+        </a:solidFill>
+        <a:latin typeface="+mn-lt"/>
+        <a:ea typeface="+mn-ea"/>
+        <a:cs typeface="+mn-cs"/>
+      </a:defRPr>
+    </a:lvl8pPr>
+    <a:lvl9pPr marL="3657600" algn="l" defTabSz="457200" rtl="0" eaLnBrk="1" latinLnBrk="0" hangingPunct="1">
+      <a:defRPr sz="1200" kern="1200">
+        <a:solidFill>
+          <a:schemeClr val="tx1"/>
+        </a:solidFill>
+        <a:latin typeface="+mn-lt"/>
+        <a:ea typeface="+mn-ea"/>
+        <a:cs typeface="+mn-cs"/>
+      </a:defRPr>
+    </a:lvl9pPr>
+  </p:notesStyle>
+</p:notesMaster>
+</file>
+
+<file path=ppt/notesSlides/notesSlide1.xml><?xml version="1.0" encoding="utf-8"?>
+<p:notes xmlns:a="http://schemas.openxmlformats.org/drawingml/2006/main" xmlns:r="http://schemas.openxmlformats.org/officeDocument/2006/relationships" xmlns:p="http://schemas.openxmlformats.org/presentationml/2006/main">
+  <p:cSld>
+    <p:spTree>
+      <p:nvGrpSpPr>
+        <p:cNvPr id="1" name=""/>
+        <p:cNvGrpSpPr/>
+        <p:nvPr/>
+      </p:nvGrpSpPr>
+      <p:grpSpPr>
+        <a:xfrm>
+          <a:off x="0" y="0"/>
+          <a:ext cx="0" cy="0"/>
+          <a:chOff x="0" y="0"/>
+          <a:chExt cx="0" cy="0"/>
+        </a:xfrm>
+      </p:grpSpPr>
+      <p:sp>
+        <p:nvSpPr>
+          <p:cNvPr id="2" name="Slide Image Placeholder 1"/>
+          <p:cNvSpPr>
+            <a:spLocks noGrp="1" noRot="1" noChangeAspect="1"/>
+          </p:cNvSpPr>
+          <p:nvPr>
+            <p:ph type="sldImg"/>
+          </p:nvPr>
+        </p:nvSpPr>
+        <p:spPr/>
+      </p:sp>
+      <p:sp>
+        <p:nvSpPr>
+          <p:cNvPr id="3" name="Notes Placeholder 2"/>
+          <p:cNvSpPr>
+            <a:spLocks noGrp="1"/>
+          </p:cNvSpPr>
+          <p:nvPr>
+            <p:ph type="body" idx="1"/>
+          </p:nvPr>
+        </p:nvSpPr>
+        <p:spPr/>
+        <p:txBody>
+          <a:bodyPr/>
+          <a:lstStyle/>
+          <a:p>
+            <a:endParaRPr lang="en-US" dirty="0"/>
+          </a:p>
+        </p:txBody>
+      </p:sp>
+      <p:sp>
+        <p:nvSpPr>
+          <p:cNvPr id="4" name="Slide Number Placeholder 3"/>
+          <p:cNvSpPr>
+            <a:spLocks noGrp="1"/>
+          </p:cNvSpPr>
+          <p:nvPr>
+            <p:ph type="sldNum" sz="quarter" idx="10"/>
+          </p:nvPr>
+        </p:nvSpPr>
+        <p:spPr/>
+        <p:txBody>
+          <a:bodyPr/>
+          <a:lstStyle/>
+          <a:p>
+            <a:fld id="{8AED5117-C3DB-DC46-B433-F1C323FD7F80}" type="slidenum">
+              <a:rPr lang="en-US" smtClean="0"/>
+              <a:t>6</a:t>
+            </a:fld>
+            <a:endParaRPr lang="en-US"/>
+          </a:p>
+        </p:txBody>
+      </p:sp>
+    </p:spTree>
+    <p:extLst>
+      <p:ext uri="{BB962C8B-B14F-4D97-AF65-F5344CB8AC3E}">
+        <p14:creationId xmlns:p14="http://schemas.microsoft.com/office/powerpoint/2010/main" val="1548789725"/>
+      </p:ext>
+    </p:extLst>
+  </p:cSld>
+  <p:clrMapOvr>
+    <a:masterClrMapping/>
+  </p:clrMapOvr>
+</p:notes>
+</file>
+
 <file path=ppt/slideLayouts/slideLayout1.xml><?xml version="1.0" encoding="utf-8"?>
 <p:sldLayout xmlns:a="http://schemas.openxmlformats.org/drawingml/2006/main" xmlns:r="http://schemas.openxmlformats.org/officeDocument/2006/relationships" xmlns:p="http://schemas.openxmlformats.org/presentationml/2006/main" type="title" preserve="1">
   <p:cSld name="Title Slide">
@@ -292,7 +731,7 @@
           <a:p>
             <a:fld id="{CE2D3545-AE21-7247-8426-4B1172E482C1}" type="datetimeFigureOut">
               <a:rPr lang="en-US" smtClean="0"/>
-              <a:t>8/25/13</a:t>
+              <a:t>8/28/13</a:t>
             </a:fld>
             <a:endParaRPr lang="en-US"/>
           </a:p>
@@ -462,7 +901,7 @@
           <a:p>
             <a:fld id="{CE2D3545-AE21-7247-8426-4B1172E482C1}" type="datetimeFigureOut">
               <a:rPr lang="en-US" smtClean="0"/>
-              <a:t>8/25/13</a:t>
+              <a:t>8/28/13</a:t>
             </a:fld>
             <a:endParaRPr lang="en-US"/>
           </a:p>
@@ -642,7 +1081,7 @@
           <a:p>
             <a:fld id="{CE2D3545-AE21-7247-8426-4B1172E482C1}" type="datetimeFigureOut">
               <a:rPr lang="en-US" smtClean="0"/>
-              <a:t>8/25/13</a:t>
+              <a:t>8/28/13</a:t>
             </a:fld>
             <a:endParaRPr lang="en-US"/>
           </a:p>
@@ -812,7 +1251,7 @@
           <a:p>
             <a:fld id="{CE2D3545-AE21-7247-8426-4B1172E482C1}" type="datetimeFigureOut">
               <a:rPr lang="en-US" smtClean="0"/>
-              <a:t>8/25/13</a:t>
+              <a:t>8/28/13</a:t>
             </a:fld>
             <a:endParaRPr lang="en-US"/>
           </a:p>
@@ -1058,7 +1497,7 @@
           <a:p>
             <a:fld id="{CE2D3545-AE21-7247-8426-4B1172E482C1}" type="datetimeFigureOut">
               <a:rPr lang="en-US" smtClean="0"/>
-              <a:t>8/25/13</a:t>
+              <a:t>8/28/13</a:t>
             </a:fld>
             <a:endParaRPr lang="en-US"/>
           </a:p>
@@ -1346,7 +1785,7 @@
           <a:p>
             <a:fld id="{CE2D3545-AE21-7247-8426-4B1172E482C1}" type="datetimeFigureOut">
               <a:rPr lang="en-US" smtClean="0"/>
-              <a:t>8/25/13</a:t>
+              <a:t>8/28/13</a:t>
             </a:fld>
             <a:endParaRPr lang="en-US"/>
           </a:p>
@@ -1768,7 +2207,7 @@
           <a:p>
             <a:fld id="{CE2D3545-AE21-7247-8426-4B1172E482C1}" type="datetimeFigureOut">
               <a:rPr lang="en-US" smtClean="0"/>
-              <a:t>8/25/13</a:t>
+              <a:t>8/28/13</a:t>
             </a:fld>
             <a:endParaRPr lang="en-US"/>
           </a:p>
@@ -1886,7 +2325,7 @@
           <a:p>
             <a:fld id="{CE2D3545-AE21-7247-8426-4B1172E482C1}" type="datetimeFigureOut">
               <a:rPr lang="en-US" smtClean="0"/>
-              <a:t>8/25/13</a:t>
+              <a:t>8/28/13</a:t>
             </a:fld>
             <a:endParaRPr lang="en-US"/>
           </a:p>
@@ -1981,7 +2420,7 @@
           <a:p>
             <a:fld id="{CE2D3545-AE21-7247-8426-4B1172E482C1}" type="datetimeFigureOut">
               <a:rPr lang="en-US" smtClean="0"/>
-              <a:t>8/25/13</a:t>
+              <a:t>8/28/13</a:t>
             </a:fld>
             <a:endParaRPr lang="en-US"/>
           </a:p>
@@ -2258,7 +2697,7 @@
           <a:p>
             <a:fld id="{CE2D3545-AE21-7247-8426-4B1172E482C1}" type="datetimeFigureOut">
               <a:rPr lang="en-US" smtClean="0"/>
-              <a:t>8/25/13</a:t>
+              <a:t>8/28/13</a:t>
             </a:fld>
             <a:endParaRPr lang="en-US"/>
           </a:p>
@@ -2515,7 +2954,7 @@
           <a:p>
             <a:fld id="{CE2D3545-AE21-7247-8426-4B1172E482C1}" type="datetimeFigureOut">
               <a:rPr lang="en-US" smtClean="0"/>
-              <a:t>8/25/13</a:t>
+              <a:t>8/28/13</a:t>
             </a:fld>
             <a:endParaRPr lang="en-US"/>
           </a:p>
@@ -2733,7 +3172,7 @@
           <a:p>
             <a:fld id="{CE2D3545-AE21-7247-8426-4B1172E482C1}" type="datetimeFigureOut">
               <a:rPr lang="en-US" smtClean="0"/>
-              <a:t>8/25/13</a:t>
+              <a:t>8/28/13</a:t>
             </a:fld>
             <a:endParaRPr lang="en-US"/>
           </a:p>
@@ -6367,11 +6806,7 @@
             <a:pPr algn="ctr"/>
             <a:r>
               <a:rPr lang="en-US" sz="1600" i="1" dirty="0" smtClean="0"/>
-              <a:t>Signaling </a:t>
-            </a:r>
-            <a:r>
-              <a:rPr lang="en-US" sz="1600" i="1" dirty="0" smtClean="0"/>
-              <a:t>Protocol</a:t>
+              <a:t>Signaling Protocol</a:t>
             </a:r>
           </a:p>
           <a:p>
@@ -6606,6 +7041,1632 @@
     <p:extLst>
       <p:ext uri="{BB962C8B-B14F-4D97-AF65-F5344CB8AC3E}">
         <p14:creationId xmlns:p14="http://schemas.microsoft.com/office/powerpoint/2010/main" val="3019611239"/>
+      </p:ext>
+    </p:extLst>
+  </p:cSld>
+  <p:clrMapOvr>
+    <a:masterClrMapping/>
+  </p:clrMapOvr>
+</p:sld>
+</file>
+
+<file path=ppt/slides/slide6.xml><?xml version="1.0" encoding="utf-8"?>
+<p:sld xmlns:a="http://schemas.openxmlformats.org/drawingml/2006/main" xmlns:r="http://schemas.openxmlformats.org/officeDocument/2006/relationships" xmlns:p="http://schemas.openxmlformats.org/presentationml/2006/main">
+  <p:cSld>
+    <p:spTree>
+      <p:nvGrpSpPr>
+        <p:cNvPr id="1" name=""/>
+        <p:cNvGrpSpPr/>
+        <p:nvPr/>
+      </p:nvGrpSpPr>
+      <p:grpSpPr>
+        <a:xfrm>
+          <a:off x="0" y="0"/>
+          <a:ext cx="0" cy="0"/>
+          <a:chOff x="0" y="0"/>
+          <a:chExt cx="0" cy="0"/>
+        </a:xfrm>
+      </p:grpSpPr>
+      <p:sp>
+        <p:nvSpPr>
+          <p:cNvPr id="2" name="Rectangle 1"/>
+          <p:cNvSpPr/>
+          <p:nvPr/>
+        </p:nvSpPr>
+        <p:spPr>
+          <a:xfrm>
+            <a:off x="139556" y="5052177"/>
+            <a:ext cx="8900321" cy="831370"/>
+          </a:xfrm>
+          <a:prstGeom prst="rect">
+            <a:avLst/>
+          </a:prstGeom>
+        </p:spPr>
+        <p:style>
+          <a:lnRef idx="2">
+            <a:schemeClr val="dk1"/>
+          </a:lnRef>
+          <a:fillRef idx="1">
+            <a:schemeClr val="lt1"/>
+          </a:fillRef>
+          <a:effectRef idx="0">
+            <a:schemeClr val="dk1"/>
+          </a:effectRef>
+          <a:fontRef idx="minor">
+            <a:schemeClr val="dk1"/>
+          </a:fontRef>
+        </p:style>
+        <p:txBody>
+          <a:bodyPr rtlCol="0" anchor="ctr"/>
+          <a:lstStyle/>
+          <a:p>
+            <a:pPr lvl="0" algn="ctr"/>
+            <a:r>
+              <a:rPr lang="en-US" dirty="0">
+                <a:solidFill>
+                  <a:prstClr val="black"/>
+                </a:solidFill>
+              </a:rPr>
+              <a:t>Internet Protocol </a:t>
+            </a:r>
+            <a:r>
+              <a:rPr lang="en-US" dirty="0">
+                <a:solidFill>
+                  <a:prstClr val="black"/>
+                </a:solidFill>
+                <a:latin typeface="Nexa Bold"/>
+              </a:rPr>
+              <a:t>(IP</a:t>
+            </a:r>
+            <a:r>
+              <a:rPr lang="en-US" dirty="0" smtClean="0">
+                <a:solidFill>
+                  <a:prstClr val="black"/>
+                </a:solidFill>
+                <a:latin typeface="Nexa Bold"/>
+              </a:rPr>
+              <a:t>)</a:t>
+            </a:r>
+            <a:endParaRPr lang="en-US" sz="1600" dirty="0">
+              <a:solidFill>
+                <a:prstClr val="black"/>
+              </a:solidFill>
+              <a:latin typeface="Nexa Bold"/>
+            </a:endParaRPr>
+          </a:p>
+        </p:txBody>
+      </p:sp>
+      <p:sp>
+        <p:nvSpPr>
+          <p:cNvPr id="3" name="Rectangle 2"/>
+          <p:cNvSpPr/>
+          <p:nvPr/>
+        </p:nvSpPr>
+        <p:spPr>
+          <a:xfrm>
+            <a:off x="139555" y="4220807"/>
+            <a:ext cx="6660835" cy="831370"/>
+          </a:xfrm>
+          <a:prstGeom prst="rect">
+            <a:avLst/>
+          </a:prstGeom>
+        </p:spPr>
+        <p:style>
+          <a:lnRef idx="2">
+            <a:schemeClr val="dk1"/>
+          </a:lnRef>
+          <a:fillRef idx="1">
+            <a:schemeClr val="lt1"/>
+          </a:fillRef>
+          <a:effectRef idx="0">
+            <a:schemeClr val="dk1"/>
+          </a:effectRef>
+          <a:fontRef idx="minor">
+            <a:schemeClr val="dk1"/>
+          </a:fontRef>
+        </p:style>
+        <p:txBody>
+          <a:bodyPr rtlCol="0" anchor="ctr"/>
+          <a:lstStyle/>
+          <a:p>
+            <a:pPr lvl="0" algn="ctr"/>
+            <a:r>
+              <a:rPr lang="en-US" dirty="0">
+                <a:solidFill>
+                  <a:prstClr val="black"/>
+                </a:solidFill>
+              </a:rPr>
+              <a:t>User Datagram Protocol </a:t>
+            </a:r>
+            <a:r>
+              <a:rPr lang="en-US" dirty="0">
+                <a:solidFill>
+                  <a:prstClr val="black"/>
+                </a:solidFill>
+                <a:latin typeface="Nexa Bold"/>
+              </a:rPr>
+              <a:t>(UDP)</a:t>
+            </a:r>
+            <a:endParaRPr lang="en-US" sz="1600" dirty="0">
+              <a:solidFill>
+                <a:prstClr val="black"/>
+              </a:solidFill>
+              <a:latin typeface="Nexa Bold"/>
+            </a:endParaRPr>
+          </a:p>
+        </p:txBody>
+      </p:sp>
+      <p:sp>
+        <p:nvSpPr>
+          <p:cNvPr id="4" name="Rectangle 3"/>
+          <p:cNvSpPr/>
+          <p:nvPr/>
+        </p:nvSpPr>
+        <p:spPr>
+          <a:xfrm>
+            <a:off x="139558" y="3389437"/>
+            <a:ext cx="1936070" cy="831370"/>
+          </a:xfrm>
+          <a:prstGeom prst="rect">
+            <a:avLst/>
+          </a:prstGeom>
+        </p:spPr>
+        <p:style>
+          <a:lnRef idx="2">
+            <a:schemeClr val="dk1"/>
+          </a:lnRef>
+          <a:fillRef idx="1">
+            <a:schemeClr val="lt1"/>
+          </a:fillRef>
+          <a:effectRef idx="0">
+            <a:schemeClr val="dk1"/>
+          </a:effectRef>
+          <a:fontRef idx="minor">
+            <a:schemeClr val="dk1"/>
+          </a:fontRef>
+        </p:style>
+        <p:txBody>
+          <a:bodyPr rtlCol="0" anchor="ctr"/>
+          <a:lstStyle/>
+          <a:p>
+            <a:pPr algn="ctr"/>
+            <a:r>
+              <a:rPr lang="en-US" sz="1600" dirty="0" smtClean="0"/>
+              <a:t>Session Traversal Utilities for NAT </a:t>
+            </a:r>
+            <a:r>
+              <a:rPr lang="en-US" sz="1600" dirty="0" smtClean="0">
+                <a:latin typeface="+mj-lt"/>
+              </a:rPr>
+              <a:t>(STUN)</a:t>
+            </a:r>
+            <a:endParaRPr lang="en-US" sz="1600" dirty="0">
+              <a:latin typeface="+mj-lt"/>
+            </a:endParaRPr>
+          </a:p>
+        </p:txBody>
+      </p:sp>
+      <p:sp>
+        <p:nvSpPr>
+          <p:cNvPr id="5" name="Rectangle 4"/>
+          <p:cNvSpPr/>
+          <p:nvPr/>
+        </p:nvSpPr>
+        <p:spPr>
+          <a:xfrm>
+            <a:off x="2075629" y="3389437"/>
+            <a:ext cx="3468476" cy="831370"/>
+          </a:xfrm>
+          <a:prstGeom prst="rect">
+            <a:avLst/>
+          </a:prstGeom>
+          <a:solidFill>
+            <a:schemeClr val="tx2">
+              <a:lumMod val="20000"/>
+              <a:lumOff val="80000"/>
+            </a:schemeClr>
+          </a:solidFill>
+        </p:spPr>
+        <p:style>
+          <a:lnRef idx="2">
+            <a:schemeClr val="dk1"/>
+          </a:lnRef>
+          <a:fillRef idx="1">
+            <a:schemeClr val="lt1"/>
+          </a:fillRef>
+          <a:effectRef idx="0">
+            <a:schemeClr val="dk1"/>
+          </a:effectRef>
+          <a:fontRef idx="minor">
+            <a:schemeClr val="dk1"/>
+          </a:fontRef>
+        </p:style>
+        <p:txBody>
+          <a:bodyPr rtlCol="0" anchor="ctr"/>
+          <a:lstStyle/>
+          <a:p>
+            <a:pPr algn="ctr"/>
+            <a:r>
+              <a:rPr lang="en-US" dirty="0" smtClean="0">
+                <a:latin typeface="+mj-lt"/>
+              </a:rPr>
+              <a:t>                     RTP</a:t>
+            </a:r>
+          </a:p>
+          <a:p>
+            <a:pPr algn="ctr"/>
+            <a:endParaRPr lang="en-US" sz="1600" dirty="0">
+              <a:latin typeface="+mj-lt"/>
+            </a:endParaRPr>
+          </a:p>
+        </p:txBody>
+      </p:sp>
+      <p:sp>
+        <p:nvSpPr>
+          <p:cNvPr id="15" name="Rectangle 14"/>
+          <p:cNvSpPr/>
+          <p:nvPr/>
+        </p:nvSpPr>
+        <p:spPr>
+          <a:xfrm>
+            <a:off x="2949575" y="1597583"/>
+            <a:ext cx="873946" cy="1787187"/>
+          </a:xfrm>
+          <a:prstGeom prst="rect">
+            <a:avLst/>
+          </a:prstGeom>
+        </p:spPr>
+        <p:style>
+          <a:lnRef idx="2">
+            <a:schemeClr val="dk1"/>
+          </a:lnRef>
+          <a:fillRef idx="1">
+            <a:schemeClr val="lt1"/>
+          </a:fillRef>
+          <a:effectRef idx="0">
+            <a:schemeClr val="dk1"/>
+          </a:effectRef>
+          <a:fontRef idx="minor">
+            <a:schemeClr val="dk1"/>
+          </a:fontRef>
+        </p:style>
+        <p:txBody>
+          <a:bodyPr rtlCol="0" anchor="ctr"/>
+          <a:lstStyle/>
+          <a:p>
+            <a:pPr algn="ctr"/>
+            <a:r>
+              <a:rPr lang="en-US" sz="1600" dirty="0" smtClean="0"/>
+              <a:t>SSRC #2</a:t>
+            </a:r>
+            <a:endParaRPr lang="en-US" sz="1400" dirty="0">
+              <a:latin typeface="+mj-lt"/>
+            </a:endParaRPr>
+          </a:p>
+        </p:txBody>
+      </p:sp>
+      <p:sp>
+        <p:nvSpPr>
+          <p:cNvPr id="16" name="Rectangle 15"/>
+          <p:cNvSpPr/>
+          <p:nvPr/>
+        </p:nvSpPr>
+        <p:spPr>
+          <a:xfrm>
+            <a:off x="2075629" y="1597583"/>
+            <a:ext cx="873946" cy="1787187"/>
+          </a:xfrm>
+          <a:prstGeom prst="rect">
+            <a:avLst/>
+          </a:prstGeom>
+        </p:spPr>
+        <p:style>
+          <a:lnRef idx="2">
+            <a:schemeClr val="dk1"/>
+          </a:lnRef>
+          <a:fillRef idx="1">
+            <a:schemeClr val="lt1"/>
+          </a:fillRef>
+          <a:effectRef idx="0">
+            <a:schemeClr val="dk1"/>
+          </a:effectRef>
+          <a:fontRef idx="minor">
+            <a:schemeClr val="dk1"/>
+          </a:fontRef>
+        </p:style>
+        <p:txBody>
+          <a:bodyPr rtlCol="0" anchor="ctr"/>
+          <a:lstStyle/>
+          <a:p>
+            <a:pPr algn="ctr"/>
+            <a:r>
+              <a:rPr lang="en-US" sz="1600" dirty="0" smtClean="0"/>
+              <a:t>SSRC #1</a:t>
+            </a:r>
+            <a:endParaRPr lang="en-US" sz="1400" dirty="0">
+              <a:latin typeface="+mj-lt"/>
+            </a:endParaRPr>
+          </a:p>
+        </p:txBody>
+      </p:sp>
+      <p:sp>
+        <p:nvSpPr>
+          <p:cNvPr id="19" name="Rectangle 18"/>
+          <p:cNvSpPr/>
+          <p:nvPr/>
+        </p:nvSpPr>
+        <p:spPr>
+          <a:xfrm>
+            <a:off x="2075628" y="3877894"/>
+            <a:ext cx="1747893" cy="342914"/>
+          </a:xfrm>
+          <a:prstGeom prst="rect">
+            <a:avLst/>
+          </a:prstGeom>
+        </p:spPr>
+        <p:style>
+          <a:lnRef idx="2">
+            <a:schemeClr val="dk1"/>
+          </a:lnRef>
+          <a:fillRef idx="1">
+            <a:schemeClr val="lt1"/>
+          </a:fillRef>
+          <a:effectRef idx="0">
+            <a:schemeClr val="dk1"/>
+          </a:effectRef>
+          <a:fontRef idx="minor">
+            <a:schemeClr val="dk1"/>
+          </a:fontRef>
+        </p:style>
+        <p:txBody>
+          <a:bodyPr rtlCol="0" anchor="ctr"/>
+          <a:lstStyle/>
+          <a:p>
+            <a:pPr algn="ctr"/>
+            <a:r>
+              <a:rPr lang="en-US" sz="1600" dirty="0" smtClean="0">
+                <a:latin typeface="+mj-lt"/>
+              </a:rPr>
+              <a:t>TURN</a:t>
+            </a:r>
+            <a:endParaRPr lang="en-US" sz="1400" dirty="0">
+              <a:latin typeface="+mj-lt"/>
+            </a:endParaRPr>
+          </a:p>
+        </p:txBody>
+      </p:sp>
+      <p:cxnSp>
+        <p:nvCxnSpPr>
+          <p:cNvPr id="21" name="Straight Connector 20"/>
+          <p:cNvCxnSpPr/>
+          <p:nvPr/>
+        </p:nvCxnSpPr>
+        <p:spPr>
+          <a:xfrm flipH="1">
+            <a:off x="2075628" y="3384770"/>
+            <a:ext cx="2" cy="664581"/>
+          </a:xfrm>
+          <a:prstGeom prst="line">
+            <a:avLst/>
+          </a:prstGeom>
+          <a:ln>
+            <a:prstDash val="sysDash"/>
+          </a:ln>
+        </p:spPr>
+        <p:style>
+          <a:lnRef idx="1">
+            <a:schemeClr val="dk1"/>
+          </a:lnRef>
+          <a:fillRef idx="0">
+            <a:schemeClr val="dk1"/>
+          </a:fillRef>
+          <a:effectRef idx="0">
+            <a:schemeClr val="dk1"/>
+          </a:effectRef>
+          <a:fontRef idx="minor">
+            <a:schemeClr val="tx1"/>
+          </a:fontRef>
+        </p:style>
+      </p:cxnSp>
+      <p:sp>
+        <p:nvSpPr>
+          <p:cNvPr id="24" name="Rectangle 23"/>
+          <p:cNvSpPr/>
+          <p:nvPr/>
+        </p:nvSpPr>
+        <p:spPr>
+          <a:xfrm>
+            <a:off x="3809866" y="1597583"/>
+            <a:ext cx="873946" cy="1787187"/>
+          </a:xfrm>
+          <a:prstGeom prst="rect">
+            <a:avLst/>
+          </a:prstGeom>
+        </p:spPr>
+        <p:style>
+          <a:lnRef idx="2">
+            <a:schemeClr val="dk1"/>
+          </a:lnRef>
+          <a:fillRef idx="1">
+            <a:schemeClr val="lt1"/>
+          </a:fillRef>
+          <a:effectRef idx="0">
+            <a:schemeClr val="dk1"/>
+          </a:effectRef>
+          <a:fontRef idx="minor">
+            <a:schemeClr val="dk1"/>
+          </a:fontRef>
+        </p:style>
+        <p:txBody>
+          <a:bodyPr rtlCol="0" anchor="ctr"/>
+          <a:lstStyle/>
+          <a:p>
+            <a:pPr algn="ctr"/>
+            <a:r>
+              <a:rPr lang="en-US" sz="1600" dirty="0" smtClean="0"/>
+              <a:t>SSRC #3</a:t>
+            </a:r>
+            <a:endParaRPr lang="en-US" sz="1400" dirty="0">
+              <a:latin typeface="+mj-lt"/>
+            </a:endParaRPr>
+          </a:p>
+        </p:txBody>
+      </p:sp>
+      <p:sp>
+        <p:nvSpPr>
+          <p:cNvPr id="25" name="Rectangle 24"/>
+          <p:cNvSpPr/>
+          <p:nvPr/>
+        </p:nvSpPr>
+        <p:spPr>
+          <a:xfrm>
+            <a:off x="4670158" y="1597583"/>
+            <a:ext cx="873946" cy="1787187"/>
+          </a:xfrm>
+          <a:prstGeom prst="rect">
+            <a:avLst/>
+          </a:prstGeom>
+        </p:spPr>
+        <p:style>
+          <a:lnRef idx="2">
+            <a:schemeClr val="dk1"/>
+          </a:lnRef>
+          <a:fillRef idx="1">
+            <a:schemeClr val="lt1"/>
+          </a:fillRef>
+          <a:effectRef idx="0">
+            <a:schemeClr val="dk1"/>
+          </a:effectRef>
+          <a:fontRef idx="minor">
+            <a:schemeClr val="dk1"/>
+          </a:fontRef>
+        </p:style>
+        <p:txBody>
+          <a:bodyPr rtlCol="0" anchor="ctr"/>
+          <a:lstStyle/>
+          <a:p>
+            <a:pPr algn="ctr"/>
+            <a:r>
+              <a:rPr lang="en-US" sz="1600" dirty="0" smtClean="0"/>
+              <a:t>SSRC #4</a:t>
+            </a:r>
+            <a:endParaRPr lang="en-US" sz="1400" dirty="0">
+              <a:latin typeface="+mj-lt"/>
+            </a:endParaRPr>
+          </a:p>
+        </p:txBody>
+      </p:sp>
+      <p:sp>
+        <p:nvSpPr>
+          <p:cNvPr id="13" name="Rectangle 12"/>
+          <p:cNvSpPr/>
+          <p:nvPr/>
+        </p:nvSpPr>
+        <p:spPr>
+          <a:xfrm>
+            <a:off x="6800391" y="4220808"/>
+            <a:ext cx="2239485" cy="831370"/>
+          </a:xfrm>
+          <a:prstGeom prst="rect">
+            <a:avLst/>
+          </a:prstGeom>
+        </p:spPr>
+        <p:style>
+          <a:lnRef idx="2">
+            <a:schemeClr val="dk1"/>
+          </a:lnRef>
+          <a:fillRef idx="1">
+            <a:schemeClr val="lt1"/>
+          </a:fillRef>
+          <a:effectRef idx="0">
+            <a:schemeClr val="dk1"/>
+          </a:effectRef>
+          <a:fontRef idx="minor">
+            <a:schemeClr val="dk1"/>
+          </a:fontRef>
+        </p:style>
+        <p:txBody>
+          <a:bodyPr rtlCol="0" anchor="ctr"/>
+          <a:lstStyle/>
+          <a:p>
+            <a:pPr algn="ctr"/>
+            <a:r>
+              <a:rPr lang="en-US" dirty="0" smtClean="0"/>
+              <a:t>Transmission Control Protocol </a:t>
+            </a:r>
+            <a:r>
+              <a:rPr lang="en-US" dirty="0" smtClean="0">
+                <a:latin typeface="+mj-lt"/>
+              </a:rPr>
+              <a:t>(TCP)</a:t>
+            </a:r>
+            <a:endParaRPr lang="en-US" sz="1600" dirty="0">
+              <a:latin typeface="+mj-lt"/>
+            </a:endParaRPr>
+          </a:p>
+        </p:txBody>
+      </p:sp>
+      <p:sp>
+        <p:nvSpPr>
+          <p:cNvPr id="14" name="Rectangle 13"/>
+          <p:cNvSpPr/>
+          <p:nvPr/>
+        </p:nvSpPr>
+        <p:spPr>
+          <a:xfrm>
+            <a:off x="6554595" y="3389438"/>
+            <a:ext cx="2485281" cy="826702"/>
+          </a:xfrm>
+          <a:prstGeom prst="rect">
+            <a:avLst/>
+          </a:prstGeom>
+        </p:spPr>
+        <p:style>
+          <a:lnRef idx="2">
+            <a:schemeClr val="dk1"/>
+          </a:lnRef>
+          <a:fillRef idx="1">
+            <a:schemeClr val="lt1"/>
+          </a:fillRef>
+          <a:effectRef idx="0">
+            <a:schemeClr val="dk1"/>
+          </a:effectRef>
+          <a:fontRef idx="minor">
+            <a:schemeClr val="dk1"/>
+          </a:fontRef>
+        </p:style>
+        <p:txBody>
+          <a:bodyPr rtlCol="0" anchor="ctr"/>
+          <a:lstStyle/>
+          <a:p>
+            <a:pPr algn="ctr"/>
+            <a:r>
+              <a:rPr lang="en-US" sz="1600" i="1" dirty="0" smtClean="0"/>
+              <a:t>Signaling Protocol</a:t>
+            </a:r>
+          </a:p>
+          <a:p>
+            <a:pPr algn="ctr"/>
+            <a:r>
+              <a:rPr lang="en-US" sz="1200" i="1" dirty="0" smtClean="0"/>
+              <a:t>(e.g., SIP, Jingle, …)</a:t>
+            </a:r>
+            <a:endParaRPr lang="en-US" sz="1200" i="1" dirty="0"/>
+          </a:p>
+        </p:txBody>
+      </p:sp>
+      <p:sp>
+        <p:nvSpPr>
+          <p:cNvPr id="17" name="Rectangle 16"/>
+          <p:cNvSpPr/>
+          <p:nvPr/>
+        </p:nvSpPr>
+        <p:spPr>
+          <a:xfrm>
+            <a:off x="5544105" y="3384770"/>
+            <a:ext cx="1010490" cy="831370"/>
+          </a:xfrm>
+          <a:prstGeom prst="rect">
+            <a:avLst/>
+          </a:prstGeom>
+        </p:spPr>
+        <p:style>
+          <a:lnRef idx="2">
+            <a:schemeClr val="dk1"/>
+          </a:lnRef>
+          <a:fillRef idx="1">
+            <a:schemeClr val="lt1"/>
+          </a:fillRef>
+          <a:effectRef idx="0">
+            <a:schemeClr val="dk1"/>
+          </a:effectRef>
+          <a:fontRef idx="minor">
+            <a:schemeClr val="dk1"/>
+          </a:fontRef>
+        </p:style>
+        <p:txBody>
+          <a:bodyPr rtlCol="0" anchor="ctr"/>
+          <a:lstStyle/>
+          <a:p>
+            <a:pPr algn="ctr"/>
+            <a:r>
+              <a:rPr lang="en-US" sz="1600" dirty="0" smtClean="0">
+                <a:latin typeface="+mj-lt"/>
+              </a:rPr>
+              <a:t>DTLS</a:t>
+            </a:r>
+            <a:endParaRPr lang="en-US" sz="1600" dirty="0">
+              <a:latin typeface="+mj-lt"/>
+            </a:endParaRPr>
+          </a:p>
+        </p:txBody>
+      </p:sp>
+      <p:sp>
+        <p:nvSpPr>
+          <p:cNvPr id="6" name="TextBox 5"/>
+          <p:cNvSpPr txBox="1"/>
+          <p:nvPr/>
+        </p:nvSpPr>
+        <p:spPr>
+          <a:xfrm>
+            <a:off x="5885487" y="6211669"/>
+            <a:ext cx="3154390" cy="646331"/>
+          </a:xfrm>
+          <a:prstGeom prst="rect">
+            <a:avLst/>
+          </a:prstGeom>
+          <a:noFill/>
+        </p:spPr>
+        <p:txBody>
+          <a:bodyPr wrap="square" rtlCol="0">
+            <a:spAutoFit/>
+          </a:bodyPr>
+          <a:lstStyle/>
+          <a:p>
+            <a:pPr algn="just"/>
+            <a:r>
+              <a:rPr lang="en-US" sz="1200" dirty="0" smtClean="0">
+                <a:latin typeface="+mj-lt"/>
+              </a:rPr>
+              <a:t>Note:</a:t>
+            </a:r>
+            <a:r>
+              <a:rPr lang="en-US" sz="1200" dirty="0" smtClean="0"/>
+              <a:t> *RTP can be sent over UDP or TCP.</a:t>
+            </a:r>
+          </a:p>
+          <a:p>
+            <a:pPr algn="just"/>
+            <a:r>
+              <a:rPr lang="en-US" sz="1200" dirty="0" smtClean="0"/>
+              <a:t>Similarly, signaling </a:t>
+            </a:r>
+            <a:r>
+              <a:rPr lang="en-US" sz="1200" dirty="0"/>
+              <a:t>p</a:t>
+            </a:r>
+            <a:r>
+              <a:rPr lang="en-US" sz="1200" dirty="0" smtClean="0"/>
+              <a:t>rotocols can be designed to transmit over UDP or TCP.</a:t>
+            </a:r>
+            <a:endParaRPr lang="en-US" sz="1200" dirty="0"/>
+          </a:p>
+        </p:txBody>
+      </p:sp>
+      <p:sp>
+        <p:nvSpPr>
+          <p:cNvPr id="20" name="Rectangle 19"/>
+          <p:cNvSpPr/>
+          <p:nvPr/>
+        </p:nvSpPr>
+        <p:spPr>
+          <a:xfrm>
+            <a:off x="6308797" y="1597583"/>
+            <a:ext cx="1447478" cy="1787188"/>
+          </a:xfrm>
+          <a:prstGeom prst="rect">
+            <a:avLst/>
+          </a:prstGeom>
+        </p:spPr>
+        <p:style>
+          <a:lnRef idx="2">
+            <a:schemeClr val="dk1"/>
+          </a:lnRef>
+          <a:fillRef idx="1">
+            <a:schemeClr val="lt1"/>
+          </a:fillRef>
+          <a:effectRef idx="0">
+            <a:schemeClr val="dk1"/>
+          </a:effectRef>
+          <a:fontRef idx="minor">
+            <a:schemeClr val="dk1"/>
+          </a:fontRef>
+        </p:style>
+        <p:txBody>
+          <a:bodyPr vert="horz" rtlCol="0" anchor="ctr"/>
+          <a:lstStyle/>
+          <a:p>
+            <a:pPr algn="ctr"/>
+            <a:r>
+              <a:rPr lang="en-US" sz="1600" dirty="0" smtClean="0"/>
+              <a:t>Secure RTP </a:t>
+            </a:r>
+            <a:r>
+              <a:rPr lang="en-US" sz="1600" dirty="0" smtClean="0">
+                <a:latin typeface="+mj-lt"/>
+              </a:rPr>
+              <a:t>(SRTP)</a:t>
+            </a:r>
+            <a:r>
+              <a:rPr lang="en-US" sz="1600" dirty="0" smtClean="0"/>
+              <a:t> Keying</a:t>
+            </a:r>
+            <a:endParaRPr lang="en-US" sz="1400" dirty="0">
+              <a:latin typeface="+mj-lt"/>
+            </a:endParaRPr>
+          </a:p>
+        </p:txBody>
+      </p:sp>
+      <p:cxnSp>
+        <p:nvCxnSpPr>
+          <p:cNvPr id="11" name="Straight Connector 10"/>
+          <p:cNvCxnSpPr/>
+          <p:nvPr/>
+        </p:nvCxnSpPr>
+        <p:spPr>
+          <a:xfrm>
+            <a:off x="3809866" y="3389438"/>
+            <a:ext cx="0" cy="493124"/>
+          </a:xfrm>
+          <a:prstGeom prst="line">
+            <a:avLst/>
+          </a:prstGeom>
+          <a:ln>
+            <a:prstDash val="dash"/>
+          </a:ln>
+        </p:spPr>
+        <p:style>
+          <a:lnRef idx="1">
+            <a:schemeClr val="dk1"/>
+          </a:lnRef>
+          <a:fillRef idx="0">
+            <a:schemeClr val="dk1"/>
+          </a:fillRef>
+          <a:effectRef idx="0">
+            <a:schemeClr val="dk1"/>
+          </a:effectRef>
+          <a:fontRef idx="minor">
+            <a:schemeClr val="tx1"/>
+          </a:fontRef>
+        </p:style>
+      </p:cxnSp>
+      <p:cxnSp>
+        <p:nvCxnSpPr>
+          <p:cNvPr id="22" name="Straight Connector 21"/>
+          <p:cNvCxnSpPr/>
+          <p:nvPr/>
+        </p:nvCxnSpPr>
+        <p:spPr>
+          <a:xfrm>
+            <a:off x="2949575" y="3384770"/>
+            <a:ext cx="0" cy="493124"/>
+          </a:xfrm>
+          <a:prstGeom prst="line">
+            <a:avLst/>
+          </a:prstGeom>
+          <a:ln>
+            <a:prstDash val="dash"/>
+          </a:ln>
+        </p:spPr>
+        <p:style>
+          <a:lnRef idx="1">
+            <a:schemeClr val="dk1"/>
+          </a:lnRef>
+          <a:fillRef idx="0">
+            <a:schemeClr val="dk1"/>
+          </a:fillRef>
+          <a:effectRef idx="0">
+            <a:schemeClr val="dk1"/>
+          </a:effectRef>
+          <a:fontRef idx="minor">
+            <a:schemeClr val="tx1"/>
+          </a:fontRef>
+        </p:style>
+      </p:cxnSp>
+      <p:sp>
+        <p:nvSpPr>
+          <p:cNvPr id="23" name="Rectangle 22"/>
+          <p:cNvSpPr/>
+          <p:nvPr/>
+        </p:nvSpPr>
+        <p:spPr>
+          <a:xfrm>
+            <a:off x="5544104" y="2553398"/>
+            <a:ext cx="764693" cy="831372"/>
+          </a:xfrm>
+          <a:prstGeom prst="rect">
+            <a:avLst/>
+          </a:prstGeom>
+        </p:spPr>
+        <p:style>
+          <a:lnRef idx="2">
+            <a:schemeClr val="dk1"/>
+          </a:lnRef>
+          <a:fillRef idx="1">
+            <a:schemeClr val="lt1"/>
+          </a:fillRef>
+          <a:effectRef idx="0">
+            <a:schemeClr val="dk1"/>
+          </a:effectRef>
+          <a:fontRef idx="minor">
+            <a:schemeClr val="dk1"/>
+          </a:fontRef>
+        </p:style>
+        <p:txBody>
+          <a:bodyPr vert="horz" rtlCol="0" anchor="ctr"/>
+          <a:lstStyle/>
+          <a:p>
+            <a:pPr algn="ctr"/>
+            <a:r>
+              <a:rPr lang="en-US" sz="1600" dirty="0" smtClean="0">
+                <a:latin typeface="+mj-lt"/>
+              </a:rPr>
+              <a:t>SCTP</a:t>
+            </a:r>
+            <a:endParaRPr lang="en-US" sz="1400" dirty="0">
+              <a:latin typeface="+mj-lt"/>
+            </a:endParaRPr>
+          </a:p>
+        </p:txBody>
+      </p:sp>
+      <p:sp>
+        <p:nvSpPr>
+          <p:cNvPr id="26" name="Rectangle 25"/>
+          <p:cNvSpPr/>
+          <p:nvPr/>
+        </p:nvSpPr>
+        <p:spPr>
+          <a:xfrm>
+            <a:off x="5544106" y="1597583"/>
+            <a:ext cx="764693" cy="955815"/>
+          </a:xfrm>
+          <a:prstGeom prst="rect">
+            <a:avLst/>
+          </a:prstGeom>
+        </p:spPr>
+        <p:style>
+          <a:lnRef idx="2">
+            <a:schemeClr val="dk1"/>
+          </a:lnRef>
+          <a:fillRef idx="1">
+            <a:schemeClr val="lt1"/>
+          </a:fillRef>
+          <a:effectRef idx="0">
+            <a:schemeClr val="dk1"/>
+          </a:effectRef>
+          <a:fontRef idx="minor">
+            <a:schemeClr val="dk1"/>
+          </a:fontRef>
+        </p:style>
+        <p:txBody>
+          <a:bodyPr vert="vert270" rtlCol="0" anchor="ctr"/>
+          <a:lstStyle/>
+          <a:p>
+            <a:pPr algn="ctr"/>
+            <a:r>
+              <a:rPr lang="en-US" sz="1600" dirty="0" smtClean="0">
+                <a:latin typeface="+mj-lt"/>
+              </a:rPr>
+              <a:t>Data</a:t>
+            </a:r>
+          </a:p>
+          <a:p>
+            <a:pPr algn="ctr"/>
+            <a:r>
+              <a:rPr lang="en-US" sz="1600" dirty="0" smtClean="0">
+                <a:latin typeface="+mj-lt"/>
+              </a:rPr>
+              <a:t>Channel</a:t>
+            </a:r>
+            <a:endParaRPr lang="en-US" sz="1400" dirty="0">
+              <a:latin typeface="+mj-lt"/>
+            </a:endParaRPr>
+          </a:p>
+        </p:txBody>
+      </p:sp>
+    </p:spTree>
+    <p:extLst>
+      <p:ext uri="{BB962C8B-B14F-4D97-AF65-F5344CB8AC3E}">
+        <p14:creationId xmlns:p14="http://schemas.microsoft.com/office/powerpoint/2010/main" val="3585768518"/>
+      </p:ext>
+    </p:extLst>
+  </p:cSld>
+  <p:clrMapOvr>
+    <a:masterClrMapping/>
+  </p:clrMapOvr>
+</p:sld>
+</file>
+
+<file path=ppt/slides/slide7.xml><?xml version="1.0" encoding="utf-8"?>
+<p:sld xmlns:a="http://schemas.openxmlformats.org/drawingml/2006/main" xmlns:r="http://schemas.openxmlformats.org/officeDocument/2006/relationships" xmlns:p="http://schemas.openxmlformats.org/presentationml/2006/main">
+  <p:cSld>
+    <p:spTree>
+      <p:nvGrpSpPr>
+        <p:cNvPr id="1" name=""/>
+        <p:cNvGrpSpPr/>
+        <p:nvPr/>
+      </p:nvGrpSpPr>
+      <p:grpSpPr>
+        <a:xfrm>
+          <a:off x="0" y="0"/>
+          <a:ext cx="0" cy="0"/>
+          <a:chOff x="0" y="0"/>
+          <a:chExt cx="0" cy="0"/>
+        </a:xfrm>
+      </p:grpSpPr>
+      <p:sp>
+        <p:nvSpPr>
+          <p:cNvPr id="3" name="Rounded Rectangle 2"/>
+          <p:cNvSpPr/>
+          <p:nvPr/>
+        </p:nvSpPr>
+        <p:spPr>
+          <a:xfrm>
+            <a:off x="91786" y="2526093"/>
+            <a:ext cx="1474785" cy="873892"/>
+          </a:xfrm>
+          <a:prstGeom prst="roundRect">
+            <a:avLst/>
+          </a:prstGeom>
+          <a:solidFill>
+            <a:srgbClr val="404040"/>
+          </a:solidFill>
+          <a:ln>
+            <a:noFill/>
+          </a:ln>
+        </p:spPr>
+        <p:style>
+          <a:lnRef idx="2">
+            <a:schemeClr val="accent3">
+              <a:shade val="50000"/>
+            </a:schemeClr>
+          </a:lnRef>
+          <a:fillRef idx="1">
+            <a:schemeClr val="accent3"/>
+          </a:fillRef>
+          <a:effectRef idx="0">
+            <a:schemeClr val="accent3"/>
+          </a:effectRef>
+          <a:fontRef idx="minor">
+            <a:schemeClr val="lt1"/>
+          </a:fontRef>
+        </p:style>
+        <p:txBody>
+          <a:bodyPr rtlCol="0" anchor="ctr"/>
+          <a:lstStyle/>
+          <a:p>
+            <a:pPr algn="ctr"/>
+            <a:r>
+              <a:rPr lang="en-US" dirty="0" smtClean="0"/>
+              <a:t>Receive</a:t>
+            </a:r>
+          </a:p>
+          <a:p>
+            <a:pPr algn="ctr"/>
+            <a:r>
+              <a:rPr lang="en-US" dirty="0" smtClean="0"/>
+              <a:t>UDP Packet</a:t>
+            </a:r>
+          </a:p>
+        </p:txBody>
+      </p:sp>
+      <p:cxnSp>
+        <p:nvCxnSpPr>
+          <p:cNvPr id="5" name="Straight Arrow Connector 4"/>
+          <p:cNvCxnSpPr>
+            <a:stCxn id="3" idx="3"/>
+            <a:endCxn id="6" idx="1"/>
+          </p:cNvCxnSpPr>
+          <p:nvPr/>
+        </p:nvCxnSpPr>
+        <p:spPr>
+          <a:xfrm>
+            <a:off x="1566571" y="2963039"/>
+            <a:ext cx="450627" cy="0"/>
+          </a:xfrm>
+          <a:prstGeom prst="straightConnector1">
+            <a:avLst/>
+          </a:prstGeom>
+          <a:ln>
+            <a:tailEnd type="arrow"/>
+          </a:ln>
+        </p:spPr>
+        <p:style>
+          <a:lnRef idx="1">
+            <a:schemeClr val="dk1"/>
+          </a:lnRef>
+          <a:fillRef idx="0">
+            <a:schemeClr val="dk1"/>
+          </a:fillRef>
+          <a:effectRef idx="0">
+            <a:schemeClr val="dk1"/>
+          </a:effectRef>
+          <a:fontRef idx="minor">
+            <a:schemeClr val="tx1"/>
+          </a:fontRef>
+        </p:style>
+      </p:cxnSp>
+      <p:sp>
+        <p:nvSpPr>
+          <p:cNvPr id="6" name="Rectangle 5"/>
+          <p:cNvSpPr/>
+          <p:nvPr/>
+        </p:nvSpPr>
+        <p:spPr>
+          <a:xfrm>
+            <a:off x="2017198" y="710037"/>
+            <a:ext cx="751048" cy="4506003"/>
+          </a:xfrm>
+          <a:prstGeom prst="rect">
+            <a:avLst/>
+          </a:prstGeom>
+          <a:solidFill>
+            <a:schemeClr val="tx1">
+              <a:lumMod val="75000"/>
+              <a:lumOff val="25000"/>
+            </a:schemeClr>
+          </a:solidFill>
+          <a:ln>
+            <a:noFill/>
+          </a:ln>
+        </p:spPr>
+        <p:style>
+          <a:lnRef idx="2">
+            <a:schemeClr val="dk1">
+              <a:shade val="50000"/>
+            </a:schemeClr>
+          </a:lnRef>
+          <a:fillRef idx="1">
+            <a:schemeClr val="dk1"/>
+          </a:fillRef>
+          <a:effectRef idx="0">
+            <a:schemeClr val="dk1"/>
+          </a:effectRef>
+          <a:fontRef idx="minor">
+            <a:schemeClr val="lt1"/>
+          </a:fontRef>
+        </p:style>
+        <p:txBody>
+          <a:bodyPr vert="vert270" rtlCol="0" anchor="ctr"/>
+          <a:lstStyle/>
+          <a:p>
+            <a:pPr algn="ctr"/>
+            <a:r>
+              <a:rPr lang="en-US" sz="2000" dirty="0" smtClean="0">
+                <a:latin typeface="Courier"/>
+                <a:cs typeface="Courier"/>
+              </a:rPr>
+              <a:t>H</a:t>
+            </a:r>
+            <a:r>
+              <a:rPr lang="en-US" dirty="0" smtClean="0"/>
+              <a:t>-&gt; </a:t>
+            </a:r>
+            <a:r>
+              <a:rPr lang="en-US" sz="1400" dirty="0" smtClean="0"/>
+              <a:t>Parse first 8-bits of UDP Payload</a:t>
+            </a:r>
+            <a:endParaRPr lang="en-US" sz="1600" dirty="0"/>
+          </a:p>
+        </p:txBody>
+      </p:sp>
+      <p:cxnSp>
+        <p:nvCxnSpPr>
+          <p:cNvPr id="20" name="Straight Arrow Connector 19"/>
+          <p:cNvCxnSpPr>
+            <a:endCxn id="25" idx="1"/>
+          </p:cNvCxnSpPr>
+          <p:nvPr/>
+        </p:nvCxnSpPr>
+        <p:spPr>
+          <a:xfrm>
+            <a:off x="2768246" y="1490632"/>
+            <a:ext cx="1631813" cy="0"/>
+          </a:xfrm>
+          <a:prstGeom prst="straightConnector1">
+            <a:avLst/>
+          </a:prstGeom>
+          <a:ln>
+            <a:tailEnd type="arrow"/>
+          </a:ln>
+        </p:spPr>
+        <p:style>
+          <a:lnRef idx="1">
+            <a:schemeClr val="dk1"/>
+          </a:lnRef>
+          <a:fillRef idx="0">
+            <a:schemeClr val="dk1"/>
+          </a:fillRef>
+          <a:effectRef idx="0">
+            <a:schemeClr val="dk1"/>
+          </a:effectRef>
+          <a:fontRef idx="minor">
+            <a:schemeClr val="tx1"/>
+          </a:fontRef>
+        </p:style>
+      </p:cxnSp>
+      <p:cxnSp>
+        <p:nvCxnSpPr>
+          <p:cNvPr id="22" name="Straight Arrow Connector 21"/>
+          <p:cNvCxnSpPr>
+            <a:stCxn id="6" idx="3"/>
+            <a:endCxn id="27" idx="1"/>
+          </p:cNvCxnSpPr>
+          <p:nvPr/>
+        </p:nvCxnSpPr>
+        <p:spPr>
+          <a:xfrm flipV="1">
+            <a:off x="2768246" y="2960544"/>
+            <a:ext cx="1634613" cy="2495"/>
+          </a:xfrm>
+          <a:prstGeom prst="straightConnector1">
+            <a:avLst/>
+          </a:prstGeom>
+          <a:ln>
+            <a:tailEnd type="arrow"/>
+          </a:ln>
+        </p:spPr>
+        <p:style>
+          <a:lnRef idx="1">
+            <a:schemeClr val="dk1"/>
+          </a:lnRef>
+          <a:fillRef idx="0">
+            <a:schemeClr val="dk1"/>
+          </a:fillRef>
+          <a:effectRef idx="0">
+            <a:schemeClr val="dk1"/>
+          </a:effectRef>
+          <a:fontRef idx="minor">
+            <a:schemeClr val="tx1"/>
+          </a:fontRef>
+        </p:style>
+      </p:cxnSp>
+      <p:cxnSp>
+        <p:nvCxnSpPr>
+          <p:cNvPr id="23" name="Straight Arrow Connector 22"/>
+          <p:cNvCxnSpPr>
+            <a:endCxn id="30" idx="1"/>
+          </p:cNvCxnSpPr>
+          <p:nvPr/>
+        </p:nvCxnSpPr>
+        <p:spPr>
+          <a:xfrm>
+            <a:off x="2771043" y="4476266"/>
+            <a:ext cx="1659123" cy="0"/>
+          </a:xfrm>
+          <a:prstGeom prst="straightConnector1">
+            <a:avLst/>
+          </a:prstGeom>
+          <a:ln>
+            <a:tailEnd type="arrow"/>
+          </a:ln>
+        </p:spPr>
+        <p:style>
+          <a:lnRef idx="1">
+            <a:schemeClr val="dk1"/>
+          </a:lnRef>
+          <a:fillRef idx="0">
+            <a:schemeClr val="dk1"/>
+          </a:fillRef>
+          <a:effectRef idx="0">
+            <a:schemeClr val="dk1"/>
+          </a:effectRef>
+          <a:fontRef idx="minor">
+            <a:schemeClr val="tx1"/>
+          </a:fontRef>
+        </p:style>
+      </p:cxnSp>
+      <p:sp>
+        <p:nvSpPr>
+          <p:cNvPr id="24" name="TextBox 23"/>
+          <p:cNvSpPr txBox="1"/>
+          <p:nvPr/>
+        </p:nvSpPr>
+        <p:spPr>
+          <a:xfrm>
+            <a:off x="3191558" y="1139826"/>
+            <a:ext cx="710451" cy="369332"/>
+          </a:xfrm>
+          <a:prstGeom prst="rect">
+            <a:avLst/>
+          </a:prstGeom>
+          <a:noFill/>
+        </p:spPr>
+        <p:txBody>
+          <a:bodyPr wrap="none" rtlCol="0">
+            <a:spAutoFit/>
+          </a:bodyPr>
+          <a:lstStyle/>
+          <a:p>
+            <a:r>
+              <a:rPr lang="en-US" dirty="0" smtClean="0">
+                <a:latin typeface="+mj-lt"/>
+              </a:rPr>
+              <a:t>H</a:t>
+            </a:r>
+            <a:r>
+              <a:rPr lang="en-US" dirty="0" smtClean="0"/>
+              <a:t> &lt; 2</a:t>
+            </a:r>
+            <a:endParaRPr lang="en-US" dirty="0"/>
+          </a:p>
+        </p:txBody>
+      </p:sp>
+      <p:sp>
+        <p:nvSpPr>
+          <p:cNvPr id="25" name="TextBox 24"/>
+          <p:cNvSpPr txBox="1"/>
+          <p:nvPr/>
+        </p:nvSpPr>
+        <p:spPr>
+          <a:xfrm>
+            <a:off x="4400059" y="1167466"/>
+            <a:ext cx="4257464" cy="646331"/>
+          </a:xfrm>
+          <a:prstGeom prst="rect">
+            <a:avLst/>
+          </a:prstGeom>
+          <a:noFill/>
+        </p:spPr>
+        <p:txBody>
+          <a:bodyPr wrap="square" rtlCol="0">
+            <a:spAutoFit/>
+          </a:bodyPr>
+          <a:lstStyle/>
+          <a:p>
+            <a:r>
+              <a:rPr lang="en-US" dirty="0" smtClean="0">
+                <a:latin typeface="Courier"/>
+                <a:cs typeface="Courier"/>
+              </a:rPr>
+              <a:t>0b00 </a:t>
+            </a:r>
+            <a:r>
+              <a:rPr lang="en-US" dirty="0" smtClean="0">
+                <a:latin typeface="+mj-lt"/>
+              </a:rPr>
+              <a:t>STUN</a:t>
+            </a:r>
+            <a:r>
+              <a:rPr lang="en-US" dirty="0" smtClean="0"/>
+              <a:t> Message</a:t>
+            </a:r>
+          </a:p>
+          <a:p>
+            <a:r>
+              <a:rPr lang="en-US" dirty="0" smtClean="0">
+                <a:latin typeface="Courier"/>
+                <a:cs typeface="Courier"/>
+              </a:rPr>
+              <a:t>0b01 </a:t>
+            </a:r>
+            <a:r>
+              <a:rPr lang="en-US" dirty="0" err="1" smtClean="0">
+                <a:latin typeface="Courier"/>
+                <a:cs typeface="Courier"/>
+              </a:rPr>
+              <a:t>ChannelData</a:t>
+            </a:r>
+            <a:r>
+              <a:rPr lang="en-US" dirty="0" smtClean="0"/>
+              <a:t> Message (</a:t>
+            </a:r>
+            <a:r>
+              <a:rPr lang="en-US" dirty="0" smtClean="0">
+                <a:latin typeface="+mj-lt"/>
+              </a:rPr>
+              <a:t>TURN</a:t>
+            </a:r>
+            <a:r>
+              <a:rPr lang="en-US" dirty="0" smtClean="0"/>
+              <a:t>)</a:t>
+            </a:r>
+            <a:endParaRPr lang="en-US" dirty="0"/>
+          </a:p>
+        </p:txBody>
+      </p:sp>
+      <p:sp>
+        <p:nvSpPr>
+          <p:cNvPr id="26" name="TextBox 25"/>
+          <p:cNvSpPr txBox="1"/>
+          <p:nvPr/>
+        </p:nvSpPr>
+        <p:spPr>
+          <a:xfrm>
+            <a:off x="2932106" y="2593707"/>
+            <a:ext cx="1306972" cy="369332"/>
+          </a:xfrm>
+          <a:prstGeom prst="rect">
+            <a:avLst/>
+          </a:prstGeom>
+          <a:noFill/>
+        </p:spPr>
+        <p:txBody>
+          <a:bodyPr wrap="none" rtlCol="0">
+            <a:spAutoFit/>
+          </a:bodyPr>
+          <a:lstStyle/>
+          <a:p>
+            <a:r>
+              <a:rPr lang="en-US" dirty="0" smtClean="0"/>
+              <a:t>19 &lt; </a:t>
+            </a:r>
+            <a:r>
+              <a:rPr lang="en-US" dirty="0" smtClean="0">
+                <a:latin typeface="+mj-lt"/>
+              </a:rPr>
+              <a:t>H</a:t>
+            </a:r>
+            <a:r>
+              <a:rPr lang="en-US" dirty="0" smtClean="0"/>
+              <a:t> &lt; 64</a:t>
+            </a:r>
+            <a:endParaRPr lang="en-US" dirty="0"/>
+          </a:p>
+        </p:txBody>
+      </p:sp>
+      <p:sp>
+        <p:nvSpPr>
+          <p:cNvPr id="27" name="TextBox 26"/>
+          <p:cNvSpPr txBox="1"/>
+          <p:nvPr/>
+        </p:nvSpPr>
+        <p:spPr>
+          <a:xfrm>
+            <a:off x="4402859" y="2015863"/>
+            <a:ext cx="461665" cy="1889362"/>
+          </a:xfrm>
+          <a:prstGeom prst="rect">
+            <a:avLst/>
+          </a:prstGeom>
+          <a:noFill/>
+        </p:spPr>
+        <p:txBody>
+          <a:bodyPr vert="vert270" wrap="none" rtlCol="0">
+            <a:spAutoFit/>
+          </a:bodyPr>
+          <a:lstStyle/>
+          <a:p>
+            <a:r>
+              <a:rPr lang="en-US" dirty="0" smtClean="0"/>
+              <a:t>DTLS Processing</a:t>
+            </a:r>
+            <a:endParaRPr lang="en-US" dirty="0"/>
+          </a:p>
+        </p:txBody>
+      </p:sp>
+      <p:sp>
+        <p:nvSpPr>
+          <p:cNvPr id="30" name="TextBox 29"/>
+          <p:cNvSpPr txBox="1"/>
+          <p:nvPr/>
+        </p:nvSpPr>
+        <p:spPr>
+          <a:xfrm>
+            <a:off x="4430166" y="4291600"/>
+            <a:ext cx="3147015" cy="369332"/>
+          </a:xfrm>
+          <a:prstGeom prst="rect">
+            <a:avLst/>
+          </a:prstGeom>
+          <a:noFill/>
+        </p:spPr>
+        <p:txBody>
+          <a:bodyPr wrap="none" rtlCol="0">
+            <a:spAutoFit/>
+          </a:bodyPr>
+          <a:lstStyle/>
+          <a:p>
+            <a:r>
+              <a:rPr lang="en-US" dirty="0" smtClean="0"/>
+              <a:t>Forward to </a:t>
+            </a:r>
+            <a:r>
+              <a:rPr lang="en-US" dirty="0" smtClean="0">
+                <a:latin typeface="+mj-lt"/>
+              </a:rPr>
+              <a:t>RTP </a:t>
+            </a:r>
+            <a:r>
+              <a:rPr lang="en-US" dirty="0" smtClean="0"/>
+              <a:t>Processing</a:t>
+            </a:r>
+            <a:endParaRPr lang="en-US" dirty="0"/>
+          </a:p>
+        </p:txBody>
+      </p:sp>
+      <p:sp>
+        <p:nvSpPr>
+          <p:cNvPr id="36" name="TextBox 35"/>
+          <p:cNvSpPr txBox="1"/>
+          <p:nvPr/>
+        </p:nvSpPr>
+        <p:spPr>
+          <a:xfrm>
+            <a:off x="2798353" y="4106934"/>
+            <a:ext cx="1505540" cy="369332"/>
+          </a:xfrm>
+          <a:prstGeom prst="rect">
+            <a:avLst/>
+          </a:prstGeom>
+          <a:noFill/>
+        </p:spPr>
+        <p:txBody>
+          <a:bodyPr wrap="none" rtlCol="0">
+            <a:spAutoFit/>
+          </a:bodyPr>
+          <a:lstStyle/>
+          <a:p>
+            <a:r>
+              <a:rPr lang="en-US" dirty="0" smtClean="0"/>
+              <a:t>127 &lt; </a:t>
+            </a:r>
+            <a:r>
+              <a:rPr lang="en-US" dirty="0" smtClean="0">
+                <a:latin typeface="+mj-lt"/>
+              </a:rPr>
+              <a:t>H</a:t>
+            </a:r>
+            <a:r>
+              <a:rPr lang="en-US" dirty="0" smtClean="0"/>
+              <a:t> &lt; 192</a:t>
+            </a:r>
+            <a:endParaRPr lang="en-US" dirty="0"/>
+          </a:p>
+        </p:txBody>
+      </p:sp>
+      <p:cxnSp>
+        <p:nvCxnSpPr>
+          <p:cNvPr id="39" name="Straight Arrow Connector 38"/>
+          <p:cNvCxnSpPr>
+            <a:endCxn id="41" idx="1"/>
+          </p:cNvCxnSpPr>
+          <p:nvPr/>
+        </p:nvCxnSpPr>
+        <p:spPr>
+          <a:xfrm>
+            <a:off x="4932799" y="2498783"/>
+            <a:ext cx="1112741" cy="0"/>
+          </a:xfrm>
+          <a:prstGeom prst="straightConnector1">
+            <a:avLst/>
+          </a:prstGeom>
+          <a:ln>
+            <a:tailEnd type="arrow"/>
+          </a:ln>
+        </p:spPr>
+        <p:style>
+          <a:lnRef idx="1">
+            <a:schemeClr val="dk1"/>
+          </a:lnRef>
+          <a:fillRef idx="0">
+            <a:schemeClr val="dk1"/>
+          </a:fillRef>
+          <a:effectRef idx="0">
+            <a:schemeClr val="dk1"/>
+          </a:effectRef>
+          <a:fontRef idx="minor">
+            <a:schemeClr val="tx1"/>
+          </a:fontRef>
+        </p:style>
+      </p:cxnSp>
+      <p:cxnSp>
+        <p:nvCxnSpPr>
+          <p:cNvPr id="40" name="Straight Arrow Connector 39"/>
+          <p:cNvCxnSpPr>
+            <a:endCxn id="43" idx="1"/>
+          </p:cNvCxnSpPr>
+          <p:nvPr/>
+        </p:nvCxnSpPr>
+        <p:spPr>
+          <a:xfrm>
+            <a:off x="4932799" y="3372675"/>
+            <a:ext cx="1112741" cy="0"/>
+          </a:xfrm>
+          <a:prstGeom prst="straightConnector1">
+            <a:avLst/>
+          </a:prstGeom>
+          <a:ln>
+            <a:tailEnd type="arrow"/>
+          </a:ln>
+        </p:spPr>
+        <p:style>
+          <a:lnRef idx="1">
+            <a:schemeClr val="dk1"/>
+          </a:lnRef>
+          <a:fillRef idx="0">
+            <a:schemeClr val="dk1"/>
+          </a:fillRef>
+          <a:effectRef idx="0">
+            <a:schemeClr val="dk1"/>
+          </a:effectRef>
+          <a:fontRef idx="minor">
+            <a:schemeClr val="tx1"/>
+          </a:fontRef>
+        </p:style>
+      </p:cxnSp>
+      <p:sp>
+        <p:nvSpPr>
+          <p:cNvPr id="41" name="TextBox 40"/>
+          <p:cNvSpPr txBox="1"/>
+          <p:nvPr/>
+        </p:nvSpPr>
+        <p:spPr>
+          <a:xfrm>
+            <a:off x="6045540" y="2314117"/>
+            <a:ext cx="800219" cy="369332"/>
+          </a:xfrm>
+          <a:prstGeom prst="rect">
+            <a:avLst/>
+          </a:prstGeom>
+          <a:noFill/>
+        </p:spPr>
+        <p:txBody>
+          <a:bodyPr wrap="none" rtlCol="0">
+            <a:spAutoFit/>
+          </a:bodyPr>
+          <a:lstStyle/>
+          <a:p>
+            <a:r>
+              <a:rPr lang="en-US" dirty="0" smtClean="0">
+                <a:latin typeface="+mj-lt"/>
+              </a:rPr>
+              <a:t>SCTP</a:t>
+            </a:r>
+            <a:endParaRPr lang="en-US" dirty="0">
+              <a:latin typeface="+mj-lt"/>
+            </a:endParaRPr>
+          </a:p>
+        </p:txBody>
+      </p:sp>
+      <p:sp>
+        <p:nvSpPr>
+          <p:cNvPr id="43" name="TextBox 42"/>
+          <p:cNvSpPr txBox="1"/>
+          <p:nvPr/>
+        </p:nvSpPr>
+        <p:spPr>
+          <a:xfrm>
+            <a:off x="6045540" y="3188009"/>
+            <a:ext cx="774571" cy="369332"/>
+          </a:xfrm>
+          <a:prstGeom prst="rect">
+            <a:avLst/>
+          </a:prstGeom>
+          <a:noFill/>
+        </p:spPr>
+        <p:txBody>
+          <a:bodyPr wrap="none" rtlCol="0">
+            <a:spAutoFit/>
+          </a:bodyPr>
+          <a:lstStyle/>
+          <a:p>
+            <a:r>
+              <a:rPr lang="en-US" dirty="0">
+                <a:latin typeface="+mj-lt"/>
+              </a:rPr>
+              <a:t>DTLS</a:t>
+            </a:r>
+            <a:endParaRPr lang="en-US" dirty="0">
+              <a:latin typeface="+mj-lt"/>
+            </a:endParaRPr>
+          </a:p>
+        </p:txBody>
+      </p:sp>
+    </p:spTree>
+    <p:extLst>
+      <p:ext uri="{BB962C8B-B14F-4D97-AF65-F5344CB8AC3E}">
+        <p14:creationId xmlns:p14="http://schemas.microsoft.com/office/powerpoint/2010/main" val="1482038348"/>
       </p:ext>
     </p:extLst>
   </p:cSld>
@@ -6931,4 +8992,324 @@
   </a:objectDefaults>
   <a:extraClrSchemeLst/>
 </a:theme>
+</file>
+
+<file path=ppt/theme/theme2.xml><?xml version="1.0" encoding="utf-8"?>
+<a:theme xmlns:a="http://schemas.openxmlformats.org/drawingml/2006/main" name="Office Theme">
+  <a:themeElements>
+    <a:clrScheme name="Office">
+      <a:dk1>
+        <a:sysClr val="windowText" lastClr="000000"/>
+      </a:dk1>
+      <a:lt1>
+        <a:sysClr val="window" lastClr="FFFFFF"/>
+      </a:lt1>
+      <a:dk2>
+        <a:srgbClr val="1F497D"/>
+      </a:dk2>
+      <a:lt2>
+        <a:srgbClr val="EEECE1"/>
+      </a:lt2>
+      <a:accent1>
+        <a:srgbClr val="4F81BD"/>
+      </a:accent1>
+      <a:accent2>
+        <a:srgbClr val="C0504D"/>
+      </a:accent2>
+      <a:accent3>
+        <a:srgbClr val="9BBB59"/>
+      </a:accent3>
+      <a:accent4>
+        <a:srgbClr val="8064A2"/>
+      </a:accent4>
+      <a:accent5>
+        <a:srgbClr val="4BACC6"/>
+      </a:accent5>
+      <a:accent6>
+        <a:srgbClr val="F79646"/>
+      </a:accent6>
+      <a:hlink>
+        <a:srgbClr val="0000FF"/>
+      </a:hlink>
+      <a:folHlink>
+        <a:srgbClr val="800080"/>
+      </a:folHlink>
+    </a:clrScheme>
+    <a:fontScheme name="Office">
+      <a:majorFont>
+        <a:latin typeface="Calibri"/>
+        <a:ea typeface=""/>
+        <a:cs typeface=""/>
+        <a:font script="Jpan" typeface="ＭＳ Ｐゴシック"/>
+        <a:font script="Hang" typeface="맑은 고딕"/>
+        <a:font script="Hans" typeface="宋体"/>
+        <a:font script="Hant" typeface="新細明體"/>
+        <a:font script="Arab" typeface="Times New Roman"/>
+        <a:font script="Hebr" typeface="Times New Roman"/>
+        <a:font script="Thai" typeface="Angsana New"/>
+        <a:font script="Ethi" typeface="Nyala"/>
+        <a:font script="Beng" typeface="Vrinda"/>
+        <a:font script="Gujr" typeface="Shruti"/>
+        <a:font script="Khmr" typeface="MoolBoran"/>
+        <a:font script="Knda" typeface="Tunga"/>
+        <a:font script="Guru" typeface="Raavi"/>
+        <a:font script="Cans" typeface="Euphemia"/>
+        <a:font script="Cher" typeface="Plantagenet Cherokee"/>
+        <a:font script="Yiii" typeface="Microsoft Yi Baiti"/>
+        <a:font script="Tibt" typeface="Microsoft Himalaya"/>
+        <a:font script="Thaa" typeface="MV Boli"/>
+        <a:font script="Deva" typeface="Mangal"/>
+        <a:font script="Telu" typeface="Gautami"/>
+        <a:font script="Taml" typeface="Latha"/>
+        <a:font script="Syrc" typeface="Estrangelo Edessa"/>
+        <a:font script="Orya" typeface="Kalinga"/>
+        <a:font script="Mlym" typeface="Kartika"/>
+        <a:font script="Laoo" typeface="DokChampa"/>
+        <a:font script="Sinh" typeface="Iskoola Pota"/>
+        <a:font script="Mong" typeface="Mongolian Baiti"/>
+        <a:font script="Viet" typeface="Times New Roman"/>
+        <a:font script="Uigh" typeface="Microsoft Uighur"/>
+        <a:font script="Geor" typeface="Sylfaen"/>
+      </a:majorFont>
+      <a:minorFont>
+        <a:latin typeface="Calibri"/>
+        <a:ea typeface=""/>
+        <a:cs typeface=""/>
+        <a:font script="Jpan" typeface="ＭＳ Ｐゴシック"/>
+        <a:font script="Hang" typeface="맑은 고딕"/>
+        <a:font script="Hans" typeface="宋体"/>
+        <a:font script="Hant" typeface="新細明體"/>
+        <a:font script="Arab" typeface="Arial"/>
+        <a:font script="Hebr" typeface="Arial"/>
+        <a:font script="Thai" typeface="Cordia New"/>
+        <a:font script="Ethi" typeface="Nyala"/>
+        <a:font script="Beng" typeface="Vrinda"/>
+        <a:font script="Gujr" typeface="Shruti"/>
+        <a:font script="Khmr" typeface="DaunPenh"/>
+        <a:font script="Knda" typeface="Tunga"/>
+        <a:font script="Guru" typeface="Raavi"/>
+        <a:font script="Cans" typeface="Euphemia"/>
+        <a:font script="Cher" typeface="Plantagenet Cherokee"/>
+        <a:font script="Yiii" typeface="Microsoft Yi Baiti"/>
+        <a:font script="Tibt" typeface="Microsoft Himalaya"/>
+        <a:font script="Thaa" typeface="MV Boli"/>
+        <a:font script="Deva" typeface="Mangal"/>
+        <a:font script="Telu" typeface="Gautami"/>
+        <a:font script="Taml" typeface="Latha"/>
+        <a:font script="Syrc" typeface="Estrangelo Edessa"/>
+        <a:font script="Orya" typeface="Kalinga"/>
+        <a:font script="Mlym" typeface="Kartika"/>
+        <a:font script="Laoo" typeface="DokChampa"/>
+        <a:font script="Sinh" typeface="Iskoola Pota"/>
+        <a:font script="Mong" typeface="Mongolian Baiti"/>
+        <a:font script="Viet" typeface="Arial"/>
+        <a:font script="Uigh" typeface="Microsoft Uighur"/>
+        <a:font script="Geor" typeface="Sylfaen"/>
+      </a:minorFont>
+    </a:fontScheme>
+    <a:fmtScheme name="Office">
+      <a:fillStyleLst>
+        <a:solidFill>
+          <a:schemeClr val="phClr"/>
+        </a:solidFill>
+        <a:gradFill rotWithShape="1">
+          <a:gsLst>
+            <a:gs pos="0">
+              <a:schemeClr val="phClr">
+                <a:tint val="50000"/>
+                <a:satMod val="300000"/>
+              </a:schemeClr>
+            </a:gs>
+            <a:gs pos="35000">
+              <a:schemeClr val="phClr">
+                <a:tint val="37000"/>
+                <a:satMod val="300000"/>
+              </a:schemeClr>
+            </a:gs>
+            <a:gs pos="100000">
+              <a:schemeClr val="phClr">
+                <a:tint val="15000"/>
+                <a:satMod val="350000"/>
+              </a:schemeClr>
+            </a:gs>
+          </a:gsLst>
+          <a:lin ang="16200000" scaled="1"/>
+        </a:gradFill>
+        <a:gradFill rotWithShape="1">
+          <a:gsLst>
+            <a:gs pos="0">
+              <a:schemeClr val="phClr">
+                <a:tint val="100000"/>
+                <a:shade val="100000"/>
+                <a:satMod val="130000"/>
+              </a:schemeClr>
+            </a:gs>
+            <a:gs pos="100000">
+              <a:schemeClr val="phClr">
+                <a:tint val="50000"/>
+                <a:shade val="100000"/>
+                <a:satMod val="350000"/>
+              </a:schemeClr>
+            </a:gs>
+          </a:gsLst>
+          <a:lin ang="16200000" scaled="0"/>
+        </a:gradFill>
+      </a:fillStyleLst>
+      <a:lnStyleLst>
+        <a:ln w="9525" cap="flat" cmpd="sng" algn="ctr">
+          <a:solidFill>
+            <a:schemeClr val="phClr">
+              <a:shade val="95000"/>
+              <a:satMod val="105000"/>
+            </a:schemeClr>
+          </a:solidFill>
+          <a:prstDash val="solid"/>
+        </a:ln>
+        <a:ln w="25400" cap="flat" cmpd="sng" algn="ctr">
+          <a:solidFill>
+            <a:schemeClr val="phClr"/>
+          </a:solidFill>
+          <a:prstDash val="solid"/>
+        </a:ln>
+        <a:ln w="38100" cap="flat" cmpd="sng" algn="ctr">
+          <a:solidFill>
+            <a:schemeClr val="phClr"/>
+          </a:solidFill>
+          <a:prstDash val="solid"/>
+        </a:ln>
+      </a:lnStyleLst>
+      <a:effectStyleLst>
+        <a:effectStyle>
+          <a:effectLst>
+            <a:outerShdw blurRad="40000" dist="20000" dir="5400000" rotWithShape="0">
+              <a:srgbClr val="000000">
+                <a:alpha val="38000"/>
+              </a:srgbClr>
+            </a:outerShdw>
+          </a:effectLst>
+        </a:effectStyle>
+        <a:effectStyle>
+          <a:effectLst>
+            <a:outerShdw blurRad="40000" dist="23000" dir="5400000" rotWithShape="0">
+              <a:srgbClr val="000000">
+                <a:alpha val="35000"/>
+              </a:srgbClr>
+            </a:outerShdw>
+          </a:effectLst>
+        </a:effectStyle>
+        <a:effectStyle>
+          <a:effectLst>
+            <a:outerShdw blurRad="40000" dist="23000" dir="5400000" rotWithShape="0">
+              <a:srgbClr val="000000">
+                <a:alpha val="35000"/>
+              </a:srgbClr>
+            </a:outerShdw>
+          </a:effectLst>
+          <a:scene3d>
+            <a:camera prst="orthographicFront">
+              <a:rot lat="0" lon="0" rev="0"/>
+            </a:camera>
+            <a:lightRig rig="threePt" dir="t">
+              <a:rot lat="0" lon="0" rev="1200000"/>
+            </a:lightRig>
+          </a:scene3d>
+          <a:sp3d>
+            <a:bevelT w="63500" h="25400"/>
+          </a:sp3d>
+        </a:effectStyle>
+      </a:effectStyleLst>
+      <a:bgFillStyleLst>
+        <a:solidFill>
+          <a:schemeClr val="phClr"/>
+        </a:solidFill>
+        <a:gradFill rotWithShape="1">
+          <a:gsLst>
+            <a:gs pos="0">
+              <a:schemeClr val="phClr">
+                <a:tint val="40000"/>
+                <a:satMod val="350000"/>
+              </a:schemeClr>
+            </a:gs>
+            <a:gs pos="40000">
+              <a:schemeClr val="phClr">
+                <a:tint val="45000"/>
+                <a:shade val="99000"/>
+                <a:satMod val="350000"/>
+              </a:schemeClr>
+            </a:gs>
+            <a:gs pos="100000">
+              <a:schemeClr val="phClr">
+                <a:shade val="20000"/>
+                <a:satMod val="255000"/>
+              </a:schemeClr>
+            </a:gs>
+          </a:gsLst>
+          <a:path path="circle">
+            <a:fillToRect l="50000" t="-80000" r="50000" b="180000"/>
+          </a:path>
+        </a:gradFill>
+        <a:gradFill rotWithShape="1">
+          <a:gsLst>
+            <a:gs pos="0">
+              <a:schemeClr val="phClr">
+                <a:tint val="80000"/>
+                <a:satMod val="300000"/>
+              </a:schemeClr>
+            </a:gs>
+            <a:gs pos="100000">
+              <a:schemeClr val="phClr">
+                <a:shade val="30000"/>
+                <a:satMod val="200000"/>
+              </a:schemeClr>
+            </a:gs>
+          </a:gsLst>
+          <a:path path="circle">
+            <a:fillToRect l="50000" t="50000" r="50000" b="50000"/>
+          </a:path>
+        </a:gradFill>
+      </a:bgFillStyleLst>
+    </a:fmtScheme>
+  </a:themeElements>
+  <a:objectDefaults>
+    <a:spDef>
+      <a:spPr/>
+      <a:bodyPr/>
+      <a:lstStyle/>
+      <a:style>
+        <a:lnRef idx="1">
+          <a:schemeClr val="accent1"/>
+        </a:lnRef>
+        <a:fillRef idx="3">
+          <a:schemeClr val="accent1"/>
+        </a:fillRef>
+        <a:effectRef idx="2">
+          <a:schemeClr val="accent1"/>
+        </a:effectRef>
+        <a:fontRef idx="minor">
+          <a:schemeClr val="lt1"/>
+        </a:fontRef>
+      </a:style>
+    </a:spDef>
+    <a:lnDef>
+      <a:spPr/>
+      <a:bodyPr/>
+      <a:lstStyle/>
+      <a:style>
+        <a:lnRef idx="2">
+          <a:schemeClr val="accent1"/>
+        </a:lnRef>
+        <a:fillRef idx="0">
+          <a:schemeClr val="accent1"/>
+        </a:fillRef>
+        <a:effectRef idx="1">
+          <a:schemeClr val="accent1"/>
+        </a:effectRef>
+        <a:fontRef idx="minor">
+          <a:schemeClr val="tx1"/>
+        </a:fontRef>
+      </a:style>
+    </a:lnDef>
+  </a:objectDefaults>
+  <a:extraClrSchemeLst/>
+</a:theme>
 </file>
</xml_diff>

<commit_message>
chap6: updated graph of FEC outline
</commit_message>
<xml_diff>
--- a/graphs/source/chap5-src.pptx
+++ b/graphs/source/chap5-src.pptx
@@ -9245,7 +9245,7 @@
           <a:p>
             <a:pPr algn="ctr"/>
             <a:r>
-              <a:rPr lang="en-US" sz="1400" dirty="0" smtClean="0"/>
+              <a:rPr lang="en-US" sz="1400" b="1" dirty="0" smtClean="0"/>
               <a:t>RTCP Interval</a:t>
             </a:r>
           </a:p>
@@ -10341,7 +10341,7 @@
             <a:lstStyle/>
             <a:p>
               <a:pPr algn="ctr"/>
-              <a:endParaRPr lang="en-US"/>
+              <a:endParaRPr lang="en-US" dirty="0"/>
             </a:p>
           </p:txBody>
         </p:sp>
@@ -10995,6 +10995,142 @@
               <a:latin typeface="Courier"/>
               <a:cs typeface="Courier"/>
             </a:endParaRPr>
+          </a:p>
+        </p:txBody>
+      </p:sp>
+      <p:cxnSp>
+        <p:nvCxnSpPr>
+          <p:cNvPr id="5" name="Straight Arrow Connector 4"/>
+          <p:cNvCxnSpPr>
+            <a:stCxn id="11" idx="0"/>
+          </p:cNvCxnSpPr>
+          <p:nvPr/>
+        </p:nvCxnSpPr>
+        <p:spPr>
+          <a:xfrm flipV="1">
+            <a:off x="1888827" y="4997533"/>
+            <a:ext cx="0" cy="445515"/>
+          </a:xfrm>
+          <a:prstGeom prst="straightConnector1">
+            <a:avLst/>
+          </a:prstGeom>
+          <a:ln>
+            <a:solidFill>
+              <a:schemeClr val="tx1">
+                <a:lumMod val="50000"/>
+                <a:lumOff val="50000"/>
+              </a:schemeClr>
+            </a:solidFill>
+            <a:tailEnd type="arrow"/>
+          </a:ln>
+        </p:spPr>
+        <p:style>
+          <a:lnRef idx="1">
+            <a:schemeClr val="dk1"/>
+          </a:lnRef>
+          <a:fillRef idx="0">
+            <a:schemeClr val="dk1"/>
+          </a:fillRef>
+          <a:effectRef idx="0">
+            <a:schemeClr val="dk1"/>
+          </a:effectRef>
+          <a:fontRef idx="minor">
+            <a:schemeClr val="tx1"/>
+          </a:fontRef>
+        </p:style>
+      </p:cxnSp>
+      <p:sp>
+        <p:nvSpPr>
+          <p:cNvPr id="11" name="TextBox 10"/>
+          <p:cNvSpPr txBox="1"/>
+          <p:nvPr/>
+        </p:nvSpPr>
+        <p:spPr>
+          <a:xfrm>
+            <a:off x="1155293" y="5443048"/>
+            <a:ext cx="1467068" cy="307777"/>
+          </a:xfrm>
+          <a:prstGeom prst="rect">
+            <a:avLst/>
+          </a:prstGeom>
+          <a:noFill/>
+        </p:spPr>
+        <p:txBody>
+          <a:bodyPr wrap="none" rtlCol="0">
+            <a:spAutoFit/>
+          </a:bodyPr>
+          <a:lstStyle/>
+          <a:p>
+            <a:r>
+              <a:rPr lang="en-US" sz="1400" b="1" dirty="0" smtClean="0"/>
+              <a:t>(A) Adding FEC</a:t>
+            </a:r>
+            <a:endParaRPr lang="en-US" sz="1400" b="1" dirty="0"/>
+          </a:p>
+        </p:txBody>
+      </p:sp>
+      <p:cxnSp>
+        <p:nvCxnSpPr>
+          <p:cNvPr id="14" name="Straight Arrow Connector 13"/>
+          <p:cNvCxnSpPr/>
+          <p:nvPr/>
+        </p:nvCxnSpPr>
+        <p:spPr>
+          <a:xfrm>
+            <a:off x="2310034" y="2949388"/>
+            <a:ext cx="841522" cy="0"/>
+          </a:xfrm>
+          <a:prstGeom prst="straightConnector1">
+            <a:avLst/>
+          </a:prstGeom>
+          <a:ln>
+            <a:headEnd type="arrow"/>
+            <a:tailEnd type="arrow"/>
+          </a:ln>
+        </p:spPr>
+        <p:style>
+          <a:lnRef idx="1">
+            <a:schemeClr val="dk1"/>
+          </a:lnRef>
+          <a:fillRef idx="0">
+            <a:schemeClr val="dk1"/>
+          </a:fillRef>
+          <a:effectRef idx="0">
+            <a:schemeClr val="dk1"/>
+          </a:effectRef>
+          <a:fontRef idx="minor">
+            <a:schemeClr val="tx1"/>
+          </a:fontRef>
+        </p:style>
+      </p:cxnSp>
+      <p:sp>
+        <p:nvSpPr>
+          <p:cNvPr id="16" name="TextBox 15"/>
+          <p:cNvSpPr txBox="1"/>
+          <p:nvPr/>
+        </p:nvSpPr>
+        <p:spPr>
+          <a:xfrm>
+            <a:off x="1963827" y="2399345"/>
+            <a:ext cx="1543069" cy="523220"/>
+          </a:xfrm>
+          <a:prstGeom prst="rect">
+            <a:avLst/>
+          </a:prstGeom>
+          <a:noFill/>
+        </p:spPr>
+        <p:txBody>
+          <a:bodyPr wrap="square" rtlCol="0">
+            <a:spAutoFit/>
+          </a:bodyPr>
+          <a:lstStyle/>
+          <a:p>
+            <a:pPr algn="just"/>
+            <a:r>
+              <a:rPr lang="en-US" sz="1400" b="1" i="1" dirty="0" smtClean="0"/>
+              <a:t>(B) Swapping FEC with media</a:t>
+            </a:r>
+            <a:endParaRPr lang="en-US" sz="1400" b="1" i="1" dirty="0"/>
           </a:p>
         </p:txBody>
       </p:sp>

</xml_diff>

<commit_message>
updated blocks in ppt
</commit_message>
<xml_diff>
--- a/graphs/source/chap5-src.pptx
+++ b/graphs/source/chap5-src.pptx
@@ -203,7 +203,7 @@
           <a:p>
             <a:fld id="{7BA68311-98B2-8147-8E3D-5F9C91F16701}" type="datetimeFigureOut">
               <a:rPr lang="en-US" smtClean="0"/>
-              <a:t>9/7/13</a:t>
+              <a:t>10/3/13</a:t>
             </a:fld>
             <a:endParaRPr lang="en-US"/>
           </a:p>
@@ -736,7 +736,7 @@
           <a:p>
             <a:fld id="{CE2D3545-AE21-7247-8426-4B1172E482C1}" type="datetimeFigureOut">
               <a:rPr lang="en-US" smtClean="0"/>
-              <a:t>9/7/13</a:t>
+              <a:t>10/3/13</a:t>
             </a:fld>
             <a:endParaRPr lang="en-US"/>
           </a:p>
@@ -906,7 +906,7 @@
           <a:p>
             <a:fld id="{CE2D3545-AE21-7247-8426-4B1172E482C1}" type="datetimeFigureOut">
               <a:rPr lang="en-US" smtClean="0"/>
-              <a:t>9/7/13</a:t>
+              <a:t>10/3/13</a:t>
             </a:fld>
             <a:endParaRPr lang="en-US"/>
           </a:p>
@@ -1086,7 +1086,7 @@
           <a:p>
             <a:fld id="{CE2D3545-AE21-7247-8426-4B1172E482C1}" type="datetimeFigureOut">
               <a:rPr lang="en-US" smtClean="0"/>
-              <a:t>9/7/13</a:t>
+              <a:t>10/3/13</a:t>
             </a:fld>
             <a:endParaRPr lang="en-US"/>
           </a:p>
@@ -1256,7 +1256,7 @@
           <a:p>
             <a:fld id="{CE2D3545-AE21-7247-8426-4B1172E482C1}" type="datetimeFigureOut">
               <a:rPr lang="en-US" smtClean="0"/>
-              <a:t>9/7/13</a:t>
+              <a:t>10/3/13</a:t>
             </a:fld>
             <a:endParaRPr lang="en-US"/>
           </a:p>
@@ -1502,7 +1502,7 @@
           <a:p>
             <a:fld id="{CE2D3545-AE21-7247-8426-4B1172E482C1}" type="datetimeFigureOut">
               <a:rPr lang="en-US" smtClean="0"/>
-              <a:t>9/7/13</a:t>
+              <a:t>10/3/13</a:t>
             </a:fld>
             <a:endParaRPr lang="en-US"/>
           </a:p>
@@ -1790,7 +1790,7 @@
           <a:p>
             <a:fld id="{CE2D3545-AE21-7247-8426-4B1172E482C1}" type="datetimeFigureOut">
               <a:rPr lang="en-US" smtClean="0"/>
-              <a:t>9/7/13</a:t>
+              <a:t>10/3/13</a:t>
             </a:fld>
             <a:endParaRPr lang="en-US"/>
           </a:p>
@@ -2212,7 +2212,7 @@
           <a:p>
             <a:fld id="{CE2D3545-AE21-7247-8426-4B1172E482C1}" type="datetimeFigureOut">
               <a:rPr lang="en-US" smtClean="0"/>
-              <a:t>9/7/13</a:t>
+              <a:t>10/3/13</a:t>
             </a:fld>
             <a:endParaRPr lang="en-US"/>
           </a:p>
@@ -2330,7 +2330,7 @@
           <a:p>
             <a:fld id="{CE2D3545-AE21-7247-8426-4B1172E482C1}" type="datetimeFigureOut">
               <a:rPr lang="en-US" smtClean="0"/>
-              <a:t>9/7/13</a:t>
+              <a:t>10/3/13</a:t>
             </a:fld>
             <a:endParaRPr lang="en-US"/>
           </a:p>
@@ -2425,7 +2425,7 @@
           <a:p>
             <a:fld id="{CE2D3545-AE21-7247-8426-4B1172E482C1}" type="datetimeFigureOut">
               <a:rPr lang="en-US" smtClean="0"/>
-              <a:t>9/7/13</a:t>
+              <a:t>10/3/13</a:t>
             </a:fld>
             <a:endParaRPr lang="en-US"/>
           </a:p>
@@ -2702,7 +2702,7 @@
           <a:p>
             <a:fld id="{CE2D3545-AE21-7247-8426-4B1172E482C1}" type="datetimeFigureOut">
               <a:rPr lang="en-US" smtClean="0"/>
-              <a:t>9/7/13</a:t>
+              <a:t>10/3/13</a:t>
             </a:fld>
             <a:endParaRPr lang="en-US"/>
           </a:p>
@@ -2959,7 +2959,7 @@
           <a:p>
             <a:fld id="{CE2D3545-AE21-7247-8426-4B1172E482C1}" type="datetimeFigureOut">
               <a:rPr lang="en-US" smtClean="0"/>
-              <a:t>9/7/13</a:t>
+              <a:t>10/3/13</a:t>
             </a:fld>
             <a:endParaRPr lang="en-US"/>
           </a:p>
@@ -3177,7 +3177,7 @@
           <a:p>
             <a:fld id="{CE2D3545-AE21-7247-8426-4B1172E482C1}" type="datetimeFigureOut">
               <a:rPr lang="en-US" smtClean="0"/>
-              <a:t>9/7/13</a:t>
+              <a:t>10/3/13</a:t>
             </a:fld>
             <a:endParaRPr lang="en-US"/>
           </a:p>
@@ -7643,11 +7643,7 @@
             <a:pPr algn="ctr"/>
             <a:r>
               <a:rPr lang="en-US" dirty="0" smtClean="0"/>
-              <a:t>Browser </a:t>
-            </a:r>
-            <a:r>
-              <a:rPr lang="en-US" dirty="0" smtClean="0"/>
-              <a:t>Internals</a:t>
+              <a:t>Browser Internals</a:t>
             </a:r>
           </a:p>
           <a:p>
@@ -18588,8 +18584,8 @@
         </p:nvSpPr>
         <p:spPr>
           <a:xfrm>
-            <a:off x="6554595" y="3389438"/>
-            <a:ext cx="2485281" cy="826702"/>
+            <a:off x="6554595" y="1597583"/>
+            <a:ext cx="2485281" cy="2618557"/>
           </a:xfrm>
           <a:prstGeom prst="rect">
             <a:avLst/>
@@ -18613,17 +18609,58 @@
           <a:bodyPr rtlCol="0" anchor="ctr"/>
           <a:lstStyle/>
           <a:p>
-            <a:pPr algn="ctr"/>
-            <a:r>
-              <a:rPr lang="en-US" sz="1600" i="1" dirty="0" smtClean="0"/>
-              <a:t>Signaling Protocol</a:t>
-            </a:r>
-          </a:p>
-          <a:p>
-            <a:pPr algn="ctr"/>
+            <a:pPr algn="r"/>
+            <a:r>
+              <a:rPr lang="en-US" sz="1600" i="1" dirty="0" smtClean="0">
+                <a:latin typeface="+mj-lt"/>
+              </a:rPr>
+              <a:t>Signaling </a:t>
+            </a:r>
+          </a:p>
+          <a:p>
+            <a:pPr algn="r"/>
+            <a:r>
+              <a:rPr lang="en-US" sz="1600" i="1" dirty="0" smtClean="0">
+                <a:latin typeface="+mj-lt"/>
+              </a:rPr>
+              <a:t>Protocol</a:t>
+            </a:r>
+          </a:p>
+          <a:p>
+            <a:pPr algn="r"/>
+            <a:endParaRPr lang="en-US" sz="1200" i="1" dirty="0" smtClean="0"/>
+          </a:p>
+          <a:p>
+            <a:pPr algn="r"/>
             <a:r>
               <a:rPr lang="en-US" sz="1200" i="1" dirty="0" smtClean="0"/>
               <a:t>(e.g., SIP, Jingle, …)</a:t>
+            </a:r>
+          </a:p>
+          <a:p>
+            <a:pPr algn="r"/>
+            <a:endParaRPr lang="en-US" sz="1200" i="1" dirty="0"/>
+          </a:p>
+          <a:p>
+            <a:pPr algn="r"/>
+            <a:endParaRPr lang="en-US" sz="1200" i="1" dirty="0" smtClean="0"/>
+          </a:p>
+          <a:p>
+            <a:pPr algn="r"/>
+            <a:endParaRPr lang="en-US" sz="1200" i="1" dirty="0" smtClean="0"/>
+          </a:p>
+          <a:p>
+            <a:pPr algn="r"/>
+            <a:r>
+              <a:rPr lang="en-US" sz="1200" i="1" dirty="0" smtClean="0"/>
+              <a:t>Or something proprietary</a:t>
+            </a:r>
+          </a:p>
+          <a:p>
+            <a:pPr algn="r"/>
+            <a:r>
+              <a:rPr lang="en-US" sz="1200" i="1" dirty="0" smtClean="0"/>
+              <a:t>(over HTTP or Web Sockets)</a:t>
             </a:r>
             <a:endParaRPr lang="en-US" sz="1200" i="1" dirty="0"/>
           </a:p>
@@ -18736,7 +18773,7 @@
         <p:spPr>
           <a:xfrm>
             <a:off x="6308797" y="1597583"/>
-            <a:ext cx="1447478" cy="1787188"/>
+            <a:ext cx="1294270" cy="1787188"/>
           </a:xfrm>
           <a:prstGeom prst="rect">
             <a:avLst/>
@@ -18943,6 +18980,54 @@
               <a:t>Channel</a:t>
             </a:r>
             <a:endParaRPr lang="en-US" sz="1400" dirty="0">
+              <a:latin typeface="+mj-lt"/>
+            </a:endParaRPr>
+          </a:p>
+        </p:txBody>
+      </p:sp>
+      <p:sp>
+        <p:nvSpPr>
+          <p:cNvPr id="27" name="Rectangle 26"/>
+          <p:cNvSpPr/>
+          <p:nvPr/>
+        </p:nvSpPr>
+        <p:spPr>
+          <a:xfrm>
+            <a:off x="2075630" y="766213"/>
+            <a:ext cx="6964246" cy="831370"/>
+          </a:xfrm>
+          <a:prstGeom prst="rect">
+            <a:avLst/>
+          </a:prstGeom>
+        </p:spPr>
+        <p:style>
+          <a:lnRef idx="2">
+            <a:schemeClr val="dk1"/>
+          </a:lnRef>
+          <a:fillRef idx="1">
+            <a:schemeClr val="lt1"/>
+          </a:fillRef>
+          <a:effectRef idx="0">
+            <a:schemeClr val="dk1"/>
+          </a:effectRef>
+          <a:fontRef idx="minor">
+            <a:schemeClr val="dk1"/>
+          </a:fontRef>
+        </p:style>
+        <p:txBody>
+          <a:bodyPr rtlCol="0" anchor="ctr"/>
+          <a:lstStyle/>
+          <a:p>
+            <a:pPr algn="ctr"/>
+            <a:r>
+              <a:rPr lang="en-US" sz="1600" dirty="0" err="1" smtClean="0"/>
+              <a:t>WebRTC</a:t>
+            </a:r>
+            <a:r>
+              <a:rPr lang="en-US" sz="1600" dirty="0" smtClean="0"/>
+              <a:t> Application</a:t>
+            </a:r>
+            <a:endParaRPr lang="en-US" sz="1600" dirty="0">
               <a:latin typeface="+mj-lt"/>
             </a:endParaRPr>
           </a:p>

</xml_diff>

<commit_message>
chap5: updated diagrams for cc-schemes
</commit_message>
<xml_diff>
--- a/graphs/source/chap5-src.pptx
+++ b/graphs/source/chap5-src.pptx
@@ -5,7 +5,7 @@
     <p:sldMasterId id="2147483660" r:id="rId1"/>
   </p:sldMasterIdLst>
   <p:notesMasterIdLst>
-    <p:notesMasterId r:id="rId15"/>
+    <p:notesMasterId r:id="rId16"/>
   </p:notesMasterIdLst>
   <p:sldIdLst>
     <p:sldId id="266" r:id="rId2"/>
@@ -15,12 +15,13 @@
     <p:sldId id="258" r:id="rId6"/>
     <p:sldId id="259" r:id="rId7"/>
     <p:sldId id="260" r:id="rId8"/>
-    <p:sldId id="264" r:id="rId9"/>
-    <p:sldId id="262" r:id="rId10"/>
-    <p:sldId id="261" r:id="rId11"/>
-    <p:sldId id="265" r:id="rId12"/>
-    <p:sldId id="268" r:id="rId13"/>
-    <p:sldId id="269" r:id="rId14"/>
+    <p:sldId id="270" r:id="rId9"/>
+    <p:sldId id="264" r:id="rId10"/>
+    <p:sldId id="262" r:id="rId11"/>
+    <p:sldId id="261" r:id="rId12"/>
+    <p:sldId id="265" r:id="rId13"/>
+    <p:sldId id="268" r:id="rId14"/>
+    <p:sldId id="269" r:id="rId15"/>
   </p:sldIdLst>
   <p:sldSz cx="9144000" cy="6858000" type="screen4x3"/>
   <p:notesSz cx="6858000" cy="9144000"/>
@@ -204,7 +205,7 @@
           <a:p>
             <a:fld id="{7BA68311-98B2-8147-8E3D-5F9C91F16701}" type="datetimeFigureOut">
               <a:rPr lang="en-US" smtClean="0"/>
-              <a:t>26/02/14</a:t>
+              <a:t>27/03/14</a:t>
             </a:fld>
             <a:endParaRPr lang="en-US"/>
           </a:p>
@@ -537,7 +538,7 @@
           <a:p>
             <a:fld id="{8AED5117-C3DB-DC46-B433-F1C323FD7F80}" type="slidenum">
               <a:rPr lang="en-US" smtClean="0"/>
-              <a:t>9</a:t>
+              <a:t>10</a:t>
             </a:fld>
             <a:endParaRPr lang="en-US"/>
           </a:p>
@@ -737,7 +738,7 @@
           <a:p>
             <a:fld id="{CE2D3545-AE21-7247-8426-4B1172E482C1}" type="datetimeFigureOut">
               <a:rPr lang="en-US" smtClean="0"/>
-              <a:t>26/02/14</a:t>
+              <a:t>27/03/14</a:t>
             </a:fld>
             <a:endParaRPr lang="en-US"/>
           </a:p>
@@ -907,7 +908,7 @@
           <a:p>
             <a:fld id="{CE2D3545-AE21-7247-8426-4B1172E482C1}" type="datetimeFigureOut">
               <a:rPr lang="en-US" smtClean="0"/>
-              <a:t>26/02/14</a:t>
+              <a:t>27/03/14</a:t>
             </a:fld>
             <a:endParaRPr lang="en-US"/>
           </a:p>
@@ -1087,7 +1088,7 @@
           <a:p>
             <a:fld id="{CE2D3545-AE21-7247-8426-4B1172E482C1}" type="datetimeFigureOut">
               <a:rPr lang="en-US" smtClean="0"/>
-              <a:t>26/02/14</a:t>
+              <a:t>27/03/14</a:t>
             </a:fld>
             <a:endParaRPr lang="en-US"/>
           </a:p>
@@ -1257,7 +1258,7 @@
           <a:p>
             <a:fld id="{CE2D3545-AE21-7247-8426-4B1172E482C1}" type="datetimeFigureOut">
               <a:rPr lang="en-US" smtClean="0"/>
-              <a:t>26/02/14</a:t>
+              <a:t>27/03/14</a:t>
             </a:fld>
             <a:endParaRPr lang="en-US"/>
           </a:p>
@@ -1503,7 +1504,7 @@
           <a:p>
             <a:fld id="{CE2D3545-AE21-7247-8426-4B1172E482C1}" type="datetimeFigureOut">
               <a:rPr lang="en-US" smtClean="0"/>
-              <a:t>26/02/14</a:t>
+              <a:t>27/03/14</a:t>
             </a:fld>
             <a:endParaRPr lang="en-US"/>
           </a:p>
@@ -1791,7 +1792,7 @@
           <a:p>
             <a:fld id="{CE2D3545-AE21-7247-8426-4B1172E482C1}" type="datetimeFigureOut">
               <a:rPr lang="en-US" smtClean="0"/>
-              <a:t>26/02/14</a:t>
+              <a:t>27/03/14</a:t>
             </a:fld>
             <a:endParaRPr lang="en-US"/>
           </a:p>
@@ -2213,7 +2214,7 @@
           <a:p>
             <a:fld id="{CE2D3545-AE21-7247-8426-4B1172E482C1}" type="datetimeFigureOut">
               <a:rPr lang="en-US" smtClean="0"/>
-              <a:t>26/02/14</a:t>
+              <a:t>27/03/14</a:t>
             </a:fld>
             <a:endParaRPr lang="en-US"/>
           </a:p>
@@ -2331,7 +2332,7 @@
           <a:p>
             <a:fld id="{CE2D3545-AE21-7247-8426-4B1172E482C1}" type="datetimeFigureOut">
               <a:rPr lang="en-US" smtClean="0"/>
-              <a:t>26/02/14</a:t>
+              <a:t>27/03/14</a:t>
             </a:fld>
             <a:endParaRPr lang="en-US"/>
           </a:p>
@@ -2426,7 +2427,7 @@
           <a:p>
             <a:fld id="{CE2D3545-AE21-7247-8426-4B1172E482C1}" type="datetimeFigureOut">
               <a:rPr lang="en-US" smtClean="0"/>
-              <a:t>26/02/14</a:t>
+              <a:t>27/03/14</a:t>
             </a:fld>
             <a:endParaRPr lang="en-US"/>
           </a:p>
@@ -2703,7 +2704,7 @@
           <a:p>
             <a:fld id="{CE2D3545-AE21-7247-8426-4B1172E482C1}" type="datetimeFigureOut">
               <a:rPr lang="en-US" smtClean="0"/>
-              <a:t>26/02/14</a:t>
+              <a:t>27/03/14</a:t>
             </a:fld>
             <a:endParaRPr lang="en-US"/>
           </a:p>
@@ -2960,7 +2961,7 @@
           <a:p>
             <a:fld id="{CE2D3545-AE21-7247-8426-4B1172E482C1}" type="datetimeFigureOut">
               <a:rPr lang="en-US" smtClean="0"/>
-              <a:t>26/02/14</a:t>
+              <a:t>27/03/14</a:t>
             </a:fld>
             <a:endParaRPr lang="en-US"/>
           </a:p>
@@ -3178,7 +3179,7 @@
           <a:p>
             <a:fld id="{CE2D3545-AE21-7247-8426-4B1172E482C1}" type="datetimeFigureOut">
               <a:rPr lang="en-US" smtClean="0"/>
-              <a:t>26/02/14</a:t>
+              <a:t>27/03/14</a:t>
             </a:fld>
             <a:endParaRPr lang="en-US"/>
           </a:p>
@@ -5463,6 +5464,1032 @@
       </p:grpSpPr>
       <p:sp>
         <p:nvSpPr>
+          <p:cNvPr id="2" name="Rectangle 1"/>
+          <p:cNvSpPr/>
+          <p:nvPr/>
+        </p:nvSpPr>
+        <p:spPr>
+          <a:xfrm>
+            <a:off x="139556" y="5052177"/>
+            <a:ext cx="8900321" cy="831370"/>
+          </a:xfrm>
+          <a:prstGeom prst="rect">
+            <a:avLst/>
+          </a:prstGeom>
+        </p:spPr>
+        <p:style>
+          <a:lnRef idx="2">
+            <a:schemeClr val="dk1"/>
+          </a:lnRef>
+          <a:fillRef idx="1">
+            <a:schemeClr val="lt1"/>
+          </a:fillRef>
+          <a:effectRef idx="0">
+            <a:schemeClr val="dk1"/>
+          </a:effectRef>
+          <a:fontRef idx="minor">
+            <a:schemeClr val="dk1"/>
+          </a:fontRef>
+        </p:style>
+        <p:txBody>
+          <a:bodyPr rtlCol="0" anchor="ctr"/>
+          <a:lstStyle/>
+          <a:p>
+            <a:pPr lvl="0" algn="ctr"/>
+            <a:r>
+              <a:rPr lang="en-US" dirty="0">
+                <a:solidFill>
+                  <a:prstClr val="black"/>
+                </a:solidFill>
+              </a:rPr>
+              <a:t>Internet Protocol </a:t>
+            </a:r>
+            <a:r>
+              <a:rPr lang="en-US" dirty="0">
+                <a:solidFill>
+                  <a:prstClr val="black"/>
+                </a:solidFill>
+                <a:latin typeface="Nexa Bold"/>
+              </a:rPr>
+              <a:t>(IP</a:t>
+            </a:r>
+            <a:r>
+              <a:rPr lang="en-US" dirty="0" smtClean="0">
+                <a:solidFill>
+                  <a:prstClr val="black"/>
+                </a:solidFill>
+                <a:latin typeface="Nexa Bold"/>
+              </a:rPr>
+              <a:t>)</a:t>
+            </a:r>
+            <a:endParaRPr lang="en-US" sz="1600" dirty="0">
+              <a:solidFill>
+                <a:prstClr val="black"/>
+              </a:solidFill>
+              <a:latin typeface="Nexa Bold"/>
+            </a:endParaRPr>
+          </a:p>
+        </p:txBody>
+      </p:sp>
+      <p:sp>
+        <p:nvSpPr>
+          <p:cNvPr id="3" name="Rectangle 2"/>
+          <p:cNvSpPr/>
+          <p:nvPr/>
+        </p:nvSpPr>
+        <p:spPr>
+          <a:xfrm>
+            <a:off x="139555" y="4220807"/>
+            <a:ext cx="6660835" cy="831370"/>
+          </a:xfrm>
+          <a:prstGeom prst="rect">
+            <a:avLst/>
+          </a:prstGeom>
+        </p:spPr>
+        <p:style>
+          <a:lnRef idx="2">
+            <a:schemeClr val="dk1"/>
+          </a:lnRef>
+          <a:fillRef idx="1">
+            <a:schemeClr val="lt1"/>
+          </a:fillRef>
+          <a:effectRef idx="0">
+            <a:schemeClr val="dk1"/>
+          </a:effectRef>
+          <a:fontRef idx="minor">
+            <a:schemeClr val="dk1"/>
+          </a:fontRef>
+        </p:style>
+        <p:txBody>
+          <a:bodyPr rtlCol="0" anchor="ctr"/>
+          <a:lstStyle/>
+          <a:p>
+            <a:pPr lvl="0" algn="ctr"/>
+            <a:r>
+              <a:rPr lang="en-US" dirty="0">
+                <a:solidFill>
+                  <a:prstClr val="black"/>
+                </a:solidFill>
+              </a:rPr>
+              <a:t>User Datagram Protocol </a:t>
+            </a:r>
+            <a:r>
+              <a:rPr lang="en-US" dirty="0">
+                <a:solidFill>
+                  <a:prstClr val="black"/>
+                </a:solidFill>
+                <a:latin typeface="Nexa Bold"/>
+              </a:rPr>
+              <a:t>(UDP)</a:t>
+            </a:r>
+            <a:endParaRPr lang="en-US" sz="1600" dirty="0">
+              <a:solidFill>
+                <a:prstClr val="black"/>
+              </a:solidFill>
+              <a:latin typeface="Nexa Bold"/>
+            </a:endParaRPr>
+          </a:p>
+        </p:txBody>
+      </p:sp>
+      <p:sp>
+        <p:nvSpPr>
+          <p:cNvPr id="4" name="Rectangle 3"/>
+          <p:cNvSpPr/>
+          <p:nvPr/>
+        </p:nvSpPr>
+        <p:spPr>
+          <a:xfrm>
+            <a:off x="139558" y="3389437"/>
+            <a:ext cx="1936070" cy="831370"/>
+          </a:xfrm>
+          <a:prstGeom prst="rect">
+            <a:avLst/>
+          </a:prstGeom>
+        </p:spPr>
+        <p:style>
+          <a:lnRef idx="2">
+            <a:schemeClr val="dk1"/>
+          </a:lnRef>
+          <a:fillRef idx="1">
+            <a:schemeClr val="lt1"/>
+          </a:fillRef>
+          <a:effectRef idx="0">
+            <a:schemeClr val="dk1"/>
+          </a:effectRef>
+          <a:fontRef idx="minor">
+            <a:schemeClr val="dk1"/>
+          </a:fontRef>
+        </p:style>
+        <p:txBody>
+          <a:bodyPr rtlCol="0" anchor="ctr"/>
+          <a:lstStyle/>
+          <a:p>
+            <a:pPr algn="ctr"/>
+            <a:r>
+              <a:rPr lang="en-US" sz="1600" dirty="0" smtClean="0"/>
+              <a:t>Session Traversal Utilities for NAT </a:t>
+            </a:r>
+            <a:r>
+              <a:rPr lang="en-US" sz="1600" dirty="0" smtClean="0">
+                <a:latin typeface="+mj-lt"/>
+              </a:rPr>
+              <a:t>(STUN)</a:t>
+            </a:r>
+            <a:endParaRPr lang="en-US" sz="1600" dirty="0">
+              <a:latin typeface="+mj-lt"/>
+            </a:endParaRPr>
+          </a:p>
+        </p:txBody>
+      </p:sp>
+      <p:sp>
+        <p:nvSpPr>
+          <p:cNvPr id="5" name="Rectangle 4"/>
+          <p:cNvSpPr/>
+          <p:nvPr/>
+        </p:nvSpPr>
+        <p:spPr>
+          <a:xfrm>
+            <a:off x="2075629" y="3389437"/>
+            <a:ext cx="3468476" cy="831370"/>
+          </a:xfrm>
+          <a:prstGeom prst="rect">
+            <a:avLst/>
+          </a:prstGeom>
+          <a:solidFill>
+            <a:schemeClr val="tx2">
+              <a:lumMod val="20000"/>
+              <a:lumOff val="80000"/>
+            </a:schemeClr>
+          </a:solidFill>
+        </p:spPr>
+        <p:style>
+          <a:lnRef idx="2">
+            <a:schemeClr val="dk1"/>
+          </a:lnRef>
+          <a:fillRef idx="1">
+            <a:schemeClr val="lt1"/>
+          </a:fillRef>
+          <a:effectRef idx="0">
+            <a:schemeClr val="dk1"/>
+          </a:effectRef>
+          <a:fontRef idx="minor">
+            <a:schemeClr val="dk1"/>
+          </a:fontRef>
+        </p:style>
+        <p:txBody>
+          <a:bodyPr rtlCol="0" anchor="ctr"/>
+          <a:lstStyle/>
+          <a:p>
+            <a:pPr algn="ctr"/>
+            <a:r>
+              <a:rPr lang="en-US" dirty="0" smtClean="0">
+                <a:latin typeface="+mj-lt"/>
+              </a:rPr>
+              <a:t>                     RTP</a:t>
+            </a:r>
+          </a:p>
+          <a:p>
+            <a:pPr algn="ctr"/>
+            <a:endParaRPr lang="en-US" sz="1600" dirty="0">
+              <a:latin typeface="+mj-lt"/>
+            </a:endParaRPr>
+          </a:p>
+        </p:txBody>
+      </p:sp>
+      <p:sp>
+        <p:nvSpPr>
+          <p:cNvPr id="15" name="Rectangle 14"/>
+          <p:cNvSpPr/>
+          <p:nvPr/>
+        </p:nvSpPr>
+        <p:spPr>
+          <a:xfrm>
+            <a:off x="2949575" y="1597583"/>
+            <a:ext cx="873946" cy="1787187"/>
+          </a:xfrm>
+          <a:prstGeom prst="rect">
+            <a:avLst/>
+          </a:prstGeom>
+        </p:spPr>
+        <p:style>
+          <a:lnRef idx="2">
+            <a:schemeClr val="dk1"/>
+          </a:lnRef>
+          <a:fillRef idx="1">
+            <a:schemeClr val="lt1"/>
+          </a:fillRef>
+          <a:effectRef idx="0">
+            <a:schemeClr val="dk1"/>
+          </a:effectRef>
+          <a:fontRef idx="minor">
+            <a:schemeClr val="dk1"/>
+          </a:fontRef>
+        </p:style>
+        <p:txBody>
+          <a:bodyPr rtlCol="0" anchor="ctr"/>
+          <a:lstStyle/>
+          <a:p>
+            <a:pPr algn="ctr"/>
+            <a:r>
+              <a:rPr lang="en-US" sz="1600" dirty="0" smtClean="0"/>
+              <a:t>SSRC #2</a:t>
+            </a:r>
+            <a:endParaRPr lang="en-US" sz="1400" dirty="0">
+              <a:latin typeface="+mj-lt"/>
+            </a:endParaRPr>
+          </a:p>
+        </p:txBody>
+      </p:sp>
+      <p:sp>
+        <p:nvSpPr>
+          <p:cNvPr id="16" name="Rectangle 15"/>
+          <p:cNvSpPr/>
+          <p:nvPr/>
+        </p:nvSpPr>
+        <p:spPr>
+          <a:xfrm>
+            <a:off x="2075629" y="1597583"/>
+            <a:ext cx="873946" cy="1787187"/>
+          </a:xfrm>
+          <a:prstGeom prst="rect">
+            <a:avLst/>
+          </a:prstGeom>
+        </p:spPr>
+        <p:style>
+          <a:lnRef idx="2">
+            <a:schemeClr val="dk1"/>
+          </a:lnRef>
+          <a:fillRef idx="1">
+            <a:schemeClr val="lt1"/>
+          </a:fillRef>
+          <a:effectRef idx="0">
+            <a:schemeClr val="dk1"/>
+          </a:effectRef>
+          <a:fontRef idx="minor">
+            <a:schemeClr val="dk1"/>
+          </a:fontRef>
+        </p:style>
+        <p:txBody>
+          <a:bodyPr rtlCol="0" anchor="ctr"/>
+          <a:lstStyle/>
+          <a:p>
+            <a:pPr algn="ctr"/>
+            <a:r>
+              <a:rPr lang="en-US" sz="1600" dirty="0" smtClean="0"/>
+              <a:t>SSRC #1</a:t>
+            </a:r>
+            <a:endParaRPr lang="en-US" sz="1400" dirty="0">
+              <a:latin typeface="+mj-lt"/>
+            </a:endParaRPr>
+          </a:p>
+        </p:txBody>
+      </p:sp>
+      <p:sp>
+        <p:nvSpPr>
+          <p:cNvPr id="19" name="Rectangle 18"/>
+          <p:cNvSpPr/>
+          <p:nvPr/>
+        </p:nvSpPr>
+        <p:spPr>
+          <a:xfrm>
+            <a:off x="2075628" y="3877894"/>
+            <a:ext cx="1747893" cy="342914"/>
+          </a:xfrm>
+          <a:prstGeom prst="rect">
+            <a:avLst/>
+          </a:prstGeom>
+        </p:spPr>
+        <p:style>
+          <a:lnRef idx="2">
+            <a:schemeClr val="dk1"/>
+          </a:lnRef>
+          <a:fillRef idx="1">
+            <a:schemeClr val="lt1"/>
+          </a:fillRef>
+          <a:effectRef idx="0">
+            <a:schemeClr val="dk1"/>
+          </a:effectRef>
+          <a:fontRef idx="minor">
+            <a:schemeClr val="dk1"/>
+          </a:fontRef>
+        </p:style>
+        <p:txBody>
+          <a:bodyPr rtlCol="0" anchor="ctr"/>
+          <a:lstStyle/>
+          <a:p>
+            <a:pPr algn="ctr"/>
+            <a:r>
+              <a:rPr lang="en-US" sz="1600" dirty="0" smtClean="0">
+                <a:latin typeface="+mj-lt"/>
+              </a:rPr>
+              <a:t>TURN</a:t>
+            </a:r>
+            <a:endParaRPr lang="en-US" sz="1400" dirty="0">
+              <a:latin typeface="+mj-lt"/>
+            </a:endParaRPr>
+          </a:p>
+        </p:txBody>
+      </p:sp>
+      <p:cxnSp>
+        <p:nvCxnSpPr>
+          <p:cNvPr id="21" name="Straight Connector 20"/>
+          <p:cNvCxnSpPr/>
+          <p:nvPr/>
+        </p:nvCxnSpPr>
+        <p:spPr>
+          <a:xfrm flipH="1">
+            <a:off x="2075628" y="3384770"/>
+            <a:ext cx="2" cy="664581"/>
+          </a:xfrm>
+          <a:prstGeom prst="line">
+            <a:avLst/>
+          </a:prstGeom>
+          <a:ln>
+            <a:prstDash val="sysDash"/>
+          </a:ln>
+        </p:spPr>
+        <p:style>
+          <a:lnRef idx="1">
+            <a:schemeClr val="dk1"/>
+          </a:lnRef>
+          <a:fillRef idx="0">
+            <a:schemeClr val="dk1"/>
+          </a:fillRef>
+          <a:effectRef idx="0">
+            <a:schemeClr val="dk1"/>
+          </a:effectRef>
+          <a:fontRef idx="minor">
+            <a:schemeClr val="tx1"/>
+          </a:fontRef>
+        </p:style>
+      </p:cxnSp>
+      <p:sp>
+        <p:nvSpPr>
+          <p:cNvPr id="24" name="Rectangle 23"/>
+          <p:cNvSpPr/>
+          <p:nvPr/>
+        </p:nvSpPr>
+        <p:spPr>
+          <a:xfrm>
+            <a:off x="3809866" y="1597583"/>
+            <a:ext cx="873946" cy="1787187"/>
+          </a:xfrm>
+          <a:prstGeom prst="rect">
+            <a:avLst/>
+          </a:prstGeom>
+        </p:spPr>
+        <p:style>
+          <a:lnRef idx="2">
+            <a:schemeClr val="dk1"/>
+          </a:lnRef>
+          <a:fillRef idx="1">
+            <a:schemeClr val="lt1"/>
+          </a:fillRef>
+          <a:effectRef idx="0">
+            <a:schemeClr val="dk1"/>
+          </a:effectRef>
+          <a:fontRef idx="minor">
+            <a:schemeClr val="dk1"/>
+          </a:fontRef>
+        </p:style>
+        <p:txBody>
+          <a:bodyPr rtlCol="0" anchor="ctr"/>
+          <a:lstStyle/>
+          <a:p>
+            <a:pPr algn="ctr"/>
+            <a:r>
+              <a:rPr lang="en-US" sz="1600" dirty="0" smtClean="0"/>
+              <a:t>SSRC #3</a:t>
+            </a:r>
+            <a:endParaRPr lang="en-US" sz="1400" dirty="0">
+              <a:latin typeface="+mj-lt"/>
+            </a:endParaRPr>
+          </a:p>
+        </p:txBody>
+      </p:sp>
+      <p:sp>
+        <p:nvSpPr>
+          <p:cNvPr id="25" name="Rectangle 24"/>
+          <p:cNvSpPr/>
+          <p:nvPr/>
+        </p:nvSpPr>
+        <p:spPr>
+          <a:xfrm>
+            <a:off x="4670158" y="1597583"/>
+            <a:ext cx="873946" cy="1787187"/>
+          </a:xfrm>
+          <a:prstGeom prst="rect">
+            <a:avLst/>
+          </a:prstGeom>
+        </p:spPr>
+        <p:style>
+          <a:lnRef idx="2">
+            <a:schemeClr val="dk1"/>
+          </a:lnRef>
+          <a:fillRef idx="1">
+            <a:schemeClr val="lt1"/>
+          </a:fillRef>
+          <a:effectRef idx="0">
+            <a:schemeClr val="dk1"/>
+          </a:effectRef>
+          <a:fontRef idx="minor">
+            <a:schemeClr val="dk1"/>
+          </a:fontRef>
+        </p:style>
+        <p:txBody>
+          <a:bodyPr rtlCol="0" anchor="ctr"/>
+          <a:lstStyle/>
+          <a:p>
+            <a:pPr algn="ctr"/>
+            <a:r>
+              <a:rPr lang="en-US" sz="1600" dirty="0" smtClean="0"/>
+              <a:t>SSRC #4</a:t>
+            </a:r>
+            <a:endParaRPr lang="en-US" sz="1400" dirty="0">
+              <a:latin typeface="+mj-lt"/>
+            </a:endParaRPr>
+          </a:p>
+        </p:txBody>
+      </p:sp>
+      <p:sp>
+        <p:nvSpPr>
+          <p:cNvPr id="13" name="Rectangle 12"/>
+          <p:cNvSpPr/>
+          <p:nvPr/>
+        </p:nvSpPr>
+        <p:spPr>
+          <a:xfrm>
+            <a:off x="6800391" y="4220808"/>
+            <a:ext cx="2239485" cy="831370"/>
+          </a:xfrm>
+          <a:prstGeom prst="rect">
+            <a:avLst/>
+          </a:prstGeom>
+        </p:spPr>
+        <p:style>
+          <a:lnRef idx="2">
+            <a:schemeClr val="dk1"/>
+          </a:lnRef>
+          <a:fillRef idx="1">
+            <a:schemeClr val="lt1"/>
+          </a:fillRef>
+          <a:effectRef idx="0">
+            <a:schemeClr val="dk1"/>
+          </a:effectRef>
+          <a:fontRef idx="minor">
+            <a:schemeClr val="dk1"/>
+          </a:fontRef>
+        </p:style>
+        <p:txBody>
+          <a:bodyPr rtlCol="0" anchor="ctr"/>
+          <a:lstStyle/>
+          <a:p>
+            <a:pPr algn="ctr"/>
+            <a:r>
+              <a:rPr lang="en-US" dirty="0" smtClean="0"/>
+              <a:t>Transmission Control Protocol </a:t>
+            </a:r>
+            <a:r>
+              <a:rPr lang="en-US" dirty="0" smtClean="0">
+                <a:latin typeface="+mj-lt"/>
+              </a:rPr>
+              <a:t>(TCP)</a:t>
+            </a:r>
+            <a:endParaRPr lang="en-US" sz="1600" dirty="0">
+              <a:latin typeface="+mj-lt"/>
+            </a:endParaRPr>
+          </a:p>
+        </p:txBody>
+      </p:sp>
+      <p:sp>
+        <p:nvSpPr>
+          <p:cNvPr id="14" name="Rectangle 13"/>
+          <p:cNvSpPr/>
+          <p:nvPr/>
+        </p:nvSpPr>
+        <p:spPr>
+          <a:xfrm>
+            <a:off x="6554595" y="1597583"/>
+            <a:ext cx="2485281" cy="2618557"/>
+          </a:xfrm>
+          <a:prstGeom prst="rect">
+            <a:avLst/>
+          </a:prstGeom>
+        </p:spPr>
+        <p:style>
+          <a:lnRef idx="2">
+            <a:schemeClr val="dk1"/>
+          </a:lnRef>
+          <a:fillRef idx="1">
+            <a:schemeClr val="lt1"/>
+          </a:fillRef>
+          <a:effectRef idx="0">
+            <a:schemeClr val="dk1"/>
+          </a:effectRef>
+          <a:fontRef idx="minor">
+            <a:schemeClr val="dk1"/>
+          </a:fontRef>
+        </p:style>
+        <p:txBody>
+          <a:bodyPr rtlCol="0" anchor="ctr"/>
+          <a:lstStyle/>
+          <a:p>
+            <a:pPr algn="r"/>
+            <a:r>
+              <a:rPr lang="en-US" sz="1600" i="1" dirty="0" smtClean="0">
+                <a:latin typeface="+mj-lt"/>
+              </a:rPr>
+              <a:t>Signaling </a:t>
+            </a:r>
+          </a:p>
+          <a:p>
+            <a:pPr algn="r"/>
+            <a:r>
+              <a:rPr lang="en-US" sz="1600" i="1" dirty="0" smtClean="0">
+                <a:latin typeface="+mj-lt"/>
+              </a:rPr>
+              <a:t>Protocol</a:t>
+            </a:r>
+          </a:p>
+          <a:p>
+            <a:pPr algn="r"/>
+            <a:endParaRPr lang="en-US" sz="1200" i="1" dirty="0" smtClean="0"/>
+          </a:p>
+          <a:p>
+            <a:pPr algn="r"/>
+            <a:r>
+              <a:rPr lang="en-US" sz="1200" i="1" dirty="0" smtClean="0"/>
+              <a:t>(e.g., SIP, Jingle, …)</a:t>
+            </a:r>
+          </a:p>
+          <a:p>
+            <a:pPr algn="r"/>
+            <a:endParaRPr lang="en-US" sz="1200" i="1" dirty="0"/>
+          </a:p>
+          <a:p>
+            <a:pPr algn="r"/>
+            <a:endParaRPr lang="en-US" sz="1200" i="1" dirty="0" smtClean="0"/>
+          </a:p>
+          <a:p>
+            <a:pPr algn="r"/>
+            <a:endParaRPr lang="en-US" sz="1200" i="1" dirty="0" smtClean="0"/>
+          </a:p>
+          <a:p>
+            <a:pPr algn="r"/>
+            <a:r>
+              <a:rPr lang="en-US" sz="1200" i="1" dirty="0" smtClean="0"/>
+              <a:t>Or something proprietary</a:t>
+            </a:r>
+          </a:p>
+          <a:p>
+            <a:pPr algn="r"/>
+            <a:r>
+              <a:rPr lang="en-US" sz="1200" i="1" dirty="0" smtClean="0"/>
+              <a:t>(over HTTP or Web Sockets)</a:t>
+            </a:r>
+            <a:endParaRPr lang="en-US" sz="1200" i="1" dirty="0"/>
+          </a:p>
+        </p:txBody>
+      </p:sp>
+      <p:sp>
+        <p:nvSpPr>
+          <p:cNvPr id="17" name="Rectangle 16"/>
+          <p:cNvSpPr/>
+          <p:nvPr/>
+        </p:nvSpPr>
+        <p:spPr>
+          <a:xfrm>
+            <a:off x="5544105" y="3384770"/>
+            <a:ext cx="1010490" cy="831370"/>
+          </a:xfrm>
+          <a:prstGeom prst="rect">
+            <a:avLst/>
+          </a:prstGeom>
+        </p:spPr>
+        <p:style>
+          <a:lnRef idx="2">
+            <a:schemeClr val="dk1"/>
+          </a:lnRef>
+          <a:fillRef idx="1">
+            <a:schemeClr val="lt1"/>
+          </a:fillRef>
+          <a:effectRef idx="0">
+            <a:schemeClr val="dk1"/>
+          </a:effectRef>
+          <a:fontRef idx="minor">
+            <a:schemeClr val="dk1"/>
+          </a:fontRef>
+        </p:style>
+        <p:txBody>
+          <a:bodyPr rtlCol="0" anchor="ctr"/>
+          <a:lstStyle/>
+          <a:p>
+            <a:pPr algn="ctr"/>
+            <a:r>
+              <a:rPr lang="en-US" sz="1600" dirty="0" smtClean="0">
+                <a:latin typeface="+mj-lt"/>
+              </a:rPr>
+              <a:t>DTLS</a:t>
+            </a:r>
+            <a:endParaRPr lang="en-US" sz="1600" dirty="0">
+              <a:latin typeface="+mj-lt"/>
+            </a:endParaRPr>
+          </a:p>
+        </p:txBody>
+      </p:sp>
+      <p:sp>
+        <p:nvSpPr>
+          <p:cNvPr id="6" name="TextBox 5"/>
+          <p:cNvSpPr txBox="1"/>
+          <p:nvPr/>
+        </p:nvSpPr>
+        <p:spPr>
+          <a:xfrm>
+            <a:off x="5885487" y="6211669"/>
+            <a:ext cx="3154390" cy="646331"/>
+          </a:xfrm>
+          <a:prstGeom prst="rect">
+            <a:avLst/>
+          </a:prstGeom>
+          <a:noFill/>
+        </p:spPr>
+        <p:txBody>
+          <a:bodyPr wrap="square" rtlCol="0">
+            <a:spAutoFit/>
+          </a:bodyPr>
+          <a:lstStyle/>
+          <a:p>
+            <a:pPr algn="just"/>
+            <a:r>
+              <a:rPr lang="en-US" sz="1200" dirty="0" smtClean="0">
+                <a:latin typeface="+mj-lt"/>
+              </a:rPr>
+              <a:t>Note:</a:t>
+            </a:r>
+            <a:r>
+              <a:rPr lang="en-US" sz="1200" dirty="0" smtClean="0"/>
+              <a:t> *RTP can be sent over UDP or TCP.</a:t>
+            </a:r>
+          </a:p>
+          <a:p>
+            <a:pPr algn="just"/>
+            <a:r>
+              <a:rPr lang="en-US" sz="1200" dirty="0" smtClean="0"/>
+              <a:t>Similarly, signaling </a:t>
+            </a:r>
+            <a:r>
+              <a:rPr lang="en-US" sz="1200" dirty="0"/>
+              <a:t>p</a:t>
+            </a:r>
+            <a:r>
+              <a:rPr lang="en-US" sz="1200" dirty="0" smtClean="0"/>
+              <a:t>rotocols can be designed to transmit over UDP or TCP.</a:t>
+            </a:r>
+            <a:endParaRPr lang="en-US" sz="1200" dirty="0"/>
+          </a:p>
+        </p:txBody>
+      </p:sp>
+      <p:sp>
+        <p:nvSpPr>
+          <p:cNvPr id="20" name="Rectangle 19"/>
+          <p:cNvSpPr/>
+          <p:nvPr/>
+        </p:nvSpPr>
+        <p:spPr>
+          <a:xfrm>
+            <a:off x="6308797" y="1597583"/>
+            <a:ext cx="1294270" cy="1787188"/>
+          </a:xfrm>
+          <a:prstGeom prst="rect">
+            <a:avLst/>
+          </a:prstGeom>
+        </p:spPr>
+        <p:style>
+          <a:lnRef idx="2">
+            <a:schemeClr val="dk1"/>
+          </a:lnRef>
+          <a:fillRef idx="1">
+            <a:schemeClr val="lt1"/>
+          </a:fillRef>
+          <a:effectRef idx="0">
+            <a:schemeClr val="dk1"/>
+          </a:effectRef>
+          <a:fontRef idx="minor">
+            <a:schemeClr val="dk1"/>
+          </a:fontRef>
+        </p:style>
+        <p:txBody>
+          <a:bodyPr vert="horz" rtlCol="0" anchor="ctr"/>
+          <a:lstStyle/>
+          <a:p>
+            <a:pPr algn="ctr"/>
+            <a:r>
+              <a:rPr lang="en-US" sz="1600" dirty="0" smtClean="0"/>
+              <a:t>Secure RTP </a:t>
+            </a:r>
+            <a:r>
+              <a:rPr lang="en-US" sz="1600" dirty="0" smtClean="0">
+                <a:latin typeface="+mj-lt"/>
+              </a:rPr>
+              <a:t>(SRTP)</a:t>
+            </a:r>
+            <a:r>
+              <a:rPr lang="en-US" sz="1600" dirty="0" smtClean="0"/>
+              <a:t> Keying</a:t>
+            </a:r>
+            <a:endParaRPr lang="en-US" sz="1400" dirty="0">
+              <a:latin typeface="+mj-lt"/>
+            </a:endParaRPr>
+          </a:p>
+        </p:txBody>
+      </p:sp>
+      <p:cxnSp>
+        <p:nvCxnSpPr>
+          <p:cNvPr id="11" name="Straight Connector 10"/>
+          <p:cNvCxnSpPr/>
+          <p:nvPr/>
+        </p:nvCxnSpPr>
+        <p:spPr>
+          <a:xfrm>
+            <a:off x="3809866" y="3389438"/>
+            <a:ext cx="0" cy="493124"/>
+          </a:xfrm>
+          <a:prstGeom prst="line">
+            <a:avLst/>
+          </a:prstGeom>
+          <a:ln>
+            <a:prstDash val="dash"/>
+          </a:ln>
+        </p:spPr>
+        <p:style>
+          <a:lnRef idx="1">
+            <a:schemeClr val="dk1"/>
+          </a:lnRef>
+          <a:fillRef idx="0">
+            <a:schemeClr val="dk1"/>
+          </a:fillRef>
+          <a:effectRef idx="0">
+            <a:schemeClr val="dk1"/>
+          </a:effectRef>
+          <a:fontRef idx="minor">
+            <a:schemeClr val="tx1"/>
+          </a:fontRef>
+        </p:style>
+      </p:cxnSp>
+      <p:cxnSp>
+        <p:nvCxnSpPr>
+          <p:cNvPr id="22" name="Straight Connector 21"/>
+          <p:cNvCxnSpPr/>
+          <p:nvPr/>
+        </p:nvCxnSpPr>
+        <p:spPr>
+          <a:xfrm>
+            <a:off x="2949575" y="3384770"/>
+            <a:ext cx="0" cy="493124"/>
+          </a:xfrm>
+          <a:prstGeom prst="line">
+            <a:avLst/>
+          </a:prstGeom>
+          <a:ln>
+            <a:prstDash val="dash"/>
+          </a:ln>
+        </p:spPr>
+        <p:style>
+          <a:lnRef idx="1">
+            <a:schemeClr val="dk1"/>
+          </a:lnRef>
+          <a:fillRef idx="0">
+            <a:schemeClr val="dk1"/>
+          </a:fillRef>
+          <a:effectRef idx="0">
+            <a:schemeClr val="dk1"/>
+          </a:effectRef>
+          <a:fontRef idx="minor">
+            <a:schemeClr val="tx1"/>
+          </a:fontRef>
+        </p:style>
+      </p:cxnSp>
+      <p:sp>
+        <p:nvSpPr>
+          <p:cNvPr id="23" name="Rectangle 22"/>
+          <p:cNvSpPr/>
+          <p:nvPr/>
+        </p:nvSpPr>
+        <p:spPr>
+          <a:xfrm>
+            <a:off x="5544104" y="2553398"/>
+            <a:ext cx="764693" cy="831372"/>
+          </a:xfrm>
+          <a:prstGeom prst="rect">
+            <a:avLst/>
+          </a:prstGeom>
+        </p:spPr>
+        <p:style>
+          <a:lnRef idx="2">
+            <a:schemeClr val="dk1"/>
+          </a:lnRef>
+          <a:fillRef idx="1">
+            <a:schemeClr val="lt1"/>
+          </a:fillRef>
+          <a:effectRef idx="0">
+            <a:schemeClr val="dk1"/>
+          </a:effectRef>
+          <a:fontRef idx="minor">
+            <a:schemeClr val="dk1"/>
+          </a:fontRef>
+        </p:style>
+        <p:txBody>
+          <a:bodyPr vert="horz" rtlCol="0" anchor="ctr"/>
+          <a:lstStyle/>
+          <a:p>
+            <a:pPr algn="ctr"/>
+            <a:r>
+              <a:rPr lang="en-US" sz="1600" dirty="0" smtClean="0">
+                <a:latin typeface="+mj-lt"/>
+              </a:rPr>
+              <a:t>SCTP</a:t>
+            </a:r>
+            <a:endParaRPr lang="en-US" sz="1400" dirty="0">
+              <a:latin typeface="+mj-lt"/>
+            </a:endParaRPr>
+          </a:p>
+        </p:txBody>
+      </p:sp>
+      <p:sp>
+        <p:nvSpPr>
+          <p:cNvPr id="26" name="Rectangle 25"/>
+          <p:cNvSpPr/>
+          <p:nvPr/>
+        </p:nvSpPr>
+        <p:spPr>
+          <a:xfrm>
+            <a:off x="5544106" y="1597583"/>
+            <a:ext cx="764693" cy="955815"/>
+          </a:xfrm>
+          <a:prstGeom prst="rect">
+            <a:avLst/>
+          </a:prstGeom>
+        </p:spPr>
+        <p:style>
+          <a:lnRef idx="2">
+            <a:schemeClr val="dk1"/>
+          </a:lnRef>
+          <a:fillRef idx="1">
+            <a:schemeClr val="lt1"/>
+          </a:fillRef>
+          <a:effectRef idx="0">
+            <a:schemeClr val="dk1"/>
+          </a:effectRef>
+          <a:fontRef idx="minor">
+            <a:schemeClr val="dk1"/>
+          </a:fontRef>
+        </p:style>
+        <p:txBody>
+          <a:bodyPr vert="vert270" rtlCol="0" anchor="ctr"/>
+          <a:lstStyle/>
+          <a:p>
+            <a:pPr algn="ctr"/>
+            <a:r>
+              <a:rPr lang="en-US" sz="1600" dirty="0" smtClean="0">
+                <a:latin typeface="+mj-lt"/>
+              </a:rPr>
+              <a:t>Data</a:t>
+            </a:r>
+          </a:p>
+          <a:p>
+            <a:pPr algn="ctr"/>
+            <a:r>
+              <a:rPr lang="en-US" sz="1600" dirty="0" smtClean="0">
+                <a:latin typeface="+mj-lt"/>
+              </a:rPr>
+              <a:t>Channel</a:t>
+            </a:r>
+            <a:endParaRPr lang="en-US" sz="1400" dirty="0">
+              <a:latin typeface="+mj-lt"/>
+            </a:endParaRPr>
+          </a:p>
+        </p:txBody>
+      </p:sp>
+      <p:sp>
+        <p:nvSpPr>
+          <p:cNvPr id="27" name="Rectangle 26"/>
+          <p:cNvSpPr/>
+          <p:nvPr/>
+        </p:nvSpPr>
+        <p:spPr>
+          <a:xfrm>
+            <a:off x="2075630" y="766213"/>
+            <a:ext cx="6964246" cy="831370"/>
+          </a:xfrm>
+          <a:prstGeom prst="rect">
+            <a:avLst/>
+          </a:prstGeom>
+        </p:spPr>
+        <p:style>
+          <a:lnRef idx="2">
+            <a:schemeClr val="dk1"/>
+          </a:lnRef>
+          <a:fillRef idx="1">
+            <a:schemeClr val="lt1"/>
+          </a:fillRef>
+          <a:effectRef idx="0">
+            <a:schemeClr val="dk1"/>
+          </a:effectRef>
+          <a:fontRef idx="minor">
+            <a:schemeClr val="dk1"/>
+          </a:fontRef>
+        </p:style>
+        <p:txBody>
+          <a:bodyPr rtlCol="0" anchor="ctr"/>
+          <a:lstStyle/>
+          <a:p>
+            <a:pPr algn="ctr"/>
+            <a:r>
+              <a:rPr lang="en-US" sz="1600" dirty="0" err="1" smtClean="0"/>
+              <a:t>WebRTC</a:t>
+            </a:r>
+            <a:r>
+              <a:rPr lang="en-US" sz="1600" dirty="0" smtClean="0"/>
+              <a:t> Application</a:t>
+            </a:r>
+            <a:endParaRPr lang="en-US" sz="1600" dirty="0">
+              <a:latin typeface="+mj-lt"/>
+            </a:endParaRPr>
+          </a:p>
+        </p:txBody>
+      </p:sp>
+    </p:spTree>
+    <p:extLst>
+      <p:ext uri="{BB962C8B-B14F-4D97-AF65-F5344CB8AC3E}">
+        <p14:creationId xmlns:p14="http://schemas.microsoft.com/office/powerpoint/2010/main" val="3585768518"/>
+      </p:ext>
+    </p:extLst>
+  </p:cSld>
+  <p:clrMapOvr>
+    <a:masterClrMapping/>
+  </p:clrMapOvr>
+</p:sld>
+</file>
+
+<file path=ppt/slides/slide11.xml><?xml version="1.0" encoding="utf-8"?>
+<p:sld xmlns:a="http://schemas.openxmlformats.org/drawingml/2006/main" xmlns:r="http://schemas.openxmlformats.org/officeDocument/2006/relationships" xmlns:p="http://schemas.openxmlformats.org/presentationml/2006/main">
+  <p:cSld>
+    <p:spTree>
+      <p:nvGrpSpPr>
+        <p:cNvPr id="1" name=""/>
+        <p:cNvGrpSpPr/>
+        <p:nvPr/>
+      </p:nvGrpSpPr>
+      <p:grpSpPr>
+        <a:xfrm>
+          <a:off x="0" y="0"/>
+          <a:ext cx="0" cy="0"/>
+          <a:chOff x="0" y="0"/>
+          <a:chExt cx="0" cy="0"/>
+        </a:xfrm>
+      </p:grpSpPr>
+      <p:sp>
+        <p:nvSpPr>
           <p:cNvPr id="3" name="Rounded Rectangle 2"/>
           <p:cNvSpPr/>
           <p:nvPr/>
@@ -6155,7 +7182,7 @@
 </p:sld>
 </file>
 
-<file path=ppt/slides/slide11.xml><?xml version="1.0" encoding="utf-8"?>
+<file path=ppt/slides/slide12.xml><?xml version="1.0" encoding="utf-8"?>
 <p:sld xmlns:a="http://schemas.openxmlformats.org/drawingml/2006/main" xmlns:r="http://schemas.openxmlformats.org/officeDocument/2006/relationships" xmlns:p="http://schemas.openxmlformats.org/presentationml/2006/main">
   <p:cSld>
     <p:spTree>
@@ -7386,7 +8413,7 @@
 </p:sld>
 </file>
 
-<file path=ppt/slides/slide12.xml><?xml version="1.0" encoding="utf-8"?>
+<file path=ppt/slides/slide13.xml><?xml version="1.0" encoding="utf-8"?>
 <p:sld xmlns:a="http://schemas.openxmlformats.org/drawingml/2006/main" xmlns:r="http://schemas.openxmlformats.org/officeDocument/2006/relationships" xmlns:p="http://schemas.openxmlformats.org/presentationml/2006/main">
   <p:cSld>
     <p:spTree>
@@ -9522,7 +10549,7 @@
 </p:sld>
 </file>
 
-<file path=ppt/slides/slide13.xml><?xml version="1.0" encoding="utf-8"?>
+<file path=ppt/slides/slide14.xml><?xml version="1.0" encoding="utf-8"?>
 <p:sld xmlns:a="http://schemas.openxmlformats.org/drawingml/2006/main" xmlns:r="http://schemas.openxmlformats.org/officeDocument/2006/relationships" xmlns:p="http://schemas.openxmlformats.org/presentationml/2006/main">
   <p:cSld>
     <p:spTree>
@@ -12186,7 +13213,7 @@
         </p:nvSpPr>
         <p:spPr>
           <a:xfrm>
-            <a:off x="6215399" y="152384"/>
+            <a:off x="6215399" y="316244"/>
             <a:ext cx="1144864" cy="914855"/>
           </a:xfrm>
           <a:prstGeom prst="rect">
@@ -12228,7 +13255,7 @@
         </p:nvSpPr>
         <p:spPr>
           <a:xfrm>
-            <a:off x="1356265" y="152384"/>
+            <a:off x="1356265" y="316244"/>
             <a:ext cx="1144864" cy="914855"/>
           </a:xfrm>
           <a:prstGeom prst="rect">
@@ -12270,7 +13297,7 @@
         </p:nvSpPr>
         <p:spPr>
           <a:xfrm>
-            <a:off x="2501129" y="316238"/>
+            <a:off x="2501129" y="480098"/>
             <a:ext cx="3714270" cy="314055"/>
           </a:xfrm>
           <a:prstGeom prst="rightArrow">
@@ -12310,7 +13337,7 @@
         </p:nvSpPr>
         <p:spPr>
           <a:xfrm>
-            <a:off x="3482127" y="-15818"/>
+            <a:off x="3482127" y="148042"/>
             <a:ext cx="1569660" cy="338554"/>
           </a:xfrm>
           <a:prstGeom prst="rect">
@@ -12340,7 +13367,7 @@
         </p:nvCxnSpPr>
         <p:spPr>
           <a:xfrm flipH="1">
-            <a:off x="2501129" y="848764"/>
+            <a:off x="2501129" y="1012624"/>
             <a:ext cx="3714270" cy="1"/>
           </a:xfrm>
           <a:prstGeom prst="straightConnector1">
@@ -12373,7 +13400,7 @@
         </p:nvSpPr>
         <p:spPr>
           <a:xfrm>
-            <a:off x="3355904" y="862421"/>
+            <a:off x="3355904" y="1026281"/>
             <a:ext cx="1800493" cy="338554"/>
           </a:xfrm>
           <a:prstGeom prst="rect">
@@ -12403,8 +13430,8 @@
         </p:nvSpPr>
         <p:spPr>
           <a:xfrm>
-            <a:off x="928566" y="1200975"/>
-            <a:ext cx="2731081" cy="646331"/>
+            <a:off x="464287" y="1364835"/>
+            <a:ext cx="2922255" cy="307777"/>
           </a:xfrm>
           <a:prstGeom prst="rect">
             <a:avLst/>
@@ -12418,11 +13445,25 @@
           <a:lstStyle/>
           <a:p>
             <a:r>
-              <a:rPr lang="en-US" dirty="0" smtClean="0">
-                <a:latin typeface="Courier"/>
-                <a:cs typeface="Courier"/>
+              <a:rPr lang="en-US" sz="1400" dirty="0" smtClean="0">
+                <a:latin typeface="Ubuntu"/>
+                <a:cs typeface="Ubuntu"/>
               </a:rPr>
-              <a:t>Calculates sender’s estimate</a:t>
+              <a:t>Calculates </a:t>
+            </a:r>
+            <a:r>
+              <a:rPr lang="en-US" sz="1400" dirty="0" smtClean="0">
+                <a:latin typeface="Ubuntu"/>
+                <a:cs typeface="Ubuntu"/>
+              </a:rPr>
+              <a:t>the sender’s </a:t>
+            </a:r>
+            <a:r>
+              <a:rPr lang="en-US" sz="1400" dirty="0" smtClean="0">
+                <a:latin typeface="Ubuntu"/>
+                <a:cs typeface="Ubuntu"/>
+              </a:rPr>
+              <a:t>estimate</a:t>
             </a:r>
           </a:p>
         </p:txBody>
@@ -12652,8 +13693,8 @@
         </p:nvSpPr>
         <p:spPr>
           <a:xfrm>
-            <a:off x="5587250" y="1271445"/>
-            <a:ext cx="3029310" cy="369332"/>
+            <a:off x="5807928" y="1364835"/>
+            <a:ext cx="2005155" cy="307777"/>
           </a:xfrm>
           <a:prstGeom prst="rect">
             <a:avLst/>
@@ -12667,9 +13708,9 @@
           <a:lstStyle/>
           <a:p>
             <a:r>
-              <a:rPr lang="en-US" dirty="0" smtClean="0">
-                <a:latin typeface="Courier"/>
-                <a:cs typeface="Courier"/>
+              <a:rPr lang="en-US" sz="1400" dirty="0" smtClean="0">
+                <a:latin typeface="Ubuntu"/>
+                <a:cs typeface="Ubuntu"/>
               </a:rPr>
               <a:t>Measures congestion</a:t>
             </a:r>
@@ -12684,8 +13725,8 @@
         </p:nvSpPr>
         <p:spPr>
           <a:xfrm>
-            <a:off x="5739650" y="3413388"/>
-            <a:ext cx="3029310" cy="646331"/>
+            <a:off x="5421002" y="3466752"/>
+            <a:ext cx="2758588" cy="307777"/>
           </a:xfrm>
           <a:prstGeom prst="rect">
             <a:avLst/>
@@ -12696,13 +13737,20 @@
           <a:bodyPr wrap="square" rtlCol="0">
             <a:spAutoFit/>
           </a:bodyPr>
-          <a:lstStyle/>
-          <a:p>
-            <a:r>
-              <a:rPr lang="en-US" dirty="0" smtClean="0">
-                <a:latin typeface="Courier"/>
-                <a:cs typeface="Courier"/>
-              </a:rPr>
+          <a:lstStyle>
+            <a:defPPr>
+              <a:defRPr lang="en-US"/>
+            </a:defPPr>
+            <a:lvl1pPr>
+              <a:defRPr sz="1400">
+                <a:latin typeface="Ubuntu"/>
+                <a:cs typeface="Ubuntu"/>
+              </a:defRPr>
+            </a:lvl1pPr>
+          </a:lstStyle>
+          <a:p>
+            <a:r>
+              <a:rPr lang="en-US" dirty="0"/>
               <a:t>Calculates Receiver’s Estimate</a:t>
             </a:r>
           </a:p>
@@ -12716,8 +13764,8 @@
         </p:nvSpPr>
         <p:spPr>
           <a:xfrm>
-            <a:off x="1080966" y="3494939"/>
-            <a:ext cx="2731081" cy="646331"/>
+            <a:off x="559872" y="3494939"/>
+            <a:ext cx="2731081" cy="307777"/>
           </a:xfrm>
           <a:prstGeom prst="rect">
             <a:avLst/>
@@ -12728,14 +13776,29 @@
           <a:bodyPr wrap="square" rtlCol="0">
             <a:spAutoFit/>
           </a:bodyPr>
-          <a:lstStyle/>
-          <a:p>
-            <a:r>
-              <a:rPr lang="en-US" dirty="0" smtClean="0">
-                <a:latin typeface="Courier"/>
-                <a:cs typeface="Courier"/>
-              </a:rPr>
-              <a:t>Follows receiver’s estimate</a:t>
+          <a:lstStyle>
+            <a:defPPr>
+              <a:defRPr lang="en-US"/>
+            </a:defPPr>
+            <a:lvl1pPr>
+              <a:defRPr sz="1400">
+                <a:latin typeface="Ubuntu"/>
+                <a:cs typeface="Ubuntu"/>
+              </a:defRPr>
+            </a:lvl1pPr>
+          </a:lstStyle>
+          <a:p>
+            <a:r>
+              <a:rPr lang="en-US" dirty="0"/>
+              <a:t>Follows </a:t>
+            </a:r>
+            <a:r>
+              <a:rPr lang="en-US" dirty="0" smtClean="0"/>
+              <a:t>the receiver’s </a:t>
+            </a:r>
+            <a:r>
+              <a:rPr lang="en-US" dirty="0"/>
+              <a:t>estimate</a:t>
             </a:r>
           </a:p>
         </p:txBody>
@@ -12941,8 +14004,8 @@
         </p:nvSpPr>
         <p:spPr>
           <a:xfrm>
-            <a:off x="5739650" y="5358222"/>
-            <a:ext cx="3029310" cy="923330"/>
+            <a:off x="5516587" y="5461497"/>
+            <a:ext cx="2663003" cy="523220"/>
           </a:xfrm>
           <a:prstGeom prst="rect">
             <a:avLst/>
@@ -12953,13 +14016,20 @@
           <a:bodyPr wrap="square" rtlCol="0">
             <a:spAutoFit/>
           </a:bodyPr>
-          <a:lstStyle/>
-          <a:p>
-            <a:r>
-              <a:rPr lang="en-US" dirty="0" smtClean="0">
-                <a:latin typeface="Courier"/>
-                <a:cs typeface="Courier"/>
-              </a:rPr>
+          <a:lstStyle>
+            <a:defPPr>
+              <a:defRPr lang="en-US"/>
+            </a:defPPr>
+            <a:lvl1pPr>
+              <a:defRPr sz="1400">
+                <a:latin typeface="Ubuntu"/>
+                <a:cs typeface="Ubuntu"/>
+              </a:defRPr>
+            </a:lvl1pPr>
+          </a:lstStyle>
+          <a:p>
+            <a:r>
+              <a:rPr lang="en-US" dirty="0"/>
               <a:t>Measures Congestion and Calculates Receiver’s Estimate</a:t>
             </a:r>
           </a:p>
@@ -12973,8 +14043,8 @@
         </p:nvSpPr>
         <p:spPr>
           <a:xfrm>
-            <a:off x="1080966" y="5467083"/>
-            <a:ext cx="3083932" cy="1477328"/>
+            <a:off x="518907" y="5461498"/>
+            <a:ext cx="2796032" cy="738664"/>
           </a:xfrm>
           <a:prstGeom prst="rect">
             <a:avLst/>
@@ -12985,15 +14055,35 @@
           <a:bodyPr wrap="square" rtlCol="0">
             <a:spAutoFit/>
           </a:bodyPr>
-          <a:lstStyle/>
-          <a:p>
-            <a:r>
-              <a:rPr lang="en-US" dirty="0" smtClean="0">
-                <a:latin typeface="Courier"/>
-                <a:cs typeface="Courier"/>
-              </a:rPr>
-              <a:t>Calculates sender’s estimate and chooses a value between Sender and Receiver Estimates</a:t>
-            </a:r>
+          <a:lstStyle>
+            <a:defPPr>
+              <a:defRPr lang="en-US"/>
+            </a:defPPr>
+            <a:lvl1pPr>
+              <a:defRPr sz="1400">
+                <a:latin typeface="Ubuntu"/>
+                <a:cs typeface="Ubuntu"/>
+              </a:defRPr>
+            </a:lvl1pPr>
+          </a:lstStyle>
+          <a:p>
+            <a:r>
+              <a:rPr lang="en-US" dirty="0"/>
+              <a:t>Calculates </a:t>
+            </a:r>
+            <a:r>
+              <a:rPr lang="en-US" dirty="0" smtClean="0"/>
+              <a:t>the sender’s </a:t>
+            </a:r>
+            <a:r>
+              <a:rPr lang="en-US" dirty="0"/>
+              <a:t>estimate and chooses a value between </a:t>
+            </a:r>
+            <a:r>
+              <a:rPr lang="en-US" dirty="0" smtClean="0"/>
+              <a:t>the two Estimates</a:t>
+            </a:r>
+            <a:endParaRPr lang="en-US" dirty="0"/>
           </a:p>
         </p:txBody>
       </p:sp>
@@ -15682,6 +16772,795 @@
 </file>
 
 <file path=ppt/slides/slide8.xml><?xml version="1.0" encoding="utf-8"?>
+<p:sld xmlns:a="http://schemas.openxmlformats.org/drawingml/2006/main" xmlns:r="http://schemas.openxmlformats.org/officeDocument/2006/relationships" xmlns:p="http://schemas.openxmlformats.org/presentationml/2006/main">
+  <p:cSld>
+    <p:spTree>
+      <p:nvGrpSpPr>
+        <p:cNvPr id="1" name=""/>
+        <p:cNvGrpSpPr/>
+        <p:nvPr/>
+      </p:nvGrpSpPr>
+      <p:grpSpPr>
+        <a:xfrm>
+          <a:off x="0" y="0"/>
+          <a:ext cx="0" cy="0"/>
+          <a:chOff x="0" y="0"/>
+          <a:chExt cx="0" cy="0"/>
+        </a:xfrm>
+      </p:grpSpPr>
+      <p:sp>
+        <p:nvSpPr>
+          <p:cNvPr id="6" name="TextBox 5"/>
+          <p:cNvSpPr txBox="1"/>
+          <p:nvPr/>
+        </p:nvSpPr>
+        <p:spPr>
+          <a:xfrm>
+            <a:off x="2813866" y="3950297"/>
+            <a:ext cx="3101359" cy="830997"/>
+          </a:xfrm>
+          <a:prstGeom prst="rect">
+            <a:avLst/>
+          </a:prstGeom>
+          <a:noFill/>
+        </p:spPr>
+        <p:txBody>
+          <a:bodyPr wrap="none" rtlCol="0">
+            <a:spAutoFit/>
+          </a:bodyPr>
+          <a:lstStyle/>
+          <a:p>
+            <a:r>
+              <a:rPr lang="en-US" sz="1600" dirty="0"/>
+              <a:t>1. Estimated NCMS </a:t>
+            </a:r>
+            <a:r>
+              <a:rPr lang="en-US" sz="1600" dirty="0" smtClean="0"/>
+              <a:t>throughput</a:t>
+            </a:r>
+            <a:endParaRPr lang="en-US" sz="1600" dirty="0" smtClean="0"/>
+          </a:p>
+          <a:p>
+            <a:r>
+              <a:rPr lang="en-US" sz="1600" dirty="0" smtClean="0"/>
+              <a:t>2. Congestion </a:t>
+            </a:r>
+            <a:r>
+              <a:rPr lang="en-US" sz="1600" dirty="0" smtClean="0"/>
+              <a:t>Cues </a:t>
+            </a:r>
+            <a:endParaRPr lang="en-US" sz="1600" dirty="0" smtClean="0"/>
+          </a:p>
+          <a:p>
+            <a:r>
+              <a:rPr lang="en-US" sz="1600" dirty="0" smtClean="0"/>
+              <a:t>3. Receiver's </a:t>
+            </a:r>
+            <a:r>
+              <a:rPr lang="en-US" sz="1600" dirty="0" smtClean="0"/>
+              <a:t>Estimate</a:t>
+            </a:r>
+            <a:endParaRPr lang="en-US" sz="1600" dirty="0"/>
+          </a:p>
+        </p:txBody>
+      </p:sp>
+      <p:sp>
+        <p:nvSpPr>
+          <p:cNvPr id="7" name="TextBox 6"/>
+          <p:cNvSpPr txBox="1"/>
+          <p:nvPr/>
+        </p:nvSpPr>
+        <p:spPr>
+          <a:xfrm>
+            <a:off x="5449163" y="4708856"/>
+            <a:ext cx="3029310" cy="523220"/>
+          </a:xfrm>
+          <a:prstGeom prst="rect">
+            <a:avLst/>
+          </a:prstGeom>
+          <a:noFill/>
+        </p:spPr>
+        <p:txBody>
+          <a:bodyPr wrap="square" rtlCol="0">
+            <a:spAutoFit/>
+          </a:bodyPr>
+          <a:lstStyle>
+            <a:defPPr>
+              <a:defRPr lang="en-US"/>
+            </a:defPPr>
+            <a:lvl1pPr>
+              <a:defRPr sz="1400">
+                <a:latin typeface="Ubuntu"/>
+                <a:cs typeface="Ubuntu"/>
+              </a:defRPr>
+            </a:lvl1pPr>
+          </a:lstStyle>
+          <a:p>
+            <a:r>
+              <a:rPr lang="en-US" dirty="0"/>
+              <a:t>Measures Congestion and Calculates Receiver’s Estimate</a:t>
+            </a:r>
+          </a:p>
+        </p:txBody>
+      </p:sp>
+      <p:sp>
+        <p:nvSpPr>
+          <p:cNvPr id="8" name="TextBox 7"/>
+          <p:cNvSpPr txBox="1"/>
+          <p:nvPr/>
+        </p:nvSpPr>
+        <p:spPr>
+          <a:xfrm>
+            <a:off x="494921" y="4708856"/>
+            <a:ext cx="2796032" cy="1815882"/>
+          </a:xfrm>
+          <a:prstGeom prst="rect">
+            <a:avLst/>
+          </a:prstGeom>
+          <a:noFill/>
+        </p:spPr>
+        <p:txBody>
+          <a:bodyPr wrap="square" rtlCol="0">
+            <a:spAutoFit/>
+          </a:bodyPr>
+          <a:lstStyle>
+            <a:defPPr>
+              <a:defRPr lang="en-US"/>
+            </a:defPPr>
+            <a:lvl1pPr>
+              <a:defRPr sz="1400">
+                <a:latin typeface="Ubuntu"/>
+                <a:cs typeface="Ubuntu"/>
+              </a:defRPr>
+            </a:lvl1pPr>
+          </a:lstStyle>
+          <a:p>
+            <a:pPr marL="285750" indent="-285750">
+              <a:buFont typeface="Arial"/>
+              <a:buChar char="•"/>
+            </a:pPr>
+            <a:r>
+              <a:rPr lang="en-US" dirty="0"/>
+              <a:t>Calculates sender’s </a:t>
+            </a:r>
+            <a:r>
+              <a:rPr lang="en-US" dirty="0" smtClean="0"/>
+              <a:t>estimate based on congestion cues and  the receiver’s estimate </a:t>
+            </a:r>
+          </a:p>
+          <a:p>
+            <a:pPr marL="285750" indent="-285750">
+              <a:buFont typeface="Arial"/>
+              <a:buChar char="•"/>
+            </a:pPr>
+            <a:r>
+              <a:rPr lang="en-US" dirty="0" smtClean="0"/>
+              <a:t>Receives Coverage map info directly from NCMS and from the receiver</a:t>
+            </a:r>
+          </a:p>
+          <a:p>
+            <a:r>
+              <a:rPr lang="en-US" dirty="0" smtClean="0"/>
+              <a:t>Sender chooses </a:t>
+            </a:r>
+            <a:r>
+              <a:rPr lang="en-US" dirty="0"/>
+              <a:t>a value </a:t>
+            </a:r>
+            <a:r>
+              <a:rPr lang="en-US" dirty="0" smtClean="0"/>
+              <a:t>based on these inputs</a:t>
+            </a:r>
+            <a:endParaRPr lang="en-US" dirty="0"/>
+          </a:p>
+        </p:txBody>
+      </p:sp>
+      <p:sp>
+        <p:nvSpPr>
+          <p:cNvPr id="21" name="Rectangle 20"/>
+          <p:cNvSpPr/>
+          <p:nvPr/>
+        </p:nvSpPr>
+        <p:spPr>
+          <a:xfrm>
+            <a:off x="6158603" y="3315275"/>
+            <a:ext cx="1474768" cy="914855"/>
+          </a:xfrm>
+          <a:prstGeom prst="rect">
+            <a:avLst/>
+          </a:prstGeom>
+        </p:spPr>
+        <p:style>
+          <a:lnRef idx="2">
+            <a:schemeClr val="dk1"/>
+          </a:lnRef>
+          <a:fillRef idx="1">
+            <a:schemeClr val="lt1"/>
+          </a:fillRef>
+          <a:effectRef idx="0">
+            <a:schemeClr val="dk1"/>
+          </a:effectRef>
+          <a:fontRef idx="minor">
+            <a:schemeClr val="dk1"/>
+          </a:fontRef>
+        </p:style>
+        <p:txBody>
+          <a:bodyPr rtlCol="0" anchor="ctr"/>
+          <a:lstStyle/>
+          <a:p>
+            <a:pPr algn="ctr"/>
+            <a:r>
+              <a:rPr lang="en-US" dirty="0" smtClean="0"/>
+              <a:t>Receiver</a:t>
+            </a:r>
+            <a:endParaRPr lang="en-US" dirty="0"/>
+          </a:p>
+        </p:txBody>
+      </p:sp>
+      <p:sp>
+        <p:nvSpPr>
+          <p:cNvPr id="22" name="Rectangle 21"/>
+          <p:cNvSpPr/>
+          <p:nvPr/>
+        </p:nvSpPr>
+        <p:spPr>
+          <a:xfrm>
+            <a:off x="1093541" y="3315275"/>
+            <a:ext cx="1350792" cy="914855"/>
+          </a:xfrm>
+          <a:prstGeom prst="rect">
+            <a:avLst/>
+          </a:prstGeom>
+        </p:spPr>
+        <p:style>
+          <a:lnRef idx="2">
+            <a:schemeClr val="dk1"/>
+          </a:lnRef>
+          <a:fillRef idx="1">
+            <a:schemeClr val="lt1"/>
+          </a:fillRef>
+          <a:effectRef idx="0">
+            <a:schemeClr val="dk1"/>
+          </a:effectRef>
+          <a:fontRef idx="minor">
+            <a:schemeClr val="dk1"/>
+          </a:fontRef>
+        </p:style>
+        <p:txBody>
+          <a:bodyPr rtlCol="0" anchor="ctr"/>
+          <a:lstStyle/>
+          <a:p>
+            <a:pPr algn="ctr"/>
+            <a:r>
+              <a:rPr lang="en-US" dirty="0" smtClean="0"/>
+              <a:t>Sender</a:t>
+            </a:r>
+            <a:endParaRPr lang="en-US" sz="1600" dirty="0"/>
+          </a:p>
+        </p:txBody>
+      </p:sp>
+      <p:sp>
+        <p:nvSpPr>
+          <p:cNvPr id="23" name="Right Arrow 22"/>
+          <p:cNvSpPr/>
+          <p:nvPr/>
+        </p:nvSpPr>
+        <p:spPr>
+          <a:xfrm>
+            <a:off x="2444333" y="3479130"/>
+            <a:ext cx="3714270" cy="139328"/>
+          </a:xfrm>
+          <a:prstGeom prst="rightArrow">
+            <a:avLst/>
+          </a:prstGeom>
+        </p:spPr>
+        <p:style>
+          <a:lnRef idx="2">
+            <a:schemeClr val="dk1">
+              <a:shade val="50000"/>
+            </a:schemeClr>
+          </a:lnRef>
+          <a:fillRef idx="1">
+            <a:schemeClr val="dk1"/>
+          </a:fillRef>
+          <a:effectRef idx="0">
+            <a:schemeClr val="dk1"/>
+          </a:effectRef>
+          <a:fontRef idx="minor">
+            <a:schemeClr val="lt1"/>
+          </a:fontRef>
+        </p:style>
+        <p:txBody>
+          <a:bodyPr rtlCol="0" anchor="ctr"/>
+          <a:lstStyle/>
+          <a:p>
+            <a:pPr algn="ctr"/>
+            <a:endParaRPr lang="en-US"/>
+          </a:p>
+        </p:txBody>
+      </p:sp>
+      <p:sp>
+        <p:nvSpPr>
+          <p:cNvPr id="24" name="TextBox 23"/>
+          <p:cNvSpPr txBox="1"/>
+          <p:nvPr/>
+        </p:nvSpPr>
+        <p:spPr>
+          <a:xfrm>
+            <a:off x="3111257" y="3147073"/>
+            <a:ext cx="2505814" cy="338554"/>
+          </a:xfrm>
+          <a:prstGeom prst="rect">
+            <a:avLst/>
+          </a:prstGeom>
+          <a:noFill/>
+        </p:spPr>
+        <p:txBody>
+          <a:bodyPr wrap="none" rtlCol="0">
+            <a:spAutoFit/>
+          </a:bodyPr>
+          <a:lstStyle/>
+          <a:p>
+            <a:r>
+              <a:rPr lang="en-US" sz="1600" dirty="0" smtClean="0"/>
+              <a:t>MPRTP (media packets)</a:t>
+            </a:r>
+            <a:endParaRPr lang="en-US" sz="1600" dirty="0"/>
+          </a:p>
+        </p:txBody>
+      </p:sp>
+      <p:cxnSp>
+        <p:nvCxnSpPr>
+          <p:cNvPr id="25" name="Straight Arrow Connector 24"/>
+          <p:cNvCxnSpPr/>
+          <p:nvPr/>
+        </p:nvCxnSpPr>
+        <p:spPr>
+          <a:xfrm flipH="1">
+            <a:off x="2444333" y="4011655"/>
+            <a:ext cx="3714270" cy="1"/>
+          </a:xfrm>
+          <a:prstGeom prst="straightConnector1">
+            <a:avLst/>
+          </a:prstGeom>
+          <a:ln>
+            <a:tailEnd type="arrow"/>
+          </a:ln>
+        </p:spPr>
+        <p:style>
+          <a:lnRef idx="1">
+            <a:schemeClr val="dk1"/>
+          </a:lnRef>
+          <a:fillRef idx="0">
+            <a:schemeClr val="dk1"/>
+          </a:fillRef>
+          <a:effectRef idx="0">
+            <a:schemeClr val="dk1"/>
+          </a:effectRef>
+          <a:fontRef idx="minor">
+            <a:schemeClr val="tx1"/>
+          </a:fontRef>
+        </p:style>
+      </p:cxnSp>
+      <p:sp>
+        <p:nvSpPr>
+          <p:cNvPr id="27" name="Rectangle 26"/>
+          <p:cNvSpPr/>
+          <p:nvPr/>
+        </p:nvSpPr>
+        <p:spPr>
+          <a:xfrm>
+            <a:off x="1093541" y="887545"/>
+            <a:ext cx="6539830" cy="380157"/>
+          </a:xfrm>
+          <a:prstGeom prst="rect">
+            <a:avLst/>
+          </a:prstGeom>
+        </p:spPr>
+        <p:style>
+          <a:lnRef idx="2">
+            <a:schemeClr val="dk1"/>
+          </a:lnRef>
+          <a:fillRef idx="1">
+            <a:schemeClr val="lt1"/>
+          </a:fillRef>
+          <a:effectRef idx="0">
+            <a:schemeClr val="dk1"/>
+          </a:effectRef>
+          <a:fontRef idx="minor">
+            <a:schemeClr val="dk1"/>
+          </a:fontRef>
+        </p:style>
+        <p:txBody>
+          <a:bodyPr rtlCol="0" anchor="ctr"/>
+          <a:lstStyle/>
+          <a:p>
+            <a:pPr algn="ctr"/>
+            <a:r>
+              <a:rPr lang="en-US" dirty="0" smtClean="0"/>
+              <a:t>Network Coverage Map Service (NCMS)</a:t>
+            </a:r>
+            <a:endParaRPr lang="en-US" sz="1600" dirty="0"/>
+          </a:p>
+        </p:txBody>
+      </p:sp>
+      <p:cxnSp>
+        <p:nvCxnSpPr>
+          <p:cNvPr id="28" name="Straight Arrow Connector 27"/>
+          <p:cNvCxnSpPr/>
+          <p:nvPr/>
+        </p:nvCxnSpPr>
+        <p:spPr>
+          <a:xfrm flipV="1">
+            <a:off x="6526210" y="1267703"/>
+            <a:ext cx="0" cy="2047573"/>
+          </a:xfrm>
+          <a:prstGeom prst="straightConnector1">
+            <a:avLst/>
+          </a:prstGeom>
+          <a:ln>
+            <a:tailEnd type="arrow"/>
+          </a:ln>
+        </p:spPr>
+        <p:style>
+          <a:lnRef idx="1">
+            <a:schemeClr val="dk1"/>
+          </a:lnRef>
+          <a:fillRef idx="0">
+            <a:schemeClr val="dk1"/>
+          </a:fillRef>
+          <a:effectRef idx="0">
+            <a:schemeClr val="dk1"/>
+          </a:effectRef>
+          <a:fontRef idx="minor">
+            <a:schemeClr val="tx1"/>
+          </a:fontRef>
+        </p:style>
+      </p:cxnSp>
+      <p:sp>
+        <p:nvSpPr>
+          <p:cNvPr id="29" name="TextBox 28"/>
+          <p:cNvSpPr txBox="1"/>
+          <p:nvPr/>
+        </p:nvSpPr>
+        <p:spPr>
+          <a:xfrm>
+            <a:off x="6095323" y="1565963"/>
+            <a:ext cx="400110" cy="1576738"/>
+          </a:xfrm>
+          <a:prstGeom prst="rect">
+            <a:avLst/>
+          </a:prstGeom>
+          <a:noFill/>
+        </p:spPr>
+        <p:txBody>
+          <a:bodyPr vert="vert270" wrap="none" rtlCol="0">
+            <a:spAutoFit/>
+          </a:bodyPr>
+          <a:lstStyle/>
+          <a:p>
+            <a:r>
+              <a:rPr lang="en-US" sz="1400" dirty="0" smtClean="0"/>
+              <a:t>Coverage Update</a:t>
+            </a:r>
+            <a:endParaRPr lang="en-US" sz="1400" dirty="0"/>
+          </a:p>
+        </p:txBody>
+      </p:sp>
+      <p:sp>
+        <p:nvSpPr>
+          <p:cNvPr id="30" name="TextBox 29"/>
+          <p:cNvSpPr txBox="1"/>
+          <p:nvPr/>
+        </p:nvSpPr>
+        <p:spPr>
+          <a:xfrm>
+            <a:off x="1512758" y="1374793"/>
+            <a:ext cx="400110" cy="1772280"/>
+          </a:xfrm>
+          <a:prstGeom prst="rect">
+            <a:avLst/>
+          </a:prstGeom>
+          <a:noFill/>
+        </p:spPr>
+        <p:txBody>
+          <a:bodyPr vert="vert270" wrap="none" rtlCol="0">
+            <a:spAutoFit/>
+          </a:bodyPr>
+          <a:lstStyle/>
+          <a:p>
+            <a:r>
+              <a:rPr lang="en-US" sz="1400" dirty="0" err="1" smtClean="0"/>
+              <a:t>Lookahead</a:t>
+            </a:r>
+            <a:r>
+              <a:rPr lang="en-US" sz="1400" dirty="0" smtClean="0"/>
+              <a:t> Request</a:t>
+            </a:r>
+            <a:endParaRPr lang="en-US" sz="1400" dirty="0"/>
+          </a:p>
+        </p:txBody>
+      </p:sp>
+      <p:cxnSp>
+        <p:nvCxnSpPr>
+          <p:cNvPr id="31" name="Straight Arrow Connector 30"/>
+          <p:cNvCxnSpPr/>
+          <p:nvPr/>
+        </p:nvCxnSpPr>
+        <p:spPr>
+          <a:xfrm flipV="1">
+            <a:off x="6963818" y="1267703"/>
+            <a:ext cx="0" cy="2047573"/>
+          </a:xfrm>
+          <a:prstGeom prst="straightConnector1">
+            <a:avLst/>
+          </a:prstGeom>
+          <a:ln>
+            <a:tailEnd type="arrow"/>
+          </a:ln>
+        </p:spPr>
+        <p:style>
+          <a:lnRef idx="1">
+            <a:schemeClr val="dk1"/>
+          </a:lnRef>
+          <a:fillRef idx="0">
+            <a:schemeClr val="dk1"/>
+          </a:fillRef>
+          <a:effectRef idx="0">
+            <a:schemeClr val="dk1"/>
+          </a:effectRef>
+          <a:fontRef idx="minor">
+            <a:schemeClr val="tx1"/>
+          </a:fontRef>
+        </p:style>
+      </p:cxnSp>
+      <p:sp>
+        <p:nvSpPr>
+          <p:cNvPr id="32" name="TextBox 31"/>
+          <p:cNvSpPr txBox="1"/>
+          <p:nvPr/>
+        </p:nvSpPr>
+        <p:spPr>
+          <a:xfrm>
+            <a:off x="6563708" y="1374793"/>
+            <a:ext cx="400110" cy="1772280"/>
+          </a:xfrm>
+          <a:prstGeom prst="rect">
+            <a:avLst/>
+          </a:prstGeom>
+          <a:noFill/>
+        </p:spPr>
+        <p:txBody>
+          <a:bodyPr vert="vert270" wrap="none" rtlCol="0">
+            <a:spAutoFit/>
+          </a:bodyPr>
+          <a:lstStyle/>
+          <a:p>
+            <a:r>
+              <a:rPr lang="en-US" sz="1400" dirty="0" err="1" smtClean="0"/>
+              <a:t>Lookahead</a:t>
+            </a:r>
+            <a:r>
+              <a:rPr lang="en-US" sz="1400" dirty="0" smtClean="0"/>
+              <a:t> Request</a:t>
+            </a:r>
+            <a:endParaRPr lang="en-US" sz="1400" dirty="0"/>
+          </a:p>
+        </p:txBody>
+      </p:sp>
+      <p:cxnSp>
+        <p:nvCxnSpPr>
+          <p:cNvPr id="33" name="Straight Arrow Connector 32"/>
+          <p:cNvCxnSpPr/>
+          <p:nvPr/>
+        </p:nvCxnSpPr>
+        <p:spPr>
+          <a:xfrm>
+            <a:off x="7360262" y="1267703"/>
+            <a:ext cx="0" cy="2047573"/>
+          </a:xfrm>
+          <a:prstGeom prst="straightConnector1">
+            <a:avLst/>
+          </a:prstGeom>
+          <a:ln>
+            <a:tailEnd type="arrow"/>
+          </a:ln>
+        </p:spPr>
+        <p:style>
+          <a:lnRef idx="1">
+            <a:schemeClr val="dk1"/>
+          </a:lnRef>
+          <a:fillRef idx="0">
+            <a:schemeClr val="dk1"/>
+          </a:fillRef>
+          <a:effectRef idx="0">
+            <a:schemeClr val="dk1"/>
+          </a:effectRef>
+          <a:fontRef idx="minor">
+            <a:schemeClr val="tx1"/>
+          </a:fontRef>
+        </p:style>
+      </p:cxnSp>
+      <p:sp>
+        <p:nvSpPr>
+          <p:cNvPr id="34" name="TextBox 33"/>
+          <p:cNvSpPr txBox="1"/>
+          <p:nvPr/>
+        </p:nvSpPr>
+        <p:spPr>
+          <a:xfrm>
+            <a:off x="6963818" y="1380409"/>
+            <a:ext cx="400110" cy="1682512"/>
+          </a:xfrm>
+          <a:prstGeom prst="rect">
+            <a:avLst/>
+          </a:prstGeom>
+          <a:noFill/>
+        </p:spPr>
+        <p:txBody>
+          <a:bodyPr vert="vert270" wrap="none" rtlCol="0">
+            <a:spAutoFit/>
+          </a:bodyPr>
+          <a:lstStyle/>
+          <a:p>
+            <a:r>
+              <a:rPr lang="en-US" sz="1400" dirty="0" smtClean="0"/>
+              <a:t>Coverage Map Info</a:t>
+            </a:r>
+            <a:endParaRPr lang="en-US" sz="1400" dirty="0"/>
+          </a:p>
+        </p:txBody>
+      </p:sp>
+      <p:cxnSp>
+        <p:nvCxnSpPr>
+          <p:cNvPr id="35" name="Straight Arrow Connector 34"/>
+          <p:cNvCxnSpPr/>
+          <p:nvPr/>
+        </p:nvCxnSpPr>
+        <p:spPr>
+          <a:xfrm flipV="1">
+            <a:off x="1923080" y="1250582"/>
+            <a:ext cx="0" cy="2047573"/>
+          </a:xfrm>
+          <a:prstGeom prst="straightConnector1">
+            <a:avLst/>
+          </a:prstGeom>
+          <a:ln>
+            <a:tailEnd type="arrow"/>
+          </a:ln>
+        </p:spPr>
+        <p:style>
+          <a:lnRef idx="1">
+            <a:schemeClr val="dk1"/>
+          </a:lnRef>
+          <a:fillRef idx="0">
+            <a:schemeClr val="dk1"/>
+          </a:fillRef>
+          <a:effectRef idx="0">
+            <a:schemeClr val="dk1"/>
+          </a:effectRef>
+          <a:fontRef idx="minor">
+            <a:schemeClr val="tx1"/>
+          </a:fontRef>
+        </p:style>
+      </p:cxnSp>
+      <p:cxnSp>
+        <p:nvCxnSpPr>
+          <p:cNvPr id="36" name="Straight Arrow Connector 35"/>
+          <p:cNvCxnSpPr/>
+          <p:nvPr/>
+        </p:nvCxnSpPr>
+        <p:spPr>
+          <a:xfrm>
+            <a:off x="2319524" y="1250582"/>
+            <a:ext cx="0" cy="2047573"/>
+          </a:xfrm>
+          <a:prstGeom prst="straightConnector1">
+            <a:avLst/>
+          </a:prstGeom>
+          <a:ln>
+            <a:tailEnd type="arrow"/>
+          </a:ln>
+        </p:spPr>
+        <p:style>
+          <a:lnRef idx="1">
+            <a:schemeClr val="dk1"/>
+          </a:lnRef>
+          <a:fillRef idx="0">
+            <a:schemeClr val="dk1"/>
+          </a:fillRef>
+          <a:effectRef idx="0">
+            <a:schemeClr val="dk1"/>
+          </a:effectRef>
+          <a:fontRef idx="minor">
+            <a:schemeClr val="tx1"/>
+          </a:fontRef>
+        </p:style>
+      </p:cxnSp>
+      <p:sp>
+        <p:nvSpPr>
+          <p:cNvPr id="37" name="TextBox 36"/>
+          <p:cNvSpPr txBox="1"/>
+          <p:nvPr/>
+        </p:nvSpPr>
+        <p:spPr>
+          <a:xfrm>
+            <a:off x="1923080" y="1363288"/>
+            <a:ext cx="400110" cy="1682512"/>
+          </a:xfrm>
+          <a:prstGeom prst="rect">
+            <a:avLst/>
+          </a:prstGeom>
+          <a:noFill/>
+        </p:spPr>
+        <p:txBody>
+          <a:bodyPr vert="vert270" wrap="none" rtlCol="0">
+            <a:spAutoFit/>
+          </a:bodyPr>
+          <a:lstStyle/>
+          <a:p>
+            <a:r>
+              <a:rPr lang="en-US" sz="1400" dirty="0" smtClean="0"/>
+              <a:t>Coverage Map Info</a:t>
+            </a:r>
+            <a:endParaRPr lang="en-US" sz="1400" dirty="0"/>
+          </a:p>
+        </p:txBody>
+      </p:sp>
+      <p:sp>
+        <p:nvSpPr>
+          <p:cNvPr id="38" name="Right Arrow 37"/>
+          <p:cNvSpPr/>
+          <p:nvPr/>
+        </p:nvSpPr>
+        <p:spPr>
+          <a:xfrm>
+            <a:off x="2444333" y="3647386"/>
+            <a:ext cx="3714270" cy="139328"/>
+          </a:xfrm>
+          <a:prstGeom prst="rightArrow">
+            <a:avLst/>
+          </a:prstGeom>
+        </p:spPr>
+        <p:style>
+          <a:lnRef idx="2">
+            <a:schemeClr val="dk1">
+              <a:shade val="50000"/>
+            </a:schemeClr>
+          </a:lnRef>
+          <a:fillRef idx="1">
+            <a:schemeClr val="dk1"/>
+          </a:fillRef>
+          <a:effectRef idx="0">
+            <a:schemeClr val="dk1"/>
+          </a:effectRef>
+          <a:fontRef idx="minor">
+            <a:schemeClr val="lt1"/>
+          </a:fontRef>
+        </p:style>
+        <p:txBody>
+          <a:bodyPr rtlCol="0" anchor="ctr"/>
+          <a:lstStyle/>
+          <a:p>
+            <a:pPr algn="ctr"/>
+            <a:endParaRPr lang="en-US"/>
+          </a:p>
+        </p:txBody>
+      </p:sp>
+    </p:spTree>
+    <p:extLst>
+      <p:ext uri="{BB962C8B-B14F-4D97-AF65-F5344CB8AC3E}">
+        <p14:creationId xmlns:p14="http://schemas.microsoft.com/office/powerpoint/2010/main" val="3930112195"/>
+      </p:ext>
+    </p:extLst>
+  </p:cSld>
+  <p:clrMapOvr>
+    <a:masterClrMapping/>
+  </p:clrMapOvr>
+</p:sld>
+</file>
+
+<file path=ppt/slides/slide9.xml><?xml version="1.0" encoding="utf-8"?>
 <p:sld xmlns:a="http://schemas.openxmlformats.org/drawingml/2006/main" xmlns:r="http://schemas.openxmlformats.org/officeDocument/2006/relationships" xmlns:p="http://schemas.openxmlformats.org/presentationml/2006/main">
   <p:cSld>
     <p:spTree>
@@ -18250,1032 +20129,6 @@
     <p:extLst>
       <p:ext uri="{BB962C8B-B14F-4D97-AF65-F5344CB8AC3E}">
         <p14:creationId xmlns:p14="http://schemas.microsoft.com/office/powerpoint/2010/main" val="3929904410"/>
-      </p:ext>
-    </p:extLst>
-  </p:cSld>
-  <p:clrMapOvr>
-    <a:masterClrMapping/>
-  </p:clrMapOvr>
-</p:sld>
-</file>
-
-<file path=ppt/slides/slide9.xml><?xml version="1.0" encoding="utf-8"?>
-<p:sld xmlns:a="http://schemas.openxmlformats.org/drawingml/2006/main" xmlns:r="http://schemas.openxmlformats.org/officeDocument/2006/relationships" xmlns:p="http://schemas.openxmlformats.org/presentationml/2006/main">
-  <p:cSld>
-    <p:spTree>
-      <p:nvGrpSpPr>
-        <p:cNvPr id="1" name=""/>
-        <p:cNvGrpSpPr/>
-        <p:nvPr/>
-      </p:nvGrpSpPr>
-      <p:grpSpPr>
-        <a:xfrm>
-          <a:off x="0" y="0"/>
-          <a:ext cx="0" cy="0"/>
-          <a:chOff x="0" y="0"/>
-          <a:chExt cx="0" cy="0"/>
-        </a:xfrm>
-      </p:grpSpPr>
-      <p:sp>
-        <p:nvSpPr>
-          <p:cNvPr id="2" name="Rectangle 1"/>
-          <p:cNvSpPr/>
-          <p:nvPr/>
-        </p:nvSpPr>
-        <p:spPr>
-          <a:xfrm>
-            <a:off x="139556" y="5052177"/>
-            <a:ext cx="8900321" cy="831370"/>
-          </a:xfrm>
-          <a:prstGeom prst="rect">
-            <a:avLst/>
-          </a:prstGeom>
-        </p:spPr>
-        <p:style>
-          <a:lnRef idx="2">
-            <a:schemeClr val="dk1"/>
-          </a:lnRef>
-          <a:fillRef idx="1">
-            <a:schemeClr val="lt1"/>
-          </a:fillRef>
-          <a:effectRef idx="0">
-            <a:schemeClr val="dk1"/>
-          </a:effectRef>
-          <a:fontRef idx="minor">
-            <a:schemeClr val="dk1"/>
-          </a:fontRef>
-        </p:style>
-        <p:txBody>
-          <a:bodyPr rtlCol="0" anchor="ctr"/>
-          <a:lstStyle/>
-          <a:p>
-            <a:pPr lvl="0" algn="ctr"/>
-            <a:r>
-              <a:rPr lang="en-US" dirty="0">
-                <a:solidFill>
-                  <a:prstClr val="black"/>
-                </a:solidFill>
-              </a:rPr>
-              <a:t>Internet Protocol </a:t>
-            </a:r>
-            <a:r>
-              <a:rPr lang="en-US" dirty="0">
-                <a:solidFill>
-                  <a:prstClr val="black"/>
-                </a:solidFill>
-                <a:latin typeface="Nexa Bold"/>
-              </a:rPr>
-              <a:t>(IP</a:t>
-            </a:r>
-            <a:r>
-              <a:rPr lang="en-US" dirty="0" smtClean="0">
-                <a:solidFill>
-                  <a:prstClr val="black"/>
-                </a:solidFill>
-                <a:latin typeface="Nexa Bold"/>
-              </a:rPr>
-              <a:t>)</a:t>
-            </a:r>
-            <a:endParaRPr lang="en-US" sz="1600" dirty="0">
-              <a:solidFill>
-                <a:prstClr val="black"/>
-              </a:solidFill>
-              <a:latin typeface="Nexa Bold"/>
-            </a:endParaRPr>
-          </a:p>
-        </p:txBody>
-      </p:sp>
-      <p:sp>
-        <p:nvSpPr>
-          <p:cNvPr id="3" name="Rectangle 2"/>
-          <p:cNvSpPr/>
-          <p:nvPr/>
-        </p:nvSpPr>
-        <p:spPr>
-          <a:xfrm>
-            <a:off x="139555" y="4220807"/>
-            <a:ext cx="6660835" cy="831370"/>
-          </a:xfrm>
-          <a:prstGeom prst="rect">
-            <a:avLst/>
-          </a:prstGeom>
-        </p:spPr>
-        <p:style>
-          <a:lnRef idx="2">
-            <a:schemeClr val="dk1"/>
-          </a:lnRef>
-          <a:fillRef idx="1">
-            <a:schemeClr val="lt1"/>
-          </a:fillRef>
-          <a:effectRef idx="0">
-            <a:schemeClr val="dk1"/>
-          </a:effectRef>
-          <a:fontRef idx="minor">
-            <a:schemeClr val="dk1"/>
-          </a:fontRef>
-        </p:style>
-        <p:txBody>
-          <a:bodyPr rtlCol="0" anchor="ctr"/>
-          <a:lstStyle/>
-          <a:p>
-            <a:pPr lvl="0" algn="ctr"/>
-            <a:r>
-              <a:rPr lang="en-US" dirty="0">
-                <a:solidFill>
-                  <a:prstClr val="black"/>
-                </a:solidFill>
-              </a:rPr>
-              <a:t>User Datagram Protocol </a:t>
-            </a:r>
-            <a:r>
-              <a:rPr lang="en-US" dirty="0">
-                <a:solidFill>
-                  <a:prstClr val="black"/>
-                </a:solidFill>
-                <a:latin typeface="Nexa Bold"/>
-              </a:rPr>
-              <a:t>(UDP)</a:t>
-            </a:r>
-            <a:endParaRPr lang="en-US" sz="1600" dirty="0">
-              <a:solidFill>
-                <a:prstClr val="black"/>
-              </a:solidFill>
-              <a:latin typeface="Nexa Bold"/>
-            </a:endParaRPr>
-          </a:p>
-        </p:txBody>
-      </p:sp>
-      <p:sp>
-        <p:nvSpPr>
-          <p:cNvPr id="4" name="Rectangle 3"/>
-          <p:cNvSpPr/>
-          <p:nvPr/>
-        </p:nvSpPr>
-        <p:spPr>
-          <a:xfrm>
-            <a:off x="139558" y="3389437"/>
-            <a:ext cx="1936070" cy="831370"/>
-          </a:xfrm>
-          <a:prstGeom prst="rect">
-            <a:avLst/>
-          </a:prstGeom>
-        </p:spPr>
-        <p:style>
-          <a:lnRef idx="2">
-            <a:schemeClr val="dk1"/>
-          </a:lnRef>
-          <a:fillRef idx="1">
-            <a:schemeClr val="lt1"/>
-          </a:fillRef>
-          <a:effectRef idx="0">
-            <a:schemeClr val="dk1"/>
-          </a:effectRef>
-          <a:fontRef idx="minor">
-            <a:schemeClr val="dk1"/>
-          </a:fontRef>
-        </p:style>
-        <p:txBody>
-          <a:bodyPr rtlCol="0" anchor="ctr"/>
-          <a:lstStyle/>
-          <a:p>
-            <a:pPr algn="ctr"/>
-            <a:r>
-              <a:rPr lang="en-US" sz="1600" dirty="0" smtClean="0"/>
-              <a:t>Session Traversal Utilities for NAT </a:t>
-            </a:r>
-            <a:r>
-              <a:rPr lang="en-US" sz="1600" dirty="0" smtClean="0">
-                <a:latin typeface="+mj-lt"/>
-              </a:rPr>
-              <a:t>(STUN)</a:t>
-            </a:r>
-            <a:endParaRPr lang="en-US" sz="1600" dirty="0">
-              <a:latin typeface="+mj-lt"/>
-            </a:endParaRPr>
-          </a:p>
-        </p:txBody>
-      </p:sp>
-      <p:sp>
-        <p:nvSpPr>
-          <p:cNvPr id="5" name="Rectangle 4"/>
-          <p:cNvSpPr/>
-          <p:nvPr/>
-        </p:nvSpPr>
-        <p:spPr>
-          <a:xfrm>
-            <a:off x="2075629" y="3389437"/>
-            <a:ext cx="3468476" cy="831370"/>
-          </a:xfrm>
-          <a:prstGeom prst="rect">
-            <a:avLst/>
-          </a:prstGeom>
-          <a:solidFill>
-            <a:schemeClr val="tx2">
-              <a:lumMod val="20000"/>
-              <a:lumOff val="80000"/>
-            </a:schemeClr>
-          </a:solidFill>
-        </p:spPr>
-        <p:style>
-          <a:lnRef idx="2">
-            <a:schemeClr val="dk1"/>
-          </a:lnRef>
-          <a:fillRef idx="1">
-            <a:schemeClr val="lt1"/>
-          </a:fillRef>
-          <a:effectRef idx="0">
-            <a:schemeClr val="dk1"/>
-          </a:effectRef>
-          <a:fontRef idx="minor">
-            <a:schemeClr val="dk1"/>
-          </a:fontRef>
-        </p:style>
-        <p:txBody>
-          <a:bodyPr rtlCol="0" anchor="ctr"/>
-          <a:lstStyle/>
-          <a:p>
-            <a:pPr algn="ctr"/>
-            <a:r>
-              <a:rPr lang="en-US" dirty="0" smtClean="0">
-                <a:latin typeface="+mj-lt"/>
-              </a:rPr>
-              <a:t>                     RTP</a:t>
-            </a:r>
-          </a:p>
-          <a:p>
-            <a:pPr algn="ctr"/>
-            <a:endParaRPr lang="en-US" sz="1600" dirty="0">
-              <a:latin typeface="+mj-lt"/>
-            </a:endParaRPr>
-          </a:p>
-        </p:txBody>
-      </p:sp>
-      <p:sp>
-        <p:nvSpPr>
-          <p:cNvPr id="15" name="Rectangle 14"/>
-          <p:cNvSpPr/>
-          <p:nvPr/>
-        </p:nvSpPr>
-        <p:spPr>
-          <a:xfrm>
-            <a:off x="2949575" y="1597583"/>
-            <a:ext cx="873946" cy="1787187"/>
-          </a:xfrm>
-          <a:prstGeom prst="rect">
-            <a:avLst/>
-          </a:prstGeom>
-        </p:spPr>
-        <p:style>
-          <a:lnRef idx="2">
-            <a:schemeClr val="dk1"/>
-          </a:lnRef>
-          <a:fillRef idx="1">
-            <a:schemeClr val="lt1"/>
-          </a:fillRef>
-          <a:effectRef idx="0">
-            <a:schemeClr val="dk1"/>
-          </a:effectRef>
-          <a:fontRef idx="minor">
-            <a:schemeClr val="dk1"/>
-          </a:fontRef>
-        </p:style>
-        <p:txBody>
-          <a:bodyPr rtlCol="0" anchor="ctr"/>
-          <a:lstStyle/>
-          <a:p>
-            <a:pPr algn="ctr"/>
-            <a:r>
-              <a:rPr lang="en-US" sz="1600" dirty="0" smtClean="0"/>
-              <a:t>SSRC #2</a:t>
-            </a:r>
-            <a:endParaRPr lang="en-US" sz="1400" dirty="0">
-              <a:latin typeface="+mj-lt"/>
-            </a:endParaRPr>
-          </a:p>
-        </p:txBody>
-      </p:sp>
-      <p:sp>
-        <p:nvSpPr>
-          <p:cNvPr id="16" name="Rectangle 15"/>
-          <p:cNvSpPr/>
-          <p:nvPr/>
-        </p:nvSpPr>
-        <p:spPr>
-          <a:xfrm>
-            <a:off x="2075629" y="1597583"/>
-            <a:ext cx="873946" cy="1787187"/>
-          </a:xfrm>
-          <a:prstGeom prst="rect">
-            <a:avLst/>
-          </a:prstGeom>
-        </p:spPr>
-        <p:style>
-          <a:lnRef idx="2">
-            <a:schemeClr val="dk1"/>
-          </a:lnRef>
-          <a:fillRef idx="1">
-            <a:schemeClr val="lt1"/>
-          </a:fillRef>
-          <a:effectRef idx="0">
-            <a:schemeClr val="dk1"/>
-          </a:effectRef>
-          <a:fontRef idx="minor">
-            <a:schemeClr val="dk1"/>
-          </a:fontRef>
-        </p:style>
-        <p:txBody>
-          <a:bodyPr rtlCol="0" anchor="ctr"/>
-          <a:lstStyle/>
-          <a:p>
-            <a:pPr algn="ctr"/>
-            <a:r>
-              <a:rPr lang="en-US" sz="1600" dirty="0" smtClean="0"/>
-              <a:t>SSRC #1</a:t>
-            </a:r>
-            <a:endParaRPr lang="en-US" sz="1400" dirty="0">
-              <a:latin typeface="+mj-lt"/>
-            </a:endParaRPr>
-          </a:p>
-        </p:txBody>
-      </p:sp>
-      <p:sp>
-        <p:nvSpPr>
-          <p:cNvPr id="19" name="Rectangle 18"/>
-          <p:cNvSpPr/>
-          <p:nvPr/>
-        </p:nvSpPr>
-        <p:spPr>
-          <a:xfrm>
-            <a:off x="2075628" y="3877894"/>
-            <a:ext cx="1747893" cy="342914"/>
-          </a:xfrm>
-          <a:prstGeom prst="rect">
-            <a:avLst/>
-          </a:prstGeom>
-        </p:spPr>
-        <p:style>
-          <a:lnRef idx="2">
-            <a:schemeClr val="dk1"/>
-          </a:lnRef>
-          <a:fillRef idx="1">
-            <a:schemeClr val="lt1"/>
-          </a:fillRef>
-          <a:effectRef idx="0">
-            <a:schemeClr val="dk1"/>
-          </a:effectRef>
-          <a:fontRef idx="minor">
-            <a:schemeClr val="dk1"/>
-          </a:fontRef>
-        </p:style>
-        <p:txBody>
-          <a:bodyPr rtlCol="0" anchor="ctr"/>
-          <a:lstStyle/>
-          <a:p>
-            <a:pPr algn="ctr"/>
-            <a:r>
-              <a:rPr lang="en-US" sz="1600" dirty="0" smtClean="0">
-                <a:latin typeface="+mj-lt"/>
-              </a:rPr>
-              <a:t>TURN</a:t>
-            </a:r>
-            <a:endParaRPr lang="en-US" sz="1400" dirty="0">
-              <a:latin typeface="+mj-lt"/>
-            </a:endParaRPr>
-          </a:p>
-        </p:txBody>
-      </p:sp>
-      <p:cxnSp>
-        <p:nvCxnSpPr>
-          <p:cNvPr id="21" name="Straight Connector 20"/>
-          <p:cNvCxnSpPr/>
-          <p:nvPr/>
-        </p:nvCxnSpPr>
-        <p:spPr>
-          <a:xfrm flipH="1">
-            <a:off x="2075628" y="3384770"/>
-            <a:ext cx="2" cy="664581"/>
-          </a:xfrm>
-          <a:prstGeom prst="line">
-            <a:avLst/>
-          </a:prstGeom>
-          <a:ln>
-            <a:prstDash val="sysDash"/>
-          </a:ln>
-        </p:spPr>
-        <p:style>
-          <a:lnRef idx="1">
-            <a:schemeClr val="dk1"/>
-          </a:lnRef>
-          <a:fillRef idx="0">
-            <a:schemeClr val="dk1"/>
-          </a:fillRef>
-          <a:effectRef idx="0">
-            <a:schemeClr val="dk1"/>
-          </a:effectRef>
-          <a:fontRef idx="minor">
-            <a:schemeClr val="tx1"/>
-          </a:fontRef>
-        </p:style>
-      </p:cxnSp>
-      <p:sp>
-        <p:nvSpPr>
-          <p:cNvPr id="24" name="Rectangle 23"/>
-          <p:cNvSpPr/>
-          <p:nvPr/>
-        </p:nvSpPr>
-        <p:spPr>
-          <a:xfrm>
-            <a:off x="3809866" y="1597583"/>
-            <a:ext cx="873946" cy="1787187"/>
-          </a:xfrm>
-          <a:prstGeom prst="rect">
-            <a:avLst/>
-          </a:prstGeom>
-        </p:spPr>
-        <p:style>
-          <a:lnRef idx="2">
-            <a:schemeClr val="dk1"/>
-          </a:lnRef>
-          <a:fillRef idx="1">
-            <a:schemeClr val="lt1"/>
-          </a:fillRef>
-          <a:effectRef idx="0">
-            <a:schemeClr val="dk1"/>
-          </a:effectRef>
-          <a:fontRef idx="minor">
-            <a:schemeClr val="dk1"/>
-          </a:fontRef>
-        </p:style>
-        <p:txBody>
-          <a:bodyPr rtlCol="0" anchor="ctr"/>
-          <a:lstStyle/>
-          <a:p>
-            <a:pPr algn="ctr"/>
-            <a:r>
-              <a:rPr lang="en-US" sz="1600" dirty="0" smtClean="0"/>
-              <a:t>SSRC #3</a:t>
-            </a:r>
-            <a:endParaRPr lang="en-US" sz="1400" dirty="0">
-              <a:latin typeface="+mj-lt"/>
-            </a:endParaRPr>
-          </a:p>
-        </p:txBody>
-      </p:sp>
-      <p:sp>
-        <p:nvSpPr>
-          <p:cNvPr id="25" name="Rectangle 24"/>
-          <p:cNvSpPr/>
-          <p:nvPr/>
-        </p:nvSpPr>
-        <p:spPr>
-          <a:xfrm>
-            <a:off x="4670158" y="1597583"/>
-            <a:ext cx="873946" cy="1787187"/>
-          </a:xfrm>
-          <a:prstGeom prst="rect">
-            <a:avLst/>
-          </a:prstGeom>
-        </p:spPr>
-        <p:style>
-          <a:lnRef idx="2">
-            <a:schemeClr val="dk1"/>
-          </a:lnRef>
-          <a:fillRef idx="1">
-            <a:schemeClr val="lt1"/>
-          </a:fillRef>
-          <a:effectRef idx="0">
-            <a:schemeClr val="dk1"/>
-          </a:effectRef>
-          <a:fontRef idx="minor">
-            <a:schemeClr val="dk1"/>
-          </a:fontRef>
-        </p:style>
-        <p:txBody>
-          <a:bodyPr rtlCol="0" anchor="ctr"/>
-          <a:lstStyle/>
-          <a:p>
-            <a:pPr algn="ctr"/>
-            <a:r>
-              <a:rPr lang="en-US" sz="1600" dirty="0" smtClean="0"/>
-              <a:t>SSRC #4</a:t>
-            </a:r>
-            <a:endParaRPr lang="en-US" sz="1400" dirty="0">
-              <a:latin typeface="+mj-lt"/>
-            </a:endParaRPr>
-          </a:p>
-        </p:txBody>
-      </p:sp>
-      <p:sp>
-        <p:nvSpPr>
-          <p:cNvPr id="13" name="Rectangle 12"/>
-          <p:cNvSpPr/>
-          <p:nvPr/>
-        </p:nvSpPr>
-        <p:spPr>
-          <a:xfrm>
-            <a:off x="6800391" y="4220808"/>
-            <a:ext cx="2239485" cy="831370"/>
-          </a:xfrm>
-          <a:prstGeom prst="rect">
-            <a:avLst/>
-          </a:prstGeom>
-        </p:spPr>
-        <p:style>
-          <a:lnRef idx="2">
-            <a:schemeClr val="dk1"/>
-          </a:lnRef>
-          <a:fillRef idx="1">
-            <a:schemeClr val="lt1"/>
-          </a:fillRef>
-          <a:effectRef idx="0">
-            <a:schemeClr val="dk1"/>
-          </a:effectRef>
-          <a:fontRef idx="minor">
-            <a:schemeClr val="dk1"/>
-          </a:fontRef>
-        </p:style>
-        <p:txBody>
-          <a:bodyPr rtlCol="0" anchor="ctr"/>
-          <a:lstStyle/>
-          <a:p>
-            <a:pPr algn="ctr"/>
-            <a:r>
-              <a:rPr lang="en-US" dirty="0" smtClean="0"/>
-              <a:t>Transmission Control Protocol </a:t>
-            </a:r>
-            <a:r>
-              <a:rPr lang="en-US" dirty="0" smtClean="0">
-                <a:latin typeface="+mj-lt"/>
-              </a:rPr>
-              <a:t>(TCP)</a:t>
-            </a:r>
-            <a:endParaRPr lang="en-US" sz="1600" dirty="0">
-              <a:latin typeface="+mj-lt"/>
-            </a:endParaRPr>
-          </a:p>
-        </p:txBody>
-      </p:sp>
-      <p:sp>
-        <p:nvSpPr>
-          <p:cNvPr id="14" name="Rectangle 13"/>
-          <p:cNvSpPr/>
-          <p:nvPr/>
-        </p:nvSpPr>
-        <p:spPr>
-          <a:xfrm>
-            <a:off x="6554595" y="1597583"/>
-            <a:ext cx="2485281" cy="2618557"/>
-          </a:xfrm>
-          <a:prstGeom prst="rect">
-            <a:avLst/>
-          </a:prstGeom>
-        </p:spPr>
-        <p:style>
-          <a:lnRef idx="2">
-            <a:schemeClr val="dk1"/>
-          </a:lnRef>
-          <a:fillRef idx="1">
-            <a:schemeClr val="lt1"/>
-          </a:fillRef>
-          <a:effectRef idx="0">
-            <a:schemeClr val="dk1"/>
-          </a:effectRef>
-          <a:fontRef idx="minor">
-            <a:schemeClr val="dk1"/>
-          </a:fontRef>
-        </p:style>
-        <p:txBody>
-          <a:bodyPr rtlCol="0" anchor="ctr"/>
-          <a:lstStyle/>
-          <a:p>
-            <a:pPr algn="r"/>
-            <a:r>
-              <a:rPr lang="en-US" sz="1600" i="1" dirty="0" smtClean="0">
-                <a:latin typeface="+mj-lt"/>
-              </a:rPr>
-              <a:t>Signaling </a:t>
-            </a:r>
-          </a:p>
-          <a:p>
-            <a:pPr algn="r"/>
-            <a:r>
-              <a:rPr lang="en-US" sz="1600" i="1" dirty="0" smtClean="0">
-                <a:latin typeface="+mj-lt"/>
-              </a:rPr>
-              <a:t>Protocol</a:t>
-            </a:r>
-          </a:p>
-          <a:p>
-            <a:pPr algn="r"/>
-            <a:endParaRPr lang="en-US" sz="1200" i="1" dirty="0" smtClean="0"/>
-          </a:p>
-          <a:p>
-            <a:pPr algn="r"/>
-            <a:r>
-              <a:rPr lang="en-US" sz="1200" i="1" dirty="0" smtClean="0"/>
-              <a:t>(e.g., SIP, Jingle, …)</a:t>
-            </a:r>
-          </a:p>
-          <a:p>
-            <a:pPr algn="r"/>
-            <a:endParaRPr lang="en-US" sz="1200" i="1" dirty="0"/>
-          </a:p>
-          <a:p>
-            <a:pPr algn="r"/>
-            <a:endParaRPr lang="en-US" sz="1200" i="1" dirty="0" smtClean="0"/>
-          </a:p>
-          <a:p>
-            <a:pPr algn="r"/>
-            <a:endParaRPr lang="en-US" sz="1200" i="1" dirty="0" smtClean="0"/>
-          </a:p>
-          <a:p>
-            <a:pPr algn="r"/>
-            <a:r>
-              <a:rPr lang="en-US" sz="1200" i="1" dirty="0" smtClean="0"/>
-              <a:t>Or something proprietary</a:t>
-            </a:r>
-          </a:p>
-          <a:p>
-            <a:pPr algn="r"/>
-            <a:r>
-              <a:rPr lang="en-US" sz="1200" i="1" dirty="0" smtClean="0"/>
-              <a:t>(over HTTP or Web Sockets)</a:t>
-            </a:r>
-            <a:endParaRPr lang="en-US" sz="1200" i="1" dirty="0"/>
-          </a:p>
-        </p:txBody>
-      </p:sp>
-      <p:sp>
-        <p:nvSpPr>
-          <p:cNvPr id="17" name="Rectangle 16"/>
-          <p:cNvSpPr/>
-          <p:nvPr/>
-        </p:nvSpPr>
-        <p:spPr>
-          <a:xfrm>
-            <a:off x="5544105" y="3384770"/>
-            <a:ext cx="1010490" cy="831370"/>
-          </a:xfrm>
-          <a:prstGeom prst="rect">
-            <a:avLst/>
-          </a:prstGeom>
-        </p:spPr>
-        <p:style>
-          <a:lnRef idx="2">
-            <a:schemeClr val="dk1"/>
-          </a:lnRef>
-          <a:fillRef idx="1">
-            <a:schemeClr val="lt1"/>
-          </a:fillRef>
-          <a:effectRef idx="0">
-            <a:schemeClr val="dk1"/>
-          </a:effectRef>
-          <a:fontRef idx="minor">
-            <a:schemeClr val="dk1"/>
-          </a:fontRef>
-        </p:style>
-        <p:txBody>
-          <a:bodyPr rtlCol="0" anchor="ctr"/>
-          <a:lstStyle/>
-          <a:p>
-            <a:pPr algn="ctr"/>
-            <a:r>
-              <a:rPr lang="en-US" sz="1600" dirty="0" smtClean="0">
-                <a:latin typeface="+mj-lt"/>
-              </a:rPr>
-              <a:t>DTLS</a:t>
-            </a:r>
-            <a:endParaRPr lang="en-US" sz="1600" dirty="0">
-              <a:latin typeface="+mj-lt"/>
-            </a:endParaRPr>
-          </a:p>
-        </p:txBody>
-      </p:sp>
-      <p:sp>
-        <p:nvSpPr>
-          <p:cNvPr id="6" name="TextBox 5"/>
-          <p:cNvSpPr txBox="1"/>
-          <p:nvPr/>
-        </p:nvSpPr>
-        <p:spPr>
-          <a:xfrm>
-            <a:off x="5885487" y="6211669"/>
-            <a:ext cx="3154390" cy="646331"/>
-          </a:xfrm>
-          <a:prstGeom prst="rect">
-            <a:avLst/>
-          </a:prstGeom>
-          <a:noFill/>
-        </p:spPr>
-        <p:txBody>
-          <a:bodyPr wrap="square" rtlCol="0">
-            <a:spAutoFit/>
-          </a:bodyPr>
-          <a:lstStyle/>
-          <a:p>
-            <a:pPr algn="just"/>
-            <a:r>
-              <a:rPr lang="en-US" sz="1200" dirty="0" smtClean="0">
-                <a:latin typeface="+mj-lt"/>
-              </a:rPr>
-              <a:t>Note:</a:t>
-            </a:r>
-            <a:r>
-              <a:rPr lang="en-US" sz="1200" dirty="0" smtClean="0"/>
-              <a:t> *RTP can be sent over UDP or TCP.</a:t>
-            </a:r>
-          </a:p>
-          <a:p>
-            <a:pPr algn="just"/>
-            <a:r>
-              <a:rPr lang="en-US" sz="1200" dirty="0" smtClean="0"/>
-              <a:t>Similarly, signaling </a:t>
-            </a:r>
-            <a:r>
-              <a:rPr lang="en-US" sz="1200" dirty="0"/>
-              <a:t>p</a:t>
-            </a:r>
-            <a:r>
-              <a:rPr lang="en-US" sz="1200" dirty="0" smtClean="0"/>
-              <a:t>rotocols can be designed to transmit over UDP or TCP.</a:t>
-            </a:r>
-            <a:endParaRPr lang="en-US" sz="1200" dirty="0"/>
-          </a:p>
-        </p:txBody>
-      </p:sp>
-      <p:sp>
-        <p:nvSpPr>
-          <p:cNvPr id="20" name="Rectangle 19"/>
-          <p:cNvSpPr/>
-          <p:nvPr/>
-        </p:nvSpPr>
-        <p:spPr>
-          <a:xfrm>
-            <a:off x="6308797" y="1597583"/>
-            <a:ext cx="1294270" cy="1787188"/>
-          </a:xfrm>
-          <a:prstGeom prst="rect">
-            <a:avLst/>
-          </a:prstGeom>
-        </p:spPr>
-        <p:style>
-          <a:lnRef idx="2">
-            <a:schemeClr val="dk1"/>
-          </a:lnRef>
-          <a:fillRef idx="1">
-            <a:schemeClr val="lt1"/>
-          </a:fillRef>
-          <a:effectRef idx="0">
-            <a:schemeClr val="dk1"/>
-          </a:effectRef>
-          <a:fontRef idx="minor">
-            <a:schemeClr val="dk1"/>
-          </a:fontRef>
-        </p:style>
-        <p:txBody>
-          <a:bodyPr vert="horz" rtlCol="0" anchor="ctr"/>
-          <a:lstStyle/>
-          <a:p>
-            <a:pPr algn="ctr"/>
-            <a:r>
-              <a:rPr lang="en-US" sz="1600" dirty="0" smtClean="0"/>
-              <a:t>Secure RTP </a:t>
-            </a:r>
-            <a:r>
-              <a:rPr lang="en-US" sz="1600" dirty="0" smtClean="0">
-                <a:latin typeface="+mj-lt"/>
-              </a:rPr>
-              <a:t>(SRTP)</a:t>
-            </a:r>
-            <a:r>
-              <a:rPr lang="en-US" sz="1600" dirty="0" smtClean="0"/>
-              <a:t> Keying</a:t>
-            </a:r>
-            <a:endParaRPr lang="en-US" sz="1400" dirty="0">
-              <a:latin typeface="+mj-lt"/>
-            </a:endParaRPr>
-          </a:p>
-        </p:txBody>
-      </p:sp>
-      <p:cxnSp>
-        <p:nvCxnSpPr>
-          <p:cNvPr id="11" name="Straight Connector 10"/>
-          <p:cNvCxnSpPr/>
-          <p:nvPr/>
-        </p:nvCxnSpPr>
-        <p:spPr>
-          <a:xfrm>
-            <a:off x="3809866" y="3389438"/>
-            <a:ext cx="0" cy="493124"/>
-          </a:xfrm>
-          <a:prstGeom prst="line">
-            <a:avLst/>
-          </a:prstGeom>
-          <a:ln>
-            <a:prstDash val="dash"/>
-          </a:ln>
-        </p:spPr>
-        <p:style>
-          <a:lnRef idx="1">
-            <a:schemeClr val="dk1"/>
-          </a:lnRef>
-          <a:fillRef idx="0">
-            <a:schemeClr val="dk1"/>
-          </a:fillRef>
-          <a:effectRef idx="0">
-            <a:schemeClr val="dk1"/>
-          </a:effectRef>
-          <a:fontRef idx="minor">
-            <a:schemeClr val="tx1"/>
-          </a:fontRef>
-        </p:style>
-      </p:cxnSp>
-      <p:cxnSp>
-        <p:nvCxnSpPr>
-          <p:cNvPr id="22" name="Straight Connector 21"/>
-          <p:cNvCxnSpPr/>
-          <p:nvPr/>
-        </p:nvCxnSpPr>
-        <p:spPr>
-          <a:xfrm>
-            <a:off x="2949575" y="3384770"/>
-            <a:ext cx="0" cy="493124"/>
-          </a:xfrm>
-          <a:prstGeom prst="line">
-            <a:avLst/>
-          </a:prstGeom>
-          <a:ln>
-            <a:prstDash val="dash"/>
-          </a:ln>
-        </p:spPr>
-        <p:style>
-          <a:lnRef idx="1">
-            <a:schemeClr val="dk1"/>
-          </a:lnRef>
-          <a:fillRef idx="0">
-            <a:schemeClr val="dk1"/>
-          </a:fillRef>
-          <a:effectRef idx="0">
-            <a:schemeClr val="dk1"/>
-          </a:effectRef>
-          <a:fontRef idx="minor">
-            <a:schemeClr val="tx1"/>
-          </a:fontRef>
-        </p:style>
-      </p:cxnSp>
-      <p:sp>
-        <p:nvSpPr>
-          <p:cNvPr id="23" name="Rectangle 22"/>
-          <p:cNvSpPr/>
-          <p:nvPr/>
-        </p:nvSpPr>
-        <p:spPr>
-          <a:xfrm>
-            <a:off x="5544104" y="2553398"/>
-            <a:ext cx="764693" cy="831372"/>
-          </a:xfrm>
-          <a:prstGeom prst="rect">
-            <a:avLst/>
-          </a:prstGeom>
-        </p:spPr>
-        <p:style>
-          <a:lnRef idx="2">
-            <a:schemeClr val="dk1"/>
-          </a:lnRef>
-          <a:fillRef idx="1">
-            <a:schemeClr val="lt1"/>
-          </a:fillRef>
-          <a:effectRef idx="0">
-            <a:schemeClr val="dk1"/>
-          </a:effectRef>
-          <a:fontRef idx="minor">
-            <a:schemeClr val="dk1"/>
-          </a:fontRef>
-        </p:style>
-        <p:txBody>
-          <a:bodyPr vert="horz" rtlCol="0" anchor="ctr"/>
-          <a:lstStyle/>
-          <a:p>
-            <a:pPr algn="ctr"/>
-            <a:r>
-              <a:rPr lang="en-US" sz="1600" dirty="0" smtClean="0">
-                <a:latin typeface="+mj-lt"/>
-              </a:rPr>
-              <a:t>SCTP</a:t>
-            </a:r>
-            <a:endParaRPr lang="en-US" sz="1400" dirty="0">
-              <a:latin typeface="+mj-lt"/>
-            </a:endParaRPr>
-          </a:p>
-        </p:txBody>
-      </p:sp>
-      <p:sp>
-        <p:nvSpPr>
-          <p:cNvPr id="26" name="Rectangle 25"/>
-          <p:cNvSpPr/>
-          <p:nvPr/>
-        </p:nvSpPr>
-        <p:spPr>
-          <a:xfrm>
-            <a:off x="5544106" y="1597583"/>
-            <a:ext cx="764693" cy="955815"/>
-          </a:xfrm>
-          <a:prstGeom prst="rect">
-            <a:avLst/>
-          </a:prstGeom>
-        </p:spPr>
-        <p:style>
-          <a:lnRef idx="2">
-            <a:schemeClr val="dk1"/>
-          </a:lnRef>
-          <a:fillRef idx="1">
-            <a:schemeClr val="lt1"/>
-          </a:fillRef>
-          <a:effectRef idx="0">
-            <a:schemeClr val="dk1"/>
-          </a:effectRef>
-          <a:fontRef idx="minor">
-            <a:schemeClr val="dk1"/>
-          </a:fontRef>
-        </p:style>
-        <p:txBody>
-          <a:bodyPr vert="vert270" rtlCol="0" anchor="ctr"/>
-          <a:lstStyle/>
-          <a:p>
-            <a:pPr algn="ctr"/>
-            <a:r>
-              <a:rPr lang="en-US" sz="1600" dirty="0" smtClean="0">
-                <a:latin typeface="+mj-lt"/>
-              </a:rPr>
-              <a:t>Data</a:t>
-            </a:r>
-          </a:p>
-          <a:p>
-            <a:pPr algn="ctr"/>
-            <a:r>
-              <a:rPr lang="en-US" sz="1600" dirty="0" smtClean="0">
-                <a:latin typeface="+mj-lt"/>
-              </a:rPr>
-              <a:t>Channel</a:t>
-            </a:r>
-            <a:endParaRPr lang="en-US" sz="1400" dirty="0">
-              <a:latin typeface="+mj-lt"/>
-            </a:endParaRPr>
-          </a:p>
-        </p:txBody>
-      </p:sp>
-      <p:sp>
-        <p:nvSpPr>
-          <p:cNvPr id="27" name="Rectangle 26"/>
-          <p:cNvSpPr/>
-          <p:nvPr/>
-        </p:nvSpPr>
-        <p:spPr>
-          <a:xfrm>
-            <a:off x="2075630" y="766213"/>
-            <a:ext cx="6964246" cy="831370"/>
-          </a:xfrm>
-          <a:prstGeom prst="rect">
-            <a:avLst/>
-          </a:prstGeom>
-        </p:spPr>
-        <p:style>
-          <a:lnRef idx="2">
-            <a:schemeClr val="dk1"/>
-          </a:lnRef>
-          <a:fillRef idx="1">
-            <a:schemeClr val="lt1"/>
-          </a:fillRef>
-          <a:effectRef idx="0">
-            <a:schemeClr val="dk1"/>
-          </a:effectRef>
-          <a:fontRef idx="minor">
-            <a:schemeClr val="dk1"/>
-          </a:fontRef>
-        </p:style>
-        <p:txBody>
-          <a:bodyPr rtlCol="0" anchor="ctr"/>
-          <a:lstStyle/>
-          <a:p>
-            <a:pPr algn="ctr"/>
-            <a:r>
-              <a:rPr lang="en-US" sz="1600" dirty="0" err="1" smtClean="0"/>
-              <a:t>WebRTC</a:t>
-            </a:r>
-            <a:r>
-              <a:rPr lang="en-US" sz="1600" dirty="0" smtClean="0"/>
-              <a:t> Application</a:t>
-            </a:r>
-            <a:endParaRPr lang="en-US" sz="1600" dirty="0">
-              <a:latin typeface="+mj-lt"/>
-            </a:endParaRPr>
-          </a:p>
-        </p:txBody>
-      </p:sp>
-    </p:spTree>
-    <p:extLst>
-      <p:ext uri="{BB962C8B-B14F-4D97-AF65-F5344CB8AC3E}">
-        <p14:creationId xmlns:p14="http://schemas.microsoft.com/office/powerpoint/2010/main" val="3585768518"/>
       </p:ext>
     </p:extLst>
   </p:cSld>

</xml_diff>

<commit_message>
fixed spellings in figures
</commit_message>
<xml_diff>
--- a/graphs/source/chap5-src.pptx
+++ b/graphs/source/chap5-src.pptx
@@ -206,7 +206,7 @@
           <a:p>
             <a:fld id="{7BA68311-98B2-8147-8E3D-5F9C91F16701}" type="datetimeFigureOut">
               <a:rPr lang="en-US" smtClean="0"/>
-              <a:t>30/03/14</a:t>
+              <a:t>07/07/14</a:t>
             </a:fld>
             <a:endParaRPr lang="en-US"/>
           </a:p>
@@ -739,7 +739,7 @@
           <a:p>
             <a:fld id="{CE2D3545-AE21-7247-8426-4B1172E482C1}" type="datetimeFigureOut">
               <a:rPr lang="en-US" smtClean="0"/>
-              <a:t>30/03/14</a:t>
+              <a:t>07/07/14</a:t>
             </a:fld>
             <a:endParaRPr lang="en-US"/>
           </a:p>
@@ -909,7 +909,7 @@
           <a:p>
             <a:fld id="{CE2D3545-AE21-7247-8426-4B1172E482C1}" type="datetimeFigureOut">
               <a:rPr lang="en-US" smtClean="0"/>
-              <a:t>30/03/14</a:t>
+              <a:t>07/07/14</a:t>
             </a:fld>
             <a:endParaRPr lang="en-US"/>
           </a:p>
@@ -1089,7 +1089,7 @@
           <a:p>
             <a:fld id="{CE2D3545-AE21-7247-8426-4B1172E482C1}" type="datetimeFigureOut">
               <a:rPr lang="en-US" smtClean="0"/>
-              <a:t>30/03/14</a:t>
+              <a:t>07/07/14</a:t>
             </a:fld>
             <a:endParaRPr lang="en-US"/>
           </a:p>
@@ -1259,7 +1259,7 @@
           <a:p>
             <a:fld id="{CE2D3545-AE21-7247-8426-4B1172E482C1}" type="datetimeFigureOut">
               <a:rPr lang="en-US" smtClean="0"/>
-              <a:t>30/03/14</a:t>
+              <a:t>07/07/14</a:t>
             </a:fld>
             <a:endParaRPr lang="en-US"/>
           </a:p>
@@ -1505,7 +1505,7 @@
           <a:p>
             <a:fld id="{CE2D3545-AE21-7247-8426-4B1172E482C1}" type="datetimeFigureOut">
               <a:rPr lang="en-US" smtClean="0"/>
-              <a:t>30/03/14</a:t>
+              <a:t>07/07/14</a:t>
             </a:fld>
             <a:endParaRPr lang="en-US"/>
           </a:p>
@@ -1793,7 +1793,7 @@
           <a:p>
             <a:fld id="{CE2D3545-AE21-7247-8426-4B1172E482C1}" type="datetimeFigureOut">
               <a:rPr lang="en-US" smtClean="0"/>
-              <a:t>30/03/14</a:t>
+              <a:t>07/07/14</a:t>
             </a:fld>
             <a:endParaRPr lang="en-US"/>
           </a:p>
@@ -2215,7 +2215,7 @@
           <a:p>
             <a:fld id="{CE2D3545-AE21-7247-8426-4B1172E482C1}" type="datetimeFigureOut">
               <a:rPr lang="en-US" smtClean="0"/>
-              <a:t>30/03/14</a:t>
+              <a:t>07/07/14</a:t>
             </a:fld>
             <a:endParaRPr lang="en-US"/>
           </a:p>
@@ -2333,7 +2333,7 @@
           <a:p>
             <a:fld id="{CE2D3545-AE21-7247-8426-4B1172E482C1}" type="datetimeFigureOut">
               <a:rPr lang="en-US" smtClean="0"/>
-              <a:t>30/03/14</a:t>
+              <a:t>07/07/14</a:t>
             </a:fld>
             <a:endParaRPr lang="en-US"/>
           </a:p>
@@ -2428,7 +2428,7 @@
           <a:p>
             <a:fld id="{CE2D3545-AE21-7247-8426-4B1172E482C1}" type="datetimeFigureOut">
               <a:rPr lang="en-US" smtClean="0"/>
-              <a:t>30/03/14</a:t>
+              <a:t>07/07/14</a:t>
             </a:fld>
             <a:endParaRPr lang="en-US"/>
           </a:p>
@@ -2705,7 +2705,7 @@
           <a:p>
             <a:fld id="{CE2D3545-AE21-7247-8426-4B1172E482C1}" type="datetimeFigureOut">
               <a:rPr lang="en-US" smtClean="0"/>
-              <a:t>30/03/14</a:t>
+              <a:t>07/07/14</a:t>
             </a:fld>
             <a:endParaRPr lang="en-US"/>
           </a:p>
@@ -2962,7 +2962,7 @@
           <a:p>
             <a:fld id="{CE2D3545-AE21-7247-8426-4B1172E482C1}" type="datetimeFigureOut">
               <a:rPr lang="en-US" smtClean="0"/>
-              <a:t>30/03/14</a:t>
+              <a:t>07/07/14</a:t>
             </a:fld>
             <a:endParaRPr lang="en-US"/>
           </a:p>
@@ -3180,7 +3180,7 @@
           <a:p>
             <a:fld id="{CE2D3545-AE21-7247-8426-4B1172E482C1}" type="datetimeFigureOut">
               <a:rPr lang="en-US" smtClean="0"/>
-              <a:t>30/03/14</a:t>
+              <a:t>07/07/14</a:t>
             </a:fld>
             <a:endParaRPr lang="en-US"/>
           </a:p>
@@ -5398,16 +5398,22 @@
               <a:t> </a:t>
             </a:r>
             <a:r>
-              <a:rPr lang="en-US" sz="1600" dirty="0" err="1">
+              <a:rPr lang="en-US" sz="1600" dirty="0" err="1" smtClean="0">
                 <a:latin typeface="+mn-lt"/>
               </a:rPr>
-              <a:t>Packetization</a:t>
+              <a:t>Packetisation</a:t>
+            </a:r>
+            <a:r>
+              <a:rPr lang="en-US" sz="1600" dirty="0" smtClean="0">
+                <a:latin typeface="+mn-lt"/>
+              </a:rPr>
+              <a:t> </a:t>
             </a:r>
             <a:r>
               <a:rPr lang="en-US" sz="1600" dirty="0">
                 <a:latin typeface="+mn-lt"/>
               </a:rPr>
-              <a:t> size</a:t>
+              <a:t>size</a:t>
             </a:r>
           </a:p>
           <a:p>
@@ -15493,10 +15499,22 @@
               <a:t>(without </a:t>
             </a:r>
             <a:r>
+              <a:rPr lang="en-US" sz="1800" b="1" dirty="0" err="1" smtClean="0">
+                <a:latin typeface="+mn-lt"/>
+              </a:rPr>
+              <a:t>randomisation</a:t>
+            </a:r>
+            <a:r>
+              <a:rPr lang="en-US" sz="1800" b="1" dirty="0" smtClean="0">
+                <a:latin typeface="+mn-lt"/>
+              </a:rPr>
+              <a:t>, </a:t>
+            </a:r>
+            <a:r>
               <a:rPr lang="en-US" sz="1800" b="1" dirty="0">
                 <a:latin typeface="+mn-lt"/>
               </a:rPr>
-              <a:t>randomization, i.e. T = T</a:t>
+              <a:t>i.e. T = T</a:t>
             </a:r>
             <a:r>
               <a:rPr lang="en-US" sz="1800" b="1" baseline="-25000" dirty="0">
@@ -17431,6 +17449,7 @@
           </a:bodyPr>
           <a:lstStyle/>
           <a:p>
+            <a:pPr algn="ctr"/>
             <a:r>
               <a:rPr lang="en-US" sz="1600" dirty="0" smtClean="0"/>
               <a:t>Media packets</a:t>
@@ -17494,6 +17513,7 @@
           </a:bodyPr>
           <a:lstStyle/>
           <a:p>
+            <a:pPr algn="ctr"/>
             <a:r>
               <a:rPr lang="en-US" sz="1600" dirty="0" smtClean="0"/>
               <a:t>Estimated Capacity</a:t>
@@ -17599,6 +17619,7 @@
           </a:bodyPr>
           <a:lstStyle/>
           <a:p>
+            <a:pPr algn="ctr"/>
             <a:r>
               <a:rPr lang="en-US" sz="1400" dirty="0" smtClean="0"/>
               <a:t>Coverage Update</a:t>
@@ -17629,6 +17650,7 @@
           </a:bodyPr>
           <a:lstStyle/>
           <a:p>
+            <a:pPr algn="ctr"/>
             <a:r>
               <a:rPr lang="en-US" sz="1400" dirty="0" err="1" smtClean="0"/>
               <a:t>Lookahead</a:t>
@@ -17696,6 +17718,7 @@
           </a:bodyPr>
           <a:lstStyle/>
           <a:p>
+            <a:pPr algn="ctr"/>
             <a:r>
               <a:rPr lang="en-US" sz="1400" dirty="0" err="1" smtClean="0"/>
               <a:t>Lookahead</a:t>
@@ -17763,6 +17786,7 @@
           </a:bodyPr>
           <a:lstStyle/>
           <a:p>
+            <a:pPr algn="ctr"/>
             <a:r>
               <a:rPr lang="en-US" sz="1400" dirty="0" smtClean="0"/>
               <a:t>Coverage Map Info</a:t>
@@ -17859,6 +17883,7 @@
           </a:bodyPr>
           <a:lstStyle/>
           <a:p>
+            <a:pPr algn="ctr"/>
             <a:r>
               <a:rPr lang="en-US" sz="1400" dirty="0" smtClean="0"/>
               <a:t>Coverage Map Info</a:t>
@@ -19091,8 +19116,12 @@
           <a:p>
             <a:pPr algn="ctr"/>
             <a:r>
+              <a:rPr lang="en-US" sz="1600" i="1" dirty="0" err="1" smtClean="0"/>
+              <a:t>Signalling</a:t>
+            </a:r>
+            <a:r>
               <a:rPr lang="en-US" sz="1600" i="1" dirty="0" smtClean="0"/>
-              <a:t>Signaling Protocol</a:t>
+              <a:t> Protocol</a:t>
             </a:r>
           </a:p>
           <a:p>
@@ -19189,7 +19218,15 @@
             <a:pPr algn="just"/>
             <a:r>
               <a:rPr lang="en-US" sz="1200" dirty="0" smtClean="0"/>
-              <a:t>Similarly, signaling </a:t>
+              <a:t>Similarly, </a:t>
+            </a:r>
+            <a:r>
+              <a:rPr lang="en-US" sz="1200" dirty="0" err="1" smtClean="0"/>
+              <a:t>signalling</a:t>
+            </a:r>
+            <a:r>
+              <a:rPr lang="en-US" sz="1200" dirty="0" smtClean="0"/>
+              <a:t> </a:t>
             </a:r>
             <a:r>
               <a:rPr lang="en-US" sz="1200" dirty="0"/>
@@ -19432,7 +19469,9 @@
           </a:lstStyle>
           <a:p>
             <a:r>
-              <a:rPr lang="en-US" dirty="0"/>
+              <a:rPr lang="en-US" dirty="0">
+                <a:latin typeface="+mn-lt"/>
+              </a:rPr>
               <a:t>Measures Congestion and Calculates Receiver’s Estimate</a:t>
             </a:r>
           </a:p>
@@ -19447,7 +19486,7 @@
         <p:spPr>
           <a:xfrm>
             <a:off x="494921" y="4708856"/>
-            <a:ext cx="2796032" cy="1815882"/>
+            <a:ext cx="2796032" cy="2031325"/>
           </a:xfrm>
           <a:prstGeom prst="rect">
             <a:avLst/>
@@ -19475,11 +19514,15 @@
               <a:buChar char="•"/>
             </a:pPr>
             <a:r>
-              <a:rPr lang="en-US" dirty="0"/>
+              <a:rPr lang="en-US" dirty="0">
+                <a:latin typeface="+mn-lt"/>
+              </a:rPr>
               <a:t>Calculates sender’s </a:t>
             </a:r>
             <a:r>
-              <a:rPr lang="en-US" dirty="0" smtClean="0"/>
+              <a:rPr lang="en-US" dirty="0" smtClean="0">
+                <a:latin typeface="+mn-lt"/>
+              </a:rPr>
               <a:t>estimate based on congestion cues and  the receiver’s estimate </a:t>
             </a:r>
           </a:p>
@@ -19489,24 +19532,34 @@
               <a:buChar char="•"/>
             </a:pPr>
             <a:r>
-              <a:rPr lang="en-US" dirty="0" smtClean="0"/>
+              <a:rPr lang="en-US" dirty="0" smtClean="0">
+                <a:latin typeface="+mn-lt"/>
+              </a:rPr>
               <a:t>Receives Coverage map info directly from NCMS and from the receiver</a:t>
             </a:r>
           </a:p>
           <a:p>
             <a:r>
-              <a:rPr lang="en-US" dirty="0" smtClean="0"/>
+              <a:rPr lang="en-US" dirty="0" smtClean="0">
+                <a:latin typeface="+mn-lt"/>
+              </a:rPr>
               <a:t>Sender chooses </a:t>
             </a:r>
             <a:r>
-              <a:rPr lang="en-US" dirty="0"/>
+              <a:rPr lang="en-US" dirty="0">
+                <a:latin typeface="+mn-lt"/>
+              </a:rPr>
               <a:t>a value </a:t>
             </a:r>
             <a:r>
-              <a:rPr lang="en-US" dirty="0" smtClean="0"/>
+              <a:rPr lang="en-US" dirty="0" smtClean="0">
+                <a:latin typeface="+mn-lt"/>
+              </a:rPr>
               <a:t>based on these inputs</a:t>
             </a:r>
-            <a:endParaRPr lang="en-US" dirty="0"/>
+            <a:endParaRPr lang="en-US" dirty="0">
+              <a:latin typeface="+mn-lt"/>
+            </a:endParaRPr>
           </a:p>
         </p:txBody>
       </p:sp>
@@ -20477,7 +20530,7 @@
         <p:spPr>
           <a:xfrm>
             <a:off x="3251706" y="2965688"/>
-            <a:ext cx="2596632" cy="369332"/>
+            <a:ext cx="2069797" cy="307777"/>
           </a:xfrm>
           <a:prstGeom prst="rect">
             <a:avLst/>
@@ -20488,10 +20541,17 @@
           <a:bodyPr wrap="none" rtlCol="0">
             <a:spAutoFit/>
           </a:bodyPr>
-          <a:lstStyle/>
-          <a:p>
-            <a:r>
-              <a:rPr lang="en-US" dirty="0" smtClean="0"/>
+          <a:lstStyle>
+            <a:defPPr>
+              <a:defRPr lang="en-US"/>
+            </a:defPPr>
+            <a:lvl1pPr algn="ctr">
+              <a:defRPr sz="1400"/>
+            </a:lvl1pPr>
+          </a:lstStyle>
+          <a:p>
+            <a:r>
+              <a:rPr lang="en-US" dirty="0"/>
               <a:t>MPRTP Media Packets</a:t>
             </a:r>
             <a:endParaRPr lang="en-US" dirty="0"/>
@@ -21055,7 +21115,6 @@
               <a:rPr lang="en-US" dirty="0"/>
               <a:t>A</a:t>
             </a:r>
-            <a:endParaRPr lang="en-US" dirty="0"/>
           </a:p>
         </p:txBody>
       </p:sp>
@@ -21282,8 +21341,8 @@
         </p:nvSpPr>
         <p:spPr>
           <a:xfrm>
-            <a:off x="3949040" y="5198695"/>
-            <a:ext cx="3261015" cy="1384995"/>
+            <a:off x="3579713" y="5595152"/>
+            <a:ext cx="3164848" cy="1384995"/>
           </a:xfrm>
           <a:prstGeom prst="rect">
             <a:avLst/>
@@ -21294,47 +21353,54 @@
           <a:bodyPr wrap="square" rtlCol="0">
             <a:spAutoFit/>
           </a:bodyPr>
-          <a:lstStyle/>
-          <a:p>
-            <a:pPr marL="400050" indent="-400050">
+          <a:lstStyle>
+            <a:defPPr>
+              <a:defRPr lang="en-US"/>
+            </a:defPPr>
+            <a:lvl1pPr algn="ctr">
+              <a:defRPr sz="1400"/>
+            </a:lvl1pPr>
+          </a:lstStyle>
+          <a:p>
+            <a:pPr marL="400050" indent="-400050" algn="l">
               <a:buFont typeface="+mj-lt"/>
               <a:buAutoNum type="romanLcPeriod"/>
             </a:pPr>
             <a:r>
-              <a:rPr lang="en-US" sz="1400" dirty="0" smtClean="0"/>
+              <a:rPr lang="en-US" dirty="0"/>
               <a:t>Media path congestion cues</a:t>
             </a:r>
           </a:p>
           <a:p>
-            <a:pPr marL="400050" indent="-400050">
+            <a:pPr marL="400050" indent="-400050" algn="l">
               <a:buFont typeface="+mj-lt"/>
               <a:buAutoNum type="romanLcPeriod"/>
             </a:pPr>
             <a:r>
-              <a:rPr lang="en-US" sz="1400" dirty="0" smtClean="0"/>
+              <a:rPr lang="en-US" dirty="0"/>
               <a:t>Receiver’s Estimate (e.g., REMB, TMMBR)</a:t>
             </a:r>
           </a:p>
           <a:p>
-            <a:pPr marL="400050" indent="-400050">
+            <a:pPr marL="400050" indent="-400050" algn="l">
               <a:buFont typeface="+mj-lt"/>
               <a:buAutoNum type="romanLcPeriod"/>
             </a:pPr>
             <a:r>
-              <a:rPr lang="en-US" sz="1400" dirty="0" smtClean="0"/>
+              <a:rPr lang="en-US" dirty="0"/>
               <a:t>Receiver’s Notification (e.g., 3G Base-station)</a:t>
             </a:r>
           </a:p>
           <a:p>
-            <a:pPr marL="400050" indent="-400050">
+            <a:pPr marL="400050" indent="-400050" algn="l">
               <a:buFont typeface="+mj-lt"/>
               <a:buAutoNum type="romanLcPeriod"/>
             </a:pPr>
             <a:r>
-              <a:rPr lang="en-US" sz="1400" dirty="0" smtClean="0"/>
+              <a:rPr lang="en-US" dirty="0"/>
               <a:t>Receiver’s NCMS throughput</a:t>
             </a:r>
-            <a:endParaRPr lang="en-US" sz="1400" dirty="0"/>
+            <a:endParaRPr lang="en-US" dirty="0"/>
           </a:p>
         </p:txBody>
       </p:sp>

</xml_diff>

<commit_message>
fixed spelling in figure
</commit_message>
<xml_diff>
--- a/graphs/source/chap5-src.pptx
+++ b/graphs/source/chap5-src.pptx
@@ -206,7 +206,7 @@
           <a:p>
             <a:fld id="{7BA68311-98B2-8147-8E3D-5F9C91F16701}" type="datetimeFigureOut">
               <a:rPr lang="en-US" smtClean="0"/>
-              <a:t>07/07/14</a:t>
+              <a:t>14/07/14</a:t>
             </a:fld>
             <a:endParaRPr lang="en-US"/>
           </a:p>
@@ -739,7 +739,7 @@
           <a:p>
             <a:fld id="{CE2D3545-AE21-7247-8426-4B1172E482C1}" type="datetimeFigureOut">
               <a:rPr lang="en-US" smtClean="0"/>
-              <a:t>07/07/14</a:t>
+              <a:t>14/07/14</a:t>
             </a:fld>
             <a:endParaRPr lang="en-US"/>
           </a:p>
@@ -909,7 +909,7 @@
           <a:p>
             <a:fld id="{CE2D3545-AE21-7247-8426-4B1172E482C1}" type="datetimeFigureOut">
               <a:rPr lang="en-US" smtClean="0"/>
-              <a:t>07/07/14</a:t>
+              <a:t>14/07/14</a:t>
             </a:fld>
             <a:endParaRPr lang="en-US"/>
           </a:p>
@@ -1089,7 +1089,7 @@
           <a:p>
             <a:fld id="{CE2D3545-AE21-7247-8426-4B1172E482C1}" type="datetimeFigureOut">
               <a:rPr lang="en-US" smtClean="0"/>
-              <a:t>07/07/14</a:t>
+              <a:t>14/07/14</a:t>
             </a:fld>
             <a:endParaRPr lang="en-US"/>
           </a:p>
@@ -1259,7 +1259,7 @@
           <a:p>
             <a:fld id="{CE2D3545-AE21-7247-8426-4B1172E482C1}" type="datetimeFigureOut">
               <a:rPr lang="en-US" smtClean="0"/>
-              <a:t>07/07/14</a:t>
+              <a:t>14/07/14</a:t>
             </a:fld>
             <a:endParaRPr lang="en-US"/>
           </a:p>
@@ -1505,7 +1505,7 @@
           <a:p>
             <a:fld id="{CE2D3545-AE21-7247-8426-4B1172E482C1}" type="datetimeFigureOut">
               <a:rPr lang="en-US" smtClean="0"/>
-              <a:t>07/07/14</a:t>
+              <a:t>14/07/14</a:t>
             </a:fld>
             <a:endParaRPr lang="en-US"/>
           </a:p>
@@ -1793,7 +1793,7 @@
           <a:p>
             <a:fld id="{CE2D3545-AE21-7247-8426-4B1172E482C1}" type="datetimeFigureOut">
               <a:rPr lang="en-US" smtClean="0"/>
-              <a:t>07/07/14</a:t>
+              <a:t>14/07/14</a:t>
             </a:fld>
             <a:endParaRPr lang="en-US"/>
           </a:p>
@@ -2215,7 +2215,7 @@
           <a:p>
             <a:fld id="{CE2D3545-AE21-7247-8426-4B1172E482C1}" type="datetimeFigureOut">
               <a:rPr lang="en-US" smtClean="0"/>
-              <a:t>07/07/14</a:t>
+              <a:t>14/07/14</a:t>
             </a:fld>
             <a:endParaRPr lang="en-US"/>
           </a:p>
@@ -2333,7 +2333,7 @@
           <a:p>
             <a:fld id="{CE2D3545-AE21-7247-8426-4B1172E482C1}" type="datetimeFigureOut">
               <a:rPr lang="en-US" smtClean="0"/>
-              <a:t>07/07/14</a:t>
+              <a:t>14/07/14</a:t>
             </a:fld>
             <a:endParaRPr lang="en-US"/>
           </a:p>
@@ -2428,7 +2428,7 @@
           <a:p>
             <a:fld id="{CE2D3545-AE21-7247-8426-4B1172E482C1}" type="datetimeFigureOut">
               <a:rPr lang="en-US" smtClean="0"/>
-              <a:t>07/07/14</a:t>
+              <a:t>14/07/14</a:t>
             </a:fld>
             <a:endParaRPr lang="en-US"/>
           </a:p>
@@ -2705,7 +2705,7 @@
           <a:p>
             <a:fld id="{CE2D3545-AE21-7247-8426-4B1172E482C1}" type="datetimeFigureOut">
               <a:rPr lang="en-US" smtClean="0"/>
-              <a:t>07/07/14</a:t>
+              <a:t>14/07/14</a:t>
             </a:fld>
             <a:endParaRPr lang="en-US"/>
           </a:p>
@@ -2962,7 +2962,7 @@
           <a:p>
             <a:fld id="{CE2D3545-AE21-7247-8426-4B1172E482C1}" type="datetimeFigureOut">
               <a:rPr lang="en-US" smtClean="0"/>
-              <a:t>07/07/14</a:t>
+              <a:t>14/07/14</a:t>
             </a:fld>
             <a:endParaRPr lang="en-US"/>
           </a:p>
@@ -3180,7 +3180,7 @@
           <a:p>
             <a:fld id="{CE2D3545-AE21-7247-8426-4B1172E482C1}" type="datetimeFigureOut">
               <a:rPr lang="en-US" smtClean="0"/>
-              <a:t>07/07/14</a:t>
+              <a:t>14/07/14</a:t>
             </a:fld>
             <a:endParaRPr lang="en-US"/>
           </a:p>
@@ -4011,8 +4011,8 @@
         </p:nvSpPr>
         <p:spPr bwMode="auto">
           <a:xfrm>
-            <a:off x="3282268" y="1569820"/>
-            <a:ext cx="2993127" cy="634020"/>
+            <a:off x="3282268" y="1524935"/>
+            <a:ext cx="2993127" cy="664797"/>
           </a:xfrm>
           <a:prstGeom prst="rect">
             <a:avLst/>
@@ -4163,30 +4163,30 @@
               </a:buClr>
             </a:pPr>
             <a:r>
-              <a:rPr lang="en-US" sz="1600" b="1" dirty="0">
+              <a:rPr lang="en-US" sz="1800" b="1" dirty="0">
                 <a:latin typeface="+mj-lt"/>
               </a:rPr>
               <a:t>RTP </a:t>
             </a:r>
             <a:r>
-              <a:rPr lang="en-US" sz="1600" b="1" dirty="0" smtClean="0">
+              <a:rPr lang="en-US" sz="1800" b="1" dirty="0" smtClean="0">
                 <a:latin typeface="+mj-lt"/>
               </a:rPr>
               <a:t>media </a:t>
             </a:r>
             <a:r>
-              <a:rPr lang="en-US" sz="1600" b="1" dirty="0">
+              <a:rPr lang="en-US" sz="1800" b="1" dirty="0">
                 <a:latin typeface="+mj-lt"/>
               </a:rPr>
               <a:t>stream</a:t>
             </a:r>
             <a:r>
-              <a:rPr lang="en-US" sz="1600" dirty="0">
+              <a:rPr lang="en-US" sz="1800" dirty="0">
                 <a:latin typeface="+mn-lt"/>
               </a:rPr>
               <a:t> </a:t>
             </a:r>
-            <a:endParaRPr lang="en-US" sz="1600" dirty="0" smtClean="0">
+            <a:endParaRPr lang="en-US" sz="1800" dirty="0" smtClean="0">
               <a:latin typeface="+mn-lt"/>
             </a:endParaRPr>
           </a:p>
@@ -4227,8 +4227,8 @@
         </p:nvSpPr>
         <p:spPr bwMode="auto">
           <a:xfrm>
-            <a:off x="3543598" y="2385770"/>
-            <a:ext cx="2917185" cy="929485"/>
+            <a:off x="3407044" y="2385770"/>
+            <a:ext cx="3236784" cy="960263"/>
           </a:xfrm>
           <a:prstGeom prst="rect">
             <a:avLst/>
@@ -4379,18 +4379,18 @@
               </a:buClr>
             </a:pPr>
             <a:r>
-              <a:rPr lang="en-US" sz="1600" b="1" dirty="0">
+              <a:rPr lang="en-US" sz="1800" b="1" dirty="0">
                 <a:latin typeface="+mj-lt"/>
               </a:rPr>
               <a:t>RTCP Sender </a:t>
             </a:r>
             <a:r>
-              <a:rPr lang="en-US" sz="1600" b="1" dirty="0" smtClean="0">
+              <a:rPr lang="en-US" sz="1800" b="1" dirty="0" smtClean="0">
                 <a:latin typeface="+mj-lt"/>
               </a:rPr>
               <a:t>Reports (SRs)</a:t>
             </a:r>
-            <a:endParaRPr lang="en-US" sz="1600" b="1" dirty="0">
+            <a:endParaRPr lang="en-US" sz="1800" b="1" dirty="0">
               <a:latin typeface="+mj-lt"/>
             </a:endParaRPr>
           </a:p>
@@ -4409,8 +4409,17 @@
               <a:rPr lang="en-US" sz="1600" dirty="0">
                 <a:latin typeface="+mn-lt"/>
               </a:rPr>
-              <a:t> Timing, synchronization</a:t>
-            </a:r>
+              <a:t> Timing, </a:t>
+            </a:r>
+            <a:r>
+              <a:rPr lang="en-US" sz="1600" dirty="0" err="1" smtClean="0">
+                <a:latin typeface="+mn-lt"/>
+              </a:rPr>
+              <a:t>synchronisation</a:t>
+            </a:r>
+            <a:endParaRPr lang="en-US" sz="1600" dirty="0">
+              <a:latin typeface="+mn-lt"/>
+            </a:endParaRPr>
           </a:p>
           <a:p>
             <a:pPr eaLnBrk="1" hangingPunct="1">
@@ -4460,8 +4469,8 @@
         </p:nvSpPr>
         <p:spPr bwMode="auto">
           <a:xfrm>
-            <a:off x="3524201" y="4374958"/>
-            <a:ext cx="3088506" cy="1520416"/>
+            <a:off x="3524201" y="4422210"/>
+            <a:ext cx="3390672" cy="1588127"/>
           </a:xfrm>
           <a:prstGeom prst="rect">
             <a:avLst/>
@@ -4612,18 +4621,18 @@
               </a:buClr>
             </a:pPr>
             <a:r>
-              <a:rPr lang="en-US" sz="1600" b="1" dirty="0">
+              <a:rPr lang="en-US" sz="1800" b="1" dirty="0">
                 <a:latin typeface="+mj-lt"/>
               </a:rPr>
               <a:t>RTCP Receiver </a:t>
             </a:r>
             <a:r>
-              <a:rPr lang="en-US" sz="1600" b="1" dirty="0" smtClean="0">
+              <a:rPr lang="en-US" sz="1800" b="1" dirty="0" smtClean="0">
                 <a:latin typeface="+mj-lt"/>
               </a:rPr>
               <a:t>Reports (RRs)</a:t>
             </a:r>
-            <a:endParaRPr lang="en-US" sz="1600" b="1" dirty="0">
+            <a:endParaRPr lang="en-US" sz="1800" b="1" dirty="0">
               <a:latin typeface="+mj-lt"/>
             </a:endParaRPr>
           </a:p>
@@ -4673,12 +4682,12 @@
               </a:buClr>
             </a:pPr>
             <a:r>
-              <a:rPr lang="en-US" sz="1600" b="1" dirty="0" smtClean="0">
+              <a:rPr lang="en-US" sz="1800" b="1" dirty="0" smtClean="0">
                 <a:latin typeface="+mj-lt"/>
               </a:rPr>
               <a:t>RTCP XRs: </a:t>
             </a:r>
-            <a:endParaRPr lang="en-US" sz="1600" dirty="0" smtClean="0">
+            <a:endParaRPr lang="en-US" sz="1800" dirty="0" smtClean="0">
               <a:latin typeface="+mj-lt"/>
             </a:endParaRPr>
           </a:p>
@@ -4969,7 +4978,7 @@
         <p:spPr bwMode="auto">
           <a:xfrm>
             <a:off x="0" y="3975199"/>
-            <a:ext cx="2929007" cy="1224951"/>
+            <a:ext cx="2929007" cy="1255728"/>
           </a:xfrm>
           <a:prstGeom prst="rect">
             <a:avLst/>
@@ -5120,7 +5129,7 @@
               </a:buClr>
             </a:pPr>
             <a:r>
-              <a:rPr lang="en-US" sz="1600" b="1" dirty="0">
+              <a:rPr lang="en-US" sz="1800" b="1" dirty="0">
                 <a:latin typeface="+mj-lt"/>
               </a:rPr>
               <a:t>Short-term adaptation</a:t>
@@ -5205,7 +5214,7 @@
         <p:spPr bwMode="auto">
           <a:xfrm>
             <a:off x="0" y="5200150"/>
-            <a:ext cx="2351926" cy="1224951"/>
+            <a:ext cx="2621230" cy="1255728"/>
           </a:xfrm>
           <a:prstGeom prst="rect">
             <a:avLst/>
@@ -5356,7 +5365,7 @@
               </a:buClr>
             </a:pPr>
             <a:r>
-              <a:rPr lang="en-US" sz="1600" b="1" dirty="0">
+              <a:rPr lang="en-US" sz="1800" b="1" dirty="0">
                 <a:latin typeface="+mj-lt"/>
               </a:rPr>
               <a:t>Long-term adaptation</a:t>
@@ -20554,7 +20563,6 @@
               <a:rPr lang="en-US" dirty="0"/>
               <a:t>MPRTP Media Packets</a:t>
             </a:r>
-            <a:endParaRPr lang="en-US" dirty="0"/>
           </a:p>
         </p:txBody>
       </p:sp>
@@ -21400,7 +21408,6 @@
               <a:rPr lang="en-US" dirty="0"/>
               <a:t>Receiver’s NCMS throughput</a:t>
             </a:r>
-            <a:endParaRPr lang="en-US" dirty="0"/>
           </a:p>
         </p:txBody>
       </p:sp>

</xml_diff>

<commit_message>
@protocols-comnet: in-path --> on-path
</commit_message>
<xml_diff>
--- a/graphs/source/chap5-src.pptx
+++ b/graphs/source/chap5-src.pptx
@@ -206,7 +206,7 @@
           <a:p>
             <a:fld id="{7BA68311-98B2-8147-8E3D-5F9C91F16701}" type="datetimeFigureOut">
               <a:rPr lang="en-US" smtClean="0"/>
-              <a:t>14/07/14</a:t>
+              <a:t>02/08/14</a:t>
             </a:fld>
             <a:endParaRPr lang="en-US"/>
           </a:p>
@@ -739,7 +739,7 @@
           <a:p>
             <a:fld id="{CE2D3545-AE21-7247-8426-4B1172E482C1}" type="datetimeFigureOut">
               <a:rPr lang="en-US" smtClean="0"/>
-              <a:t>14/07/14</a:t>
+              <a:t>02/08/14</a:t>
             </a:fld>
             <a:endParaRPr lang="en-US"/>
           </a:p>
@@ -909,7 +909,7 @@
           <a:p>
             <a:fld id="{CE2D3545-AE21-7247-8426-4B1172E482C1}" type="datetimeFigureOut">
               <a:rPr lang="en-US" smtClean="0"/>
-              <a:t>14/07/14</a:t>
+              <a:t>02/08/14</a:t>
             </a:fld>
             <a:endParaRPr lang="en-US"/>
           </a:p>
@@ -1089,7 +1089,7 @@
           <a:p>
             <a:fld id="{CE2D3545-AE21-7247-8426-4B1172E482C1}" type="datetimeFigureOut">
               <a:rPr lang="en-US" smtClean="0"/>
-              <a:t>14/07/14</a:t>
+              <a:t>02/08/14</a:t>
             </a:fld>
             <a:endParaRPr lang="en-US"/>
           </a:p>
@@ -1259,7 +1259,7 @@
           <a:p>
             <a:fld id="{CE2D3545-AE21-7247-8426-4B1172E482C1}" type="datetimeFigureOut">
               <a:rPr lang="en-US" smtClean="0"/>
-              <a:t>14/07/14</a:t>
+              <a:t>02/08/14</a:t>
             </a:fld>
             <a:endParaRPr lang="en-US"/>
           </a:p>
@@ -1505,7 +1505,7 @@
           <a:p>
             <a:fld id="{CE2D3545-AE21-7247-8426-4B1172E482C1}" type="datetimeFigureOut">
               <a:rPr lang="en-US" smtClean="0"/>
-              <a:t>14/07/14</a:t>
+              <a:t>02/08/14</a:t>
             </a:fld>
             <a:endParaRPr lang="en-US"/>
           </a:p>
@@ -1793,7 +1793,7 @@
           <a:p>
             <a:fld id="{CE2D3545-AE21-7247-8426-4B1172E482C1}" type="datetimeFigureOut">
               <a:rPr lang="en-US" smtClean="0"/>
-              <a:t>14/07/14</a:t>
+              <a:t>02/08/14</a:t>
             </a:fld>
             <a:endParaRPr lang="en-US"/>
           </a:p>
@@ -2215,7 +2215,7 @@
           <a:p>
             <a:fld id="{CE2D3545-AE21-7247-8426-4B1172E482C1}" type="datetimeFigureOut">
               <a:rPr lang="en-US" smtClean="0"/>
-              <a:t>14/07/14</a:t>
+              <a:t>02/08/14</a:t>
             </a:fld>
             <a:endParaRPr lang="en-US"/>
           </a:p>
@@ -2333,7 +2333,7 @@
           <a:p>
             <a:fld id="{CE2D3545-AE21-7247-8426-4B1172E482C1}" type="datetimeFigureOut">
               <a:rPr lang="en-US" smtClean="0"/>
-              <a:t>14/07/14</a:t>
+              <a:t>02/08/14</a:t>
             </a:fld>
             <a:endParaRPr lang="en-US"/>
           </a:p>
@@ -2428,7 +2428,7 @@
           <a:p>
             <a:fld id="{CE2D3545-AE21-7247-8426-4B1172E482C1}" type="datetimeFigureOut">
               <a:rPr lang="en-US" smtClean="0"/>
-              <a:t>14/07/14</a:t>
+              <a:t>02/08/14</a:t>
             </a:fld>
             <a:endParaRPr lang="en-US"/>
           </a:p>
@@ -2705,7 +2705,7 @@
           <a:p>
             <a:fld id="{CE2D3545-AE21-7247-8426-4B1172E482C1}" type="datetimeFigureOut">
               <a:rPr lang="en-US" smtClean="0"/>
-              <a:t>14/07/14</a:t>
+              <a:t>02/08/14</a:t>
             </a:fld>
             <a:endParaRPr lang="en-US"/>
           </a:p>
@@ -2962,7 +2962,7 @@
           <a:p>
             <a:fld id="{CE2D3545-AE21-7247-8426-4B1172E482C1}" type="datetimeFigureOut">
               <a:rPr lang="en-US" smtClean="0"/>
-              <a:t>14/07/14</a:t>
+              <a:t>02/08/14</a:t>
             </a:fld>
             <a:endParaRPr lang="en-US"/>
           </a:p>
@@ -3180,7 +3180,7 @@
           <a:p>
             <a:fld id="{CE2D3545-AE21-7247-8426-4B1172E482C1}" type="datetimeFigureOut">
               <a:rPr lang="en-US" smtClean="0"/>
-              <a:t>14/07/14</a:t>
+              <a:t>02/08/14</a:t>
             </a:fld>
             <a:endParaRPr lang="en-US"/>
           </a:p>
@@ -21256,7 +21256,19 @@
               <a:rPr lang="en-US" dirty="0" smtClean="0">
                 <a:latin typeface="+mn-lt"/>
               </a:rPr>
-              <a:t>Any other in-path notifications</a:t>
+              <a:t>Any other </a:t>
+            </a:r>
+            <a:r>
+              <a:rPr lang="en-US" dirty="0" smtClean="0">
+                <a:latin typeface="+mn-lt"/>
+              </a:rPr>
+              <a:t>on</a:t>
+            </a:r>
+            <a:r>
+              <a:rPr lang="en-US" dirty="0" smtClean="0">
+                <a:latin typeface="+mn-lt"/>
+              </a:rPr>
+              <a:t>-path notifications</a:t>
             </a:r>
           </a:p>
         </p:txBody>

</xml_diff>